<commit_message>
add speaker note outline
</commit_message>
<xml_diff>
--- a/Section3_Implementation/Week8_Present/BachmeierNTIM8190-8.pptx
+++ b/Section3_Implementation/Week8_Present/BachmeierNTIM8190-8.pptx
@@ -7617,7 +7617,7 @@
             <a:defRPr cap="all"/>
           </a:pPr>
           <a:r>
-            <a:rPr lang="en-US"/>
+            <a:rPr lang="en-US" dirty="0"/>
             <a:t>Problem Statement</a:t>
           </a:r>
         </a:p>
@@ -7645,48 +7645,6 @@
         </a:p>
       </dgm:t>
     </dgm:pt>
-    <dgm:pt modelId="{9597BDC7-1D20-42FC-8D59-E161BA4A0AA8}">
-      <dgm:prSet/>
-      <dgm:spPr/>
-      <dgm:t>
-        <a:bodyPr/>
-        <a:lstStyle/>
-        <a:p>
-          <a:pPr>
-            <a:lnSpc>
-              <a:spcPct val="100000"/>
-            </a:lnSpc>
-            <a:defRPr cap="all"/>
-          </a:pPr>
-          <a:r>
-            <a:rPr lang="en-US"/>
-            <a:t>Mission Statement</a:t>
-          </a:r>
-        </a:p>
-      </dgm:t>
-    </dgm:pt>
-    <dgm:pt modelId="{05AF0A51-B6F5-4F55-98EA-013379806BC6}" type="parTrans" cxnId="{4B9CD9D6-FE06-484D-ADD8-A6613AF352E9}">
-      <dgm:prSet/>
-      <dgm:spPr/>
-      <dgm:t>
-        <a:bodyPr/>
-        <a:lstStyle/>
-        <a:p>
-          <a:endParaRPr lang="en-US"/>
-        </a:p>
-      </dgm:t>
-    </dgm:pt>
-    <dgm:pt modelId="{8561A3A5-A8C2-494D-95C7-CEFFEA0DDFFA}" type="sibTrans" cxnId="{4B9CD9D6-FE06-484D-ADD8-A6613AF352E9}">
-      <dgm:prSet/>
-      <dgm:spPr/>
-      <dgm:t>
-        <a:bodyPr/>
-        <a:lstStyle/>
-        <a:p>
-          <a:endParaRPr lang="en-US"/>
-        </a:p>
-      </dgm:t>
-    </dgm:pt>
     <dgm:pt modelId="{BD873336-E452-44E5-9E6B-81E6AD296FA5}">
       <dgm:prSet/>
       <dgm:spPr/>
@@ -7701,7 +7659,7 @@
             <a:defRPr cap="all"/>
           </a:pPr>
           <a:r>
-            <a:rPr lang="en-US"/>
+            <a:rPr lang="en-US" dirty="0"/>
             <a:t>Strategic Approach</a:t>
           </a:r>
         </a:p>
@@ -7743,8 +7701,15 @@
             <a:defRPr cap="all"/>
           </a:pPr>
           <a:r>
-            <a:rPr lang="en-US"/>
-            <a:t>Policy Design and Implementation</a:t>
+            <a:rPr lang="en-US" dirty="0"/>
+            <a:t>Policy Design </a:t>
+          </a:r>
+          <a:br>
+            <a:rPr lang="en-US" dirty="0"/>
+          </a:br>
+          <a:r>
+            <a:rPr lang="en-US" dirty="0"/>
+            <a:t>and Implementation</a:t>
           </a:r>
         </a:p>
       </dgm:t>
@@ -7785,8 +7750,22 @@
             <a:defRPr cap="all"/>
           </a:pPr>
           <a:r>
-            <a:rPr lang="en-US"/>
-            <a:t>Roadmap and Budgeting</a:t>
+            <a:rPr lang="en-US" dirty="0"/>
+            <a:t>Roadmap </a:t>
+          </a:r>
+          <a:br>
+            <a:rPr lang="en-US" dirty="0"/>
+          </a:br>
+          <a:r>
+            <a:rPr lang="en-US" dirty="0"/>
+            <a:t>and </a:t>
+          </a:r>
+          <a:br>
+            <a:rPr lang="en-US" dirty="0"/>
+          </a:br>
+          <a:r>
+            <a:rPr lang="en-US" dirty="0"/>
+            <a:t>Budgeting</a:t>
           </a:r>
         </a:p>
       </dgm:t>
@@ -7827,8 +7806,22 @@
             <a:defRPr cap="all"/>
           </a:pPr>
           <a:r>
-            <a:rPr lang="en-US"/>
-            <a:t>Call to Action</a:t>
+            <a:rPr lang="en-US" dirty="0"/>
+            <a:t>Call </a:t>
+          </a:r>
+          <a:br>
+            <a:rPr lang="en-US" dirty="0"/>
+          </a:br>
+          <a:r>
+            <a:rPr lang="en-US" dirty="0"/>
+            <a:t>to </a:t>
+          </a:r>
+          <a:br>
+            <a:rPr lang="en-US" dirty="0"/>
+          </a:br>
+          <a:r>
+            <a:rPr lang="en-US" dirty="0"/>
+            <a:t>Action</a:t>
           </a:r>
         </a:p>
       </dgm:t>
@@ -7855,6 +7848,55 @@
         </a:p>
       </dgm:t>
     </dgm:pt>
+    <dgm:pt modelId="{8EAA0731-BAF8-4DAB-9A25-FF5550855819}">
+      <dgm:prSet/>
+      <dgm:spPr/>
+      <dgm:t>
+        <a:bodyPr/>
+        <a:lstStyle/>
+        <a:p>
+          <a:pPr>
+            <a:lnSpc>
+              <a:spcPct val="100000"/>
+            </a:lnSpc>
+            <a:defRPr cap="all"/>
+          </a:pPr>
+          <a:r>
+            <a:rPr lang="en-US" dirty="0"/>
+            <a:t>Mission </a:t>
+          </a:r>
+          <a:br>
+            <a:rPr lang="en-US" dirty="0"/>
+          </a:br>
+          <a:r>
+            <a:rPr lang="en-US" dirty="0"/>
+            <a:t>Statement</a:t>
+          </a:r>
+        </a:p>
+      </dgm:t>
+    </dgm:pt>
+    <dgm:pt modelId="{4FD26DF7-B026-48F8-968C-D918225C2C7A}" type="parTrans" cxnId="{7130AB60-447E-4AB4-A7E1-6E371786F47E}">
+      <dgm:prSet/>
+      <dgm:spPr/>
+      <dgm:t>
+        <a:bodyPr/>
+        <a:lstStyle/>
+        <a:p>
+          <a:endParaRPr lang="en-US"/>
+        </a:p>
+      </dgm:t>
+    </dgm:pt>
+    <dgm:pt modelId="{C5AC06C9-8FC2-4E1B-96D4-1F79D6CC2CF8}" type="sibTrans" cxnId="{7130AB60-447E-4AB4-A7E1-6E371786F47E}">
+      <dgm:prSet/>
+      <dgm:spPr/>
+      <dgm:t>
+        <a:bodyPr/>
+        <a:lstStyle/>
+        <a:p>
+          <a:endParaRPr lang="en-US"/>
+        </a:p>
+      </dgm:t>
+    </dgm:pt>
     <dgm:pt modelId="{1BF67145-CEC3-4705-968A-62BB1E1F6BAC}" type="pres">
       <dgm:prSet presAssocID="{9990C357-2839-4D2D-9124-4C399701B25C}" presName="root" presStyleCnt="0">
         <dgm:presLayoutVars>
@@ -7864,25 +7906,73 @@
       </dgm:prSet>
       <dgm:spPr/>
     </dgm:pt>
+    <dgm:pt modelId="{03BC0DE2-08D9-4715-A035-27304E8CEC4A}" type="pres">
+      <dgm:prSet presAssocID="{8EAA0731-BAF8-4DAB-9A25-FF5550855819}" presName="compNode" presStyleCnt="0"/>
+      <dgm:spPr/>
+    </dgm:pt>
+    <dgm:pt modelId="{297C6BBC-6C7A-4E38-9775-80B35C54E953}" type="pres">
+      <dgm:prSet presAssocID="{8EAA0731-BAF8-4DAB-9A25-FF5550855819}" presName="iconBgRect" presStyleLbl="bgShp" presStyleIdx="0" presStyleCnt="6"/>
+      <dgm:spPr/>
+    </dgm:pt>
+    <dgm:pt modelId="{0AFD51F6-050F-4E36-9DFB-5649E1F58C49}" type="pres">
+      <dgm:prSet presAssocID="{8EAA0731-BAF8-4DAB-9A25-FF5550855819}" presName="iconRect" presStyleLbl="node1" presStyleIdx="0" presStyleCnt="6"/>
+      <dgm:spPr>
+        <a:blipFill>
+          <a:blip xmlns:r="http://schemas.openxmlformats.org/officeDocument/2006/relationships" r:embed="rId1">
+            <a:extLst>
+              <a:ext uri="{96DAC541-7B7A-43D3-8B79-37D633B846F1}">
+                <asvg:svgBlip xmlns:asvg="http://schemas.microsoft.com/office/drawing/2016/SVG/main" r:embed="rId2"/>
+              </a:ext>
+            </a:extLst>
+          </a:blip>
+          <a:srcRect/>
+          <a:stretch>
+            <a:fillRect/>
+          </a:stretch>
+        </a:blipFill>
+      </dgm:spPr>
+      <dgm:extLst>
+        <a:ext uri="{E40237B7-FDA0-4F09-8148-C483321AD2D9}">
+          <dgm14:cNvPr xmlns:dgm14="http://schemas.microsoft.com/office/drawing/2010/diagram" id="0" name="" descr="Bullseye with solid fill"/>
+        </a:ext>
+      </dgm:extLst>
+    </dgm:pt>
+    <dgm:pt modelId="{23C90963-8ADA-4970-80D5-0758F0D59A54}" type="pres">
+      <dgm:prSet presAssocID="{8EAA0731-BAF8-4DAB-9A25-FF5550855819}" presName="spaceRect" presStyleCnt="0"/>
+      <dgm:spPr/>
+    </dgm:pt>
+    <dgm:pt modelId="{DAA45A1D-0F10-4A53-B0FD-29FB895BFBC0}" type="pres">
+      <dgm:prSet presAssocID="{8EAA0731-BAF8-4DAB-9A25-FF5550855819}" presName="textRect" presStyleLbl="revTx" presStyleIdx="0" presStyleCnt="6">
+        <dgm:presLayoutVars>
+          <dgm:chMax val="1"/>
+          <dgm:chPref val="1"/>
+        </dgm:presLayoutVars>
+      </dgm:prSet>
+      <dgm:spPr/>
+    </dgm:pt>
+    <dgm:pt modelId="{742F0A61-5BC9-4F73-A24F-70E22CE54500}" type="pres">
+      <dgm:prSet presAssocID="{C5AC06C9-8FC2-4E1B-96D4-1F79D6CC2CF8}" presName="sibTrans" presStyleCnt="0"/>
+      <dgm:spPr/>
+    </dgm:pt>
     <dgm:pt modelId="{EDD7DD72-19B7-4FF0-8DC7-70E1C7E5AA0D}" type="pres">
       <dgm:prSet presAssocID="{67DE4A10-5E44-4570-89DD-478094907D24}" presName="compNode" presStyleCnt="0"/>
       <dgm:spPr/>
     </dgm:pt>
     <dgm:pt modelId="{BBDC2E6C-9DEF-4F1F-83AC-50D2D4B8A0D3}" type="pres">
-      <dgm:prSet presAssocID="{67DE4A10-5E44-4570-89DD-478094907D24}" presName="iconBgRect" presStyleLbl="bgShp" presStyleIdx="0" presStyleCnt="6"/>
+      <dgm:prSet presAssocID="{67DE4A10-5E44-4570-89DD-478094907D24}" presName="iconBgRect" presStyleLbl="bgShp" presStyleIdx="1" presStyleCnt="6"/>
       <dgm:spPr/>
     </dgm:pt>
     <dgm:pt modelId="{57AF17E9-4D7F-4452-BC78-40FFB212A15A}" type="pres">
-      <dgm:prSet presAssocID="{67DE4A10-5E44-4570-89DD-478094907D24}" presName="iconRect" presStyleLbl="node1" presStyleIdx="0" presStyleCnt="6"/>
+      <dgm:prSet presAssocID="{67DE4A10-5E44-4570-89DD-478094907D24}" presName="iconRect" presStyleLbl="node1" presStyleIdx="1" presStyleCnt="6"/>
       <dgm:spPr>
         <a:blipFill>
-          <a:blip xmlns:r="http://schemas.openxmlformats.org/officeDocument/2006/relationships" r:embed="rId1">
+          <a:blip xmlns:r="http://schemas.openxmlformats.org/officeDocument/2006/relationships" r:embed="rId3">
             <a:extLst>
               <a:ext uri="{28A0092B-C50C-407E-A947-70E740481C1C}">
                 <a14:useLocalDpi xmlns:a14="http://schemas.microsoft.com/office/drawing/2010/main" val="0"/>
               </a:ext>
               <a:ext uri="{96DAC541-7B7A-43D3-8B79-37D633B846F1}">
-                <asvg:svgBlip xmlns:asvg="http://schemas.microsoft.com/office/drawing/2016/SVG/main" r:embed="rId2"/>
+                <asvg:svgBlip xmlns:asvg="http://schemas.microsoft.com/office/drawing/2016/SVG/main" r:embed="rId4"/>
               </a:ext>
             </a:extLst>
           </a:blip>
@@ -7902,7 +7992,7 @@
       <dgm:spPr/>
     </dgm:pt>
     <dgm:pt modelId="{56374538-4FA6-4F57-8488-03D8378EF51F}" type="pres">
-      <dgm:prSet presAssocID="{67DE4A10-5E44-4570-89DD-478094907D24}" presName="textRect" presStyleLbl="revTx" presStyleIdx="0" presStyleCnt="6">
+      <dgm:prSet presAssocID="{67DE4A10-5E44-4570-89DD-478094907D24}" presName="textRect" presStyleLbl="revTx" presStyleIdx="1" presStyleCnt="6">
         <dgm:presLayoutVars>
           <dgm:chMax val="1"/>
           <dgm:chPref val="1"/>
@@ -7912,56 +8002,6 @@
     </dgm:pt>
     <dgm:pt modelId="{E9853434-4778-4C4E-ACD5-5774F9AE4067}" type="pres">
       <dgm:prSet presAssocID="{CDFEF80A-A5F5-4617-88A7-7F7383A0F0BE}" presName="sibTrans" presStyleCnt="0"/>
-      <dgm:spPr/>
-    </dgm:pt>
-    <dgm:pt modelId="{384A3A0E-E121-43FD-9B6C-6E24CA41E483}" type="pres">
-      <dgm:prSet presAssocID="{9597BDC7-1D20-42FC-8D59-E161BA4A0AA8}" presName="compNode" presStyleCnt="0"/>
-      <dgm:spPr/>
-    </dgm:pt>
-    <dgm:pt modelId="{8314C430-AAD6-4C58-A726-AA0B223D5E81}" type="pres">
-      <dgm:prSet presAssocID="{9597BDC7-1D20-42FC-8D59-E161BA4A0AA8}" presName="iconBgRect" presStyleLbl="bgShp" presStyleIdx="1" presStyleCnt="6"/>
-      <dgm:spPr/>
-    </dgm:pt>
-    <dgm:pt modelId="{AFB17588-779A-4D0F-88C6-9F35686BABBC}" type="pres">
-      <dgm:prSet presAssocID="{9597BDC7-1D20-42FC-8D59-E161BA4A0AA8}" presName="iconRect" presStyleLbl="node1" presStyleIdx="1" presStyleCnt="6"/>
-      <dgm:spPr>
-        <a:blipFill>
-          <a:blip xmlns:r="http://schemas.openxmlformats.org/officeDocument/2006/relationships" r:embed="rId3">
-            <a:extLst>
-              <a:ext uri="{28A0092B-C50C-407E-A947-70E740481C1C}">
-                <a14:useLocalDpi xmlns:a14="http://schemas.microsoft.com/office/drawing/2010/main" val="0"/>
-              </a:ext>
-              <a:ext uri="{96DAC541-7B7A-43D3-8B79-37D633B846F1}">
-                <asvg:svgBlip xmlns:asvg="http://schemas.microsoft.com/office/drawing/2016/SVG/main" r:embed="rId4"/>
-              </a:ext>
-            </a:extLst>
-          </a:blip>
-          <a:stretch>
-            <a:fillRect/>
-          </a:stretch>
-        </a:blipFill>
-      </dgm:spPr>
-      <dgm:extLst>
-        <a:ext uri="{E40237B7-FDA0-4F09-8148-C483321AD2D9}">
-          <dgm14:cNvPr xmlns:dgm14="http://schemas.microsoft.com/office/drawing/2010/diagram" id="0" name="" descr="New Team Project"/>
-        </a:ext>
-      </dgm:extLst>
-    </dgm:pt>
-    <dgm:pt modelId="{2A75E5F6-B708-42AF-9FFD-8EC446CAD675}" type="pres">
-      <dgm:prSet presAssocID="{9597BDC7-1D20-42FC-8D59-E161BA4A0AA8}" presName="spaceRect" presStyleCnt="0"/>
-      <dgm:spPr/>
-    </dgm:pt>
-    <dgm:pt modelId="{D35D2724-2FEF-47CE-8360-F3A80868C3B5}" type="pres">
-      <dgm:prSet presAssocID="{9597BDC7-1D20-42FC-8D59-E161BA4A0AA8}" presName="textRect" presStyleLbl="revTx" presStyleIdx="1" presStyleCnt="6">
-        <dgm:presLayoutVars>
-          <dgm:chMax val="1"/>
-          <dgm:chPref val="1"/>
-        </dgm:presLayoutVars>
-      </dgm:prSet>
-      <dgm:spPr/>
-    </dgm:pt>
-    <dgm:pt modelId="{5451AD35-E8E6-4B8F-B724-EF8E315AF8BF}" type="pres">
-      <dgm:prSet presAssocID="{8561A3A5-A8C2-494D-95C7-CEFFEA0DDFFA}" presName="sibTrans" presStyleCnt="0"/>
       <dgm:spPr/>
     </dgm:pt>
     <dgm:pt modelId="{1D19D13F-412E-42F6-9DDF-75A6FAC6749E}" type="pres">
@@ -8165,6 +8205,8 @@
     <dgm:cxn modelId="{EF96F405-E02F-4589-B9DD-58939A47CCBD}" srcId="{9990C357-2839-4D2D-9124-4C399701B25C}" destId="{5DF0BC90-BE3B-4640-B81B-A12F4BABD987}" srcOrd="4" destOrd="0" parTransId="{3573A6EE-7C91-47F0-B99A-29EAB516FE43}" sibTransId="{E4573A43-844B-462A-A322-87641414CCC6}"/>
     <dgm:cxn modelId="{DA6E0B2B-1160-4013-AC33-B98C05DFEC47}" srcId="{9990C357-2839-4D2D-9124-4C399701B25C}" destId="{1B0AC997-5B7C-4472-883E-31FBAEBFE83F}" srcOrd="3" destOrd="0" parTransId="{D2F09162-864A-4276-8E9C-AE465CDB6215}" sibTransId="{765633E3-1C1B-472F-B1D1-368014A6D00C}"/>
     <dgm:cxn modelId="{0910F05C-2EE9-47F0-954F-074004C445E7}" type="presOf" srcId="{67DE4A10-5E44-4570-89DD-478094907D24}" destId="{56374538-4FA6-4F57-8488-03D8378EF51F}" srcOrd="0" destOrd="0" presId="urn:microsoft.com/office/officeart/2018/5/layout/IconCircleLabelList"/>
+    <dgm:cxn modelId="{7130AB60-447E-4AB4-A7E1-6E371786F47E}" srcId="{9990C357-2839-4D2D-9124-4C399701B25C}" destId="{8EAA0731-BAF8-4DAB-9A25-FF5550855819}" srcOrd="0" destOrd="0" parTransId="{4FD26DF7-B026-48F8-968C-D918225C2C7A}" sibTransId="{C5AC06C9-8FC2-4E1B-96D4-1F79D6CC2CF8}"/>
+    <dgm:cxn modelId="{E717046D-761B-4121-87A1-1E82214F7355}" type="presOf" srcId="{8EAA0731-BAF8-4DAB-9A25-FF5550855819}" destId="{DAA45A1D-0F10-4A53-B0FD-29FB895BFBC0}" srcOrd="0" destOrd="0" presId="urn:microsoft.com/office/officeart/2018/5/layout/IconCircleLabelList"/>
     <dgm:cxn modelId="{2795836D-B113-4B6B-91D2-E395A6434737}" srcId="{9990C357-2839-4D2D-9124-4C399701B25C}" destId="{2FE3CFFF-B1D2-4126-9A4C-86FB66197A0B}" srcOrd="5" destOrd="0" parTransId="{1E4B0FEC-FC79-41F6-9135-5A234E9930C1}" sibTransId="{37DED903-04D1-42BC-98BC-BE79648E9C8F}"/>
     <dgm:cxn modelId="{3A317B92-6829-4FA4-8D00-14F616090CE4}" srcId="{9990C357-2839-4D2D-9124-4C399701B25C}" destId="{BD873336-E452-44E5-9E6B-81E6AD296FA5}" srcOrd="2" destOrd="0" parTransId="{D3FCFD24-4E03-4D1E-9014-A1F2025CA518}" sibTransId="{E5AE890C-4BB0-45B8-9923-E682A246E273}"/>
     <dgm:cxn modelId="{341E939F-7950-48AF-9609-9E7DC6B39523}" type="presOf" srcId="{BD873336-E452-44E5-9E6B-81E6AD296FA5}" destId="{88A77BE3-AF62-41C6-BC17-A688CF8F89B1}" srcOrd="0" destOrd="0" presId="urn:microsoft.com/office/officeart/2018/5/layout/IconCircleLabelList"/>
@@ -8172,21 +8214,19 @@
     <dgm:cxn modelId="{588867AF-99AB-4066-9AA0-41FECCFBFE3C}" type="presOf" srcId="{1B0AC997-5B7C-4472-883E-31FBAEBFE83F}" destId="{828961DA-95A8-458D-BDB9-EC225FC1BE3E}" srcOrd="0" destOrd="0" presId="urn:microsoft.com/office/officeart/2018/5/layout/IconCircleLabelList"/>
     <dgm:cxn modelId="{20D43EBD-B125-4EAB-AA88-1B7FE002B8B5}" type="presOf" srcId="{2FE3CFFF-B1D2-4126-9A4C-86FB66197A0B}" destId="{60EA2149-EA03-4813-9A60-468B238E7185}" srcOrd="0" destOrd="0" presId="urn:microsoft.com/office/officeart/2018/5/layout/IconCircleLabelList"/>
     <dgm:cxn modelId="{94A4BBD1-DB2A-4342-88E0-DBD9F5C45627}" type="presOf" srcId="{5DF0BC90-BE3B-4640-B81B-A12F4BABD987}" destId="{AAD86812-DE42-4832-8158-6DCB383F62A9}" srcOrd="0" destOrd="0" presId="urn:microsoft.com/office/officeart/2018/5/layout/IconCircleLabelList"/>
-    <dgm:cxn modelId="{4B9CD9D6-FE06-484D-ADD8-A6613AF352E9}" srcId="{9990C357-2839-4D2D-9124-4C399701B25C}" destId="{9597BDC7-1D20-42FC-8D59-E161BA4A0AA8}" srcOrd="1" destOrd="0" parTransId="{05AF0A51-B6F5-4F55-98EA-013379806BC6}" sibTransId="{8561A3A5-A8C2-494D-95C7-CEFFEA0DDFFA}"/>
-    <dgm:cxn modelId="{A6E4D5D7-F629-4690-AB88-A6AA99CEB5EB}" type="presOf" srcId="{9597BDC7-1D20-42FC-8D59-E161BA4A0AA8}" destId="{D35D2724-2FEF-47CE-8360-F3A80868C3B5}" srcOrd="0" destOrd="0" presId="urn:microsoft.com/office/officeart/2018/5/layout/IconCircleLabelList"/>
-    <dgm:cxn modelId="{551BEDF1-804D-46F2-9C88-66DF7B148684}" srcId="{9990C357-2839-4D2D-9124-4C399701B25C}" destId="{67DE4A10-5E44-4570-89DD-478094907D24}" srcOrd="0" destOrd="0" parTransId="{69EA74FF-0755-4933-B676-AFA62A805167}" sibTransId="{CDFEF80A-A5F5-4617-88A7-7F7383A0F0BE}"/>
-    <dgm:cxn modelId="{4B1CD03F-2607-4ABD-ABEA-8F0718A2AF6F}" type="presParOf" srcId="{1BF67145-CEC3-4705-968A-62BB1E1F6BAC}" destId="{EDD7DD72-19B7-4FF0-8DC7-70E1C7E5AA0D}" srcOrd="0" destOrd="0" presId="urn:microsoft.com/office/officeart/2018/5/layout/IconCircleLabelList"/>
+    <dgm:cxn modelId="{551BEDF1-804D-46F2-9C88-66DF7B148684}" srcId="{9990C357-2839-4D2D-9124-4C399701B25C}" destId="{67DE4A10-5E44-4570-89DD-478094907D24}" srcOrd="1" destOrd="0" parTransId="{69EA74FF-0755-4933-B676-AFA62A805167}" sibTransId="{CDFEF80A-A5F5-4617-88A7-7F7383A0F0BE}"/>
+    <dgm:cxn modelId="{FE68C040-8EEE-40A4-95DC-1304325A8728}" type="presParOf" srcId="{1BF67145-CEC3-4705-968A-62BB1E1F6BAC}" destId="{03BC0DE2-08D9-4715-A035-27304E8CEC4A}" srcOrd="0" destOrd="0" presId="urn:microsoft.com/office/officeart/2018/5/layout/IconCircleLabelList"/>
+    <dgm:cxn modelId="{FEB024D2-8BD9-426F-ADB5-5E7560D00183}" type="presParOf" srcId="{03BC0DE2-08D9-4715-A035-27304E8CEC4A}" destId="{297C6BBC-6C7A-4E38-9775-80B35C54E953}" srcOrd="0" destOrd="0" presId="urn:microsoft.com/office/officeart/2018/5/layout/IconCircleLabelList"/>
+    <dgm:cxn modelId="{1F2A7124-129B-4863-8B9D-04939CBCB616}" type="presParOf" srcId="{03BC0DE2-08D9-4715-A035-27304E8CEC4A}" destId="{0AFD51F6-050F-4E36-9DFB-5649E1F58C49}" srcOrd="1" destOrd="0" presId="urn:microsoft.com/office/officeart/2018/5/layout/IconCircleLabelList"/>
+    <dgm:cxn modelId="{4FBFC9FC-B169-4260-83A3-CB0C1C1B1CA9}" type="presParOf" srcId="{03BC0DE2-08D9-4715-A035-27304E8CEC4A}" destId="{23C90963-8ADA-4970-80D5-0758F0D59A54}" srcOrd="2" destOrd="0" presId="urn:microsoft.com/office/officeart/2018/5/layout/IconCircleLabelList"/>
+    <dgm:cxn modelId="{6F649B81-98DA-4837-8821-B9023CC7E33D}" type="presParOf" srcId="{03BC0DE2-08D9-4715-A035-27304E8CEC4A}" destId="{DAA45A1D-0F10-4A53-B0FD-29FB895BFBC0}" srcOrd="3" destOrd="0" presId="urn:microsoft.com/office/officeart/2018/5/layout/IconCircleLabelList"/>
+    <dgm:cxn modelId="{2F7C5818-F186-42B1-84C2-61385526ECE8}" type="presParOf" srcId="{1BF67145-CEC3-4705-968A-62BB1E1F6BAC}" destId="{742F0A61-5BC9-4F73-A24F-70E22CE54500}" srcOrd="1" destOrd="0" presId="urn:microsoft.com/office/officeart/2018/5/layout/IconCircleLabelList"/>
+    <dgm:cxn modelId="{4B1CD03F-2607-4ABD-ABEA-8F0718A2AF6F}" type="presParOf" srcId="{1BF67145-CEC3-4705-968A-62BB1E1F6BAC}" destId="{EDD7DD72-19B7-4FF0-8DC7-70E1C7E5AA0D}" srcOrd="2" destOrd="0" presId="urn:microsoft.com/office/officeart/2018/5/layout/IconCircleLabelList"/>
     <dgm:cxn modelId="{224CDCF0-991D-4F9C-8C78-BECBD10CD8EB}" type="presParOf" srcId="{EDD7DD72-19B7-4FF0-8DC7-70E1C7E5AA0D}" destId="{BBDC2E6C-9DEF-4F1F-83AC-50D2D4B8A0D3}" srcOrd="0" destOrd="0" presId="urn:microsoft.com/office/officeart/2018/5/layout/IconCircleLabelList"/>
     <dgm:cxn modelId="{F8E88C20-5612-489C-BFD5-75E4459F78BE}" type="presParOf" srcId="{EDD7DD72-19B7-4FF0-8DC7-70E1C7E5AA0D}" destId="{57AF17E9-4D7F-4452-BC78-40FFB212A15A}" srcOrd="1" destOrd="0" presId="urn:microsoft.com/office/officeart/2018/5/layout/IconCircleLabelList"/>
     <dgm:cxn modelId="{CDB5733E-E11E-4A9A-A847-55F96B3CC4A4}" type="presParOf" srcId="{EDD7DD72-19B7-4FF0-8DC7-70E1C7E5AA0D}" destId="{DBF26BD4-3999-4C13-B922-437329A6523B}" srcOrd="2" destOrd="0" presId="urn:microsoft.com/office/officeart/2018/5/layout/IconCircleLabelList"/>
     <dgm:cxn modelId="{E9460FF5-F769-4683-9A1B-CE0E02B3DD2A}" type="presParOf" srcId="{EDD7DD72-19B7-4FF0-8DC7-70E1C7E5AA0D}" destId="{56374538-4FA6-4F57-8488-03D8378EF51F}" srcOrd="3" destOrd="0" presId="urn:microsoft.com/office/officeart/2018/5/layout/IconCircleLabelList"/>
-    <dgm:cxn modelId="{5F6030B1-D380-48F0-9BE1-46D3CBD3607E}" type="presParOf" srcId="{1BF67145-CEC3-4705-968A-62BB1E1F6BAC}" destId="{E9853434-4778-4C4E-ACD5-5774F9AE4067}" srcOrd="1" destOrd="0" presId="urn:microsoft.com/office/officeart/2018/5/layout/IconCircleLabelList"/>
-    <dgm:cxn modelId="{B8854E89-0754-45A3-A002-15F4EADBA4DA}" type="presParOf" srcId="{1BF67145-CEC3-4705-968A-62BB1E1F6BAC}" destId="{384A3A0E-E121-43FD-9B6C-6E24CA41E483}" srcOrd="2" destOrd="0" presId="urn:microsoft.com/office/officeart/2018/5/layout/IconCircleLabelList"/>
-    <dgm:cxn modelId="{ADBF2366-788C-4E31-8C7A-8691F9BD75E9}" type="presParOf" srcId="{384A3A0E-E121-43FD-9B6C-6E24CA41E483}" destId="{8314C430-AAD6-4C58-A726-AA0B223D5E81}" srcOrd="0" destOrd="0" presId="urn:microsoft.com/office/officeart/2018/5/layout/IconCircleLabelList"/>
-    <dgm:cxn modelId="{9EC1FB12-3543-46B4-8FFD-25F06BF7FC1E}" type="presParOf" srcId="{384A3A0E-E121-43FD-9B6C-6E24CA41E483}" destId="{AFB17588-779A-4D0F-88C6-9F35686BABBC}" srcOrd="1" destOrd="0" presId="urn:microsoft.com/office/officeart/2018/5/layout/IconCircleLabelList"/>
-    <dgm:cxn modelId="{1C63AD96-D1CF-4A4A-8244-F66B5ABD3E3C}" type="presParOf" srcId="{384A3A0E-E121-43FD-9B6C-6E24CA41E483}" destId="{2A75E5F6-B708-42AF-9FFD-8EC446CAD675}" srcOrd="2" destOrd="0" presId="urn:microsoft.com/office/officeart/2018/5/layout/IconCircleLabelList"/>
-    <dgm:cxn modelId="{758459AA-7A10-47C1-9CCE-472EFED6EE54}" type="presParOf" srcId="{384A3A0E-E121-43FD-9B6C-6E24CA41E483}" destId="{D35D2724-2FEF-47CE-8360-F3A80868C3B5}" srcOrd="3" destOrd="0" presId="urn:microsoft.com/office/officeart/2018/5/layout/IconCircleLabelList"/>
-    <dgm:cxn modelId="{CEB1D81F-43F7-4C47-A69D-AD3CFBEC40E7}" type="presParOf" srcId="{1BF67145-CEC3-4705-968A-62BB1E1F6BAC}" destId="{5451AD35-E8E6-4B8F-B724-EF8E315AF8BF}" srcOrd="3" destOrd="0" presId="urn:microsoft.com/office/officeart/2018/5/layout/IconCircleLabelList"/>
+    <dgm:cxn modelId="{5F6030B1-D380-48F0-9BE1-46D3CBD3607E}" type="presParOf" srcId="{1BF67145-CEC3-4705-968A-62BB1E1F6BAC}" destId="{E9853434-4778-4C4E-ACD5-5774F9AE4067}" srcOrd="3" destOrd="0" presId="urn:microsoft.com/office/officeart/2018/5/layout/IconCircleLabelList"/>
     <dgm:cxn modelId="{E3A423F6-F4FB-4BF2-8F13-466A3C63C1DD}" type="presParOf" srcId="{1BF67145-CEC3-4705-968A-62BB1E1F6BAC}" destId="{1D19D13F-412E-42F6-9DDF-75A6FAC6749E}" srcOrd="4" destOrd="0" presId="urn:microsoft.com/office/officeart/2018/5/layout/IconCircleLabelList"/>
     <dgm:cxn modelId="{E1401D16-B5DC-4EB7-B0A3-6C77D94D05B8}" type="presParOf" srcId="{1D19D13F-412E-42F6-9DDF-75A6FAC6749E}" destId="{0DA91B5E-F03E-472F-9435-9A775F903426}" srcOrd="0" destOrd="0" presId="urn:microsoft.com/office/officeart/2018/5/layout/IconCircleLabelList"/>
     <dgm:cxn modelId="{8CA7275C-81DE-43C2-B67D-5AA3EB3619E0}" type="presParOf" srcId="{1D19D13F-412E-42F6-9DDF-75A6FAC6749E}" destId="{9285D3DA-C6AF-43A9-B1AD-03CADBFF9155}" srcOrd="1" destOrd="0" presId="urn:microsoft.com/office/officeart/2018/5/layout/IconCircleLabelList"/>
@@ -8215,7 +8255,7 @@
   <dgm:whole/>
   <dgm:extLst>
     <a:ext uri="http://schemas.microsoft.com/office/drawing/2008/diagram">
-      <dsp:dataModelExt xmlns:dsp="http://schemas.microsoft.com/office/drawing/2008/diagram" relId="rId6" minVer="http://schemas.openxmlformats.org/drawingml/2006/diagram"/>
+      <dsp:dataModelExt xmlns:dsp="http://schemas.microsoft.com/office/drawing/2008/diagram" relId="rId7" minVer="http://schemas.openxmlformats.org/drawingml/2006/diagram"/>
     </a:ext>
   </dgm:extLst>
 </dgm:dataModel>
@@ -9067,7 +9107,7 @@
   <dgm:whole/>
   <dgm:extLst>
     <a:ext uri="http://schemas.microsoft.com/office/drawing/2008/diagram">
-      <dsp:dataModelExt xmlns:dsp="http://schemas.microsoft.com/office/drawing/2008/diagram" relId="rId6" minVer="http://schemas.openxmlformats.org/drawingml/2006/diagram"/>
+      <dsp:dataModelExt xmlns:dsp="http://schemas.microsoft.com/office/drawing/2008/diagram" relId="rId7" minVer="http://schemas.openxmlformats.org/drawingml/2006/diagram"/>
     </a:ext>
   </dgm:extLst>
 </dgm:dataModel>
@@ -10171,7 +10211,7 @@
   <dgm:whole/>
   <dgm:extLst>
     <a:ext uri="http://schemas.microsoft.com/office/drawing/2008/diagram">
-      <dsp:dataModelExt xmlns:dsp="http://schemas.microsoft.com/office/drawing/2008/diagram" relId="rId6" minVer="http://schemas.openxmlformats.org/drawingml/2006/diagram"/>
+      <dsp:dataModelExt xmlns:dsp="http://schemas.microsoft.com/office/drawing/2008/diagram" relId="rId7" minVer="http://schemas.openxmlformats.org/drawingml/2006/diagram"/>
     </a:ext>
   </dgm:extLst>
 </dgm:dataModel>
@@ -11672,7 +11712,7 @@
       <dsp:cNvGrpSpPr/>
     </dsp:nvGrpSpPr>
     <dsp:grpSpPr/>
-    <dsp:sp modelId="{BBDC2E6C-9DEF-4F1F-83AC-50D2D4B8A0D3}">
+    <dsp:sp modelId="{297C6BBC-6C7A-4E38-9775-80B35C54E953}">
       <dsp:nvSpPr>
         <dsp:cNvPr id="0" name=""/>
         <dsp:cNvSpPr/>
@@ -11712,7 +11752,7 @@
         <a:fontRef idx="minor"/>
       </dsp:style>
     </dsp:sp>
-    <dsp:sp modelId="{57AF17E9-4D7F-4452-BC78-40FFB212A15A}">
+    <dsp:sp modelId="{0AFD51F6-050F-4E36-9DFB-5649E1F58C49}">
       <dsp:nvSpPr>
         <dsp:cNvPr id="0" name=""/>
         <dsp:cNvSpPr/>
@@ -11728,14 +11768,12 @@
         <a:blipFill>
           <a:blip xmlns:r="http://schemas.openxmlformats.org/officeDocument/2006/relationships" r:embed="rId1">
             <a:extLst>
-              <a:ext uri="{28A0092B-C50C-407E-A947-70E740481C1C}">
-                <a14:useLocalDpi xmlns:a14="http://schemas.microsoft.com/office/drawing/2010/main" val="0"/>
-              </a:ext>
               <a:ext uri="{96DAC541-7B7A-43D3-8B79-37D633B846F1}">
                 <asvg:svgBlip xmlns:asvg="http://schemas.microsoft.com/office/drawing/2016/SVG/main" r:embed="rId2"/>
               </a:ext>
             </a:extLst>
           </a:blip>
+          <a:srcRect/>
           <a:stretch>
             <a:fillRect/>
           </a:stretch>
@@ -11768,7 +11806,7 @@
         </a:fontRef>
       </dsp:style>
     </dsp:sp>
-    <dsp:sp modelId="{56374538-4FA6-4F57-8488-03D8378EF51F}">
+    <dsp:sp modelId="{DAA45A1D-0F10-4A53-B0FD-29FB895BFBC0}">
       <dsp:nvSpPr>
         <dsp:cNvPr id="0" name=""/>
         <dsp:cNvSpPr/>
@@ -11819,8 +11857,15 @@
             <a:defRPr cap="all"/>
           </a:pPr>
           <a:r>
-            <a:rPr lang="en-US" sz="1200" kern="1200"/>
-            <a:t>Problem Statement</a:t>
+            <a:rPr lang="en-US" sz="1200" kern="1200" dirty="0"/>
+            <a:t>Mission </a:t>
+          </a:r>
+          <a:br>
+            <a:rPr lang="en-US" sz="1200" kern="1200" dirty="0"/>
+          </a:br>
+          <a:r>
+            <a:rPr lang="en-US" sz="1200" kern="1200" dirty="0"/>
+            <a:t>Statement</a:t>
           </a:r>
         </a:p>
       </dsp:txBody>
@@ -11829,7 +11874,7 @@
         <a:ext cx="1397460" cy="558984"/>
       </dsp:txXfrm>
     </dsp:sp>
-    <dsp:sp modelId="{8314C430-AAD6-4C58-A726-AA0B223D5E81}">
+    <dsp:sp modelId="{BBDC2E6C-9DEF-4F1F-83AC-50D2D4B8A0D3}">
       <dsp:nvSpPr>
         <dsp:cNvPr id="0" name=""/>
         <dsp:cNvSpPr/>
@@ -11869,7 +11914,7 @@
         <a:fontRef idx="minor"/>
       </dsp:style>
     </dsp:sp>
-    <dsp:sp modelId="{AFB17588-779A-4D0F-88C6-9F35686BABBC}">
+    <dsp:sp modelId="{57AF17E9-4D7F-4452-BC78-40FFB212A15A}">
       <dsp:nvSpPr>
         <dsp:cNvPr id="0" name=""/>
         <dsp:cNvSpPr/>
@@ -11925,7 +11970,7 @@
         </a:fontRef>
       </dsp:style>
     </dsp:sp>
-    <dsp:sp modelId="{D35D2724-2FEF-47CE-8360-F3A80868C3B5}">
+    <dsp:sp modelId="{56374538-4FA6-4F57-8488-03D8378EF51F}">
       <dsp:nvSpPr>
         <dsp:cNvPr id="0" name=""/>
         <dsp:cNvSpPr/>
@@ -11976,8 +12021,8 @@
             <a:defRPr cap="all"/>
           </a:pPr>
           <a:r>
-            <a:rPr lang="en-US" sz="1200" kern="1200"/>
-            <a:t>Mission Statement</a:t>
+            <a:rPr lang="en-US" sz="1200" kern="1200" dirty="0"/>
+            <a:t>Problem Statement</a:t>
           </a:r>
         </a:p>
       </dsp:txBody>
@@ -12133,7 +12178,7 @@
             <a:defRPr cap="all"/>
           </a:pPr>
           <a:r>
-            <a:rPr lang="en-US" sz="1200" kern="1200"/>
+            <a:rPr lang="en-US" sz="1200" kern="1200" dirty="0"/>
             <a:t>Strategic Approach</a:t>
           </a:r>
         </a:p>
@@ -12290,8 +12335,15 @@
             <a:defRPr cap="all"/>
           </a:pPr>
           <a:r>
-            <a:rPr lang="en-US" sz="1200" kern="1200"/>
-            <a:t>Policy Design and Implementation</a:t>
+            <a:rPr lang="en-US" sz="1200" kern="1200" dirty="0"/>
+            <a:t>Policy Design </a:t>
+          </a:r>
+          <a:br>
+            <a:rPr lang="en-US" sz="1200" kern="1200" dirty="0"/>
+          </a:br>
+          <a:r>
+            <a:rPr lang="en-US" sz="1200" kern="1200" dirty="0"/>
+            <a:t>and Implementation</a:t>
           </a:r>
         </a:p>
       </dsp:txBody>
@@ -12447,8 +12499,22 @@
             <a:defRPr cap="all"/>
           </a:pPr>
           <a:r>
-            <a:rPr lang="en-US" sz="1200" kern="1200"/>
-            <a:t>Roadmap and Budgeting</a:t>
+            <a:rPr lang="en-US" sz="1200" kern="1200" dirty="0"/>
+            <a:t>Roadmap </a:t>
+          </a:r>
+          <a:br>
+            <a:rPr lang="en-US" sz="1200" kern="1200" dirty="0"/>
+          </a:br>
+          <a:r>
+            <a:rPr lang="en-US" sz="1200" kern="1200" dirty="0"/>
+            <a:t>and </a:t>
+          </a:r>
+          <a:br>
+            <a:rPr lang="en-US" sz="1200" kern="1200" dirty="0"/>
+          </a:br>
+          <a:r>
+            <a:rPr lang="en-US" sz="1200" kern="1200" dirty="0"/>
+            <a:t>Budgeting</a:t>
           </a:r>
         </a:p>
       </dsp:txBody>
@@ -12604,8 +12670,22 @@
             <a:defRPr cap="all"/>
           </a:pPr>
           <a:r>
-            <a:rPr lang="en-US" sz="1200" kern="1200"/>
-            <a:t>Call to Action</a:t>
+            <a:rPr lang="en-US" sz="1200" kern="1200" dirty="0"/>
+            <a:t>Call </a:t>
+          </a:r>
+          <a:br>
+            <a:rPr lang="en-US" sz="1200" kern="1200" dirty="0"/>
+          </a:br>
+          <a:r>
+            <a:rPr lang="en-US" sz="1200" kern="1200" dirty="0"/>
+            <a:t>to </a:t>
+          </a:r>
+          <a:br>
+            <a:rPr lang="en-US" sz="1200" kern="1200" dirty="0"/>
+          </a:br>
+          <a:r>
+            <a:rPr lang="en-US" sz="1200" kern="1200" dirty="0"/>
+            <a:t>Action</a:t>
           </a:r>
         </a:p>
       </dsp:txBody>
@@ -31494,14 +31574,78 @@
           <a:bodyPr/>
           <a:lstStyle/>
           <a:p>
+            <a:pPr marL="342900" marR="0" lvl="0" indent="-342900">
+              <a:lnSpc>
+                <a:spcPct val="107000"/>
+              </a:lnSpc>
+              <a:spcBef>
+                <a:spcPts val="0"/>
+              </a:spcBef>
+              <a:spcAft>
+                <a:spcPts val="0"/>
+              </a:spcAft>
+              <a:buFont typeface="Symbol" panose="05050102010706020507" pitchFamily="18" charset="2"/>
+              <a:buChar char=""/>
+            </a:pPr>
             <a:r>
               <a:rPr lang="en-US" sz="1800" dirty="0">
                 <a:effectLst/>
-                <a:latin typeface="Times New Roman" panose="02020603050405020304" pitchFamily="18" charset="0"/>
+                <a:latin typeface="Calibri" panose="020F0502020204030204" pitchFamily="34" charset="0"/>
                 <a:ea typeface="Calibri" panose="020F0502020204030204" pitchFamily="34" charset="0"/>
+                <a:cs typeface="Times New Roman" panose="02020603050405020304" pitchFamily="18" charset="0"/>
               </a:rPr>
-              <a:t>NCU-F democratizes financial serves through a comprehensive portfolio of capabilities.  The company’s founders found that existing banking services were not inclusive, often penalizing small account holders with arbitrary fees.  While this approach is profitable, it does not create a positive customer experience or lead to a sustainable business model.  This long-term focus earned the organization a broad customer base, which fuels its ability to acquire innovative competitors.  Today, the business has numerous financial products that exist as application silos without a consistent interface.  Instead, NCU-F envisions modernizing these systems to improve cross-selling, reduce operational overhead, and standardize the experience.  These capabilities would benefit the organization and its customers. </a:t>
+              <a:t>Greeting</a:t>
             </a:r>
+          </a:p>
+          <a:p>
+            <a:pPr marL="342900" marR="0" lvl="0" indent="-342900">
+              <a:lnSpc>
+                <a:spcPct val="107000"/>
+              </a:lnSpc>
+              <a:spcBef>
+                <a:spcPts val="0"/>
+              </a:spcBef>
+              <a:spcAft>
+                <a:spcPts val="0"/>
+              </a:spcAft>
+              <a:buFont typeface="Symbol" panose="05050102010706020507" pitchFamily="18" charset="2"/>
+              <a:buChar char=""/>
+            </a:pPr>
+            <a:r>
+              <a:rPr lang="en-US" sz="1800" dirty="0">
+                <a:effectLst/>
+                <a:latin typeface="Calibri" panose="020F0502020204030204" pitchFamily="34" charset="0"/>
+                <a:ea typeface="Calibri" panose="020F0502020204030204" pitchFamily="34" charset="0"/>
+                <a:cs typeface="Times New Roman" panose="02020603050405020304" pitchFamily="18" charset="0"/>
+              </a:rPr>
+              <a:t>Title</a:t>
+            </a:r>
+          </a:p>
+          <a:p>
+            <a:pPr marL="342900" marR="0" lvl="0" indent="-342900">
+              <a:lnSpc>
+                <a:spcPct val="107000"/>
+              </a:lnSpc>
+              <a:spcBef>
+                <a:spcPts val="0"/>
+              </a:spcBef>
+              <a:spcAft>
+                <a:spcPts val="800"/>
+              </a:spcAft>
+              <a:buFont typeface="Symbol" panose="05050102010706020507" pitchFamily="18" charset="2"/>
+              <a:buChar char=""/>
+            </a:pPr>
+            <a:r>
+              <a:rPr lang="en-US" sz="1800" dirty="0">
+                <a:effectLst/>
+                <a:latin typeface="Calibri" panose="020F0502020204030204" pitchFamily="34" charset="0"/>
+                <a:ea typeface="Calibri" panose="020F0502020204030204" pitchFamily="34" charset="0"/>
+                <a:cs typeface="Times New Roman" panose="02020603050405020304" pitchFamily="18" charset="0"/>
+              </a:rPr>
+              <a:t>Lot to cover so let us get into it</a:t>
+            </a:r>
+          </a:p>
+          <a:p>
             <a:endParaRPr lang="en-US" dirty="0"/>
           </a:p>
         </p:txBody>
@@ -31523,7 +31667,7 @@
           <a:p>
             <a:fld id="{CEE7ED23-8054-42FC-A808-6FDE147C0F4B}" type="slidenum">
               <a:rPr lang="en-US" smtClean="0"/>
-              <a:t>3</a:t>
+              <a:t>1</a:t>
             </a:fld>
             <a:endParaRPr lang="en-US"/>
           </a:p>
@@ -31532,7 +31676,7 @@
     </p:spTree>
     <p:extLst>
       <p:ext uri="{BB962C8B-B14F-4D97-AF65-F5344CB8AC3E}">
-        <p14:creationId xmlns:p14="http://schemas.microsoft.com/office/powerpoint/2010/main" val="2611245531"/>
+        <p14:creationId xmlns:p14="http://schemas.microsoft.com/office/powerpoint/2010/main" val="2027696729"/>
       </p:ext>
     </p:extLst>
   </p:cSld>
@@ -31542,7 +31686,7 @@
 </p:notes>
 </file>
 
-<file path=ppt/notesSlides/notesSlide2.xml><?xml version="1.0" encoding="utf-8"?>
+<file path=ppt/notesSlides/notesSlide10.xml><?xml version="1.0" encoding="utf-8"?>
 <p:notes xmlns:a="http://schemas.openxmlformats.org/drawingml/2006/main" xmlns:r="http://schemas.openxmlformats.org/officeDocument/2006/relationships" xmlns:p="http://schemas.openxmlformats.org/presentationml/2006/main">
   <p:cSld>
     <p:spTree>
@@ -31586,94 +31730,6 @@
           <a:bodyPr/>
           <a:lstStyle/>
           <a:p>
-            <a:pPr marL="0" marR="0" lvl="0" indent="0" algn="l" defTabSz="914400" rtl="0" eaLnBrk="1" fontAlgn="auto" latinLnBrk="0" hangingPunct="1">
-              <a:lnSpc>
-                <a:spcPct val="100000"/>
-              </a:lnSpc>
-              <a:spcBef>
-                <a:spcPts val="0"/>
-              </a:spcBef>
-              <a:spcAft>
-                <a:spcPts val="0"/>
-              </a:spcAft>
-              <a:buClrTx/>
-              <a:buSzTx/>
-              <a:buFontTx/>
-              <a:buNone/>
-              <a:tabLst/>
-              <a:defRPr/>
-            </a:pPr>
-            <a:r>
-              <a:rPr lang="en-US" sz="1800" dirty="0">
-                <a:effectLst/>
-                <a:latin typeface="Times New Roman" panose="02020603050405020304" pitchFamily="18" charset="0"/>
-                <a:ea typeface="Calibri" panose="020F0502020204030204" pitchFamily="34" charset="0"/>
-              </a:rPr>
-              <a:t>NCU-F specializes in Banking-as-a-Service and payment processing services across North America, Europe, and Asia.  The organization has ten thousand employees that serve over a million customers.  Those customers rely on the business for several integral capabilities, such as facilitating online purchases and enabling friends to send one another money.  NCU-F also offers mortgage services, investment specializations, checking and savings accounts, and personal loans.  Over the last decade, the organization has seen aggressive expansion through acquisitions.  While this strategy enables the organization to reach new markets and deliver customer value quickly, it also leads to a fragmented technology platform.  For instance, customers must maintain multiple distinct profiles and cannot easily navigate between the various products.  Additionally, NCU-F is inefficiently utilizing its resources as many business units are recreating similar solutions to the same problems. The senior leadership team wants to improve upon these issues through IT Governance.</a:t>
-            </a:r>
-          </a:p>
-          <a:p>
-            <a:endParaRPr lang="en-US" dirty="0"/>
-          </a:p>
-          <a:p>
-            <a:pPr marL="0" marR="0">
-              <a:lnSpc>
-                <a:spcPct val="200000"/>
-              </a:lnSpc>
-              <a:spcBef>
-                <a:spcPts val="0"/>
-              </a:spcBef>
-              <a:spcAft>
-                <a:spcPts val="0"/>
-              </a:spcAft>
-            </a:pPr>
-            <a:r>
-              <a:rPr lang="en-US" sz="1800" dirty="0">
-                <a:effectLst/>
-                <a:latin typeface="Times New Roman" panose="02020603050405020304" pitchFamily="18" charset="0"/>
-                <a:ea typeface="Calibri" panose="020F0502020204030204" pitchFamily="34" charset="0"/>
-              </a:rPr>
-              <a:t>The organization cannot provide the best-in-class user experience until it changes its IT Governance model.  Only through a strategic alignment between the information systems and business goals can NCU-F present a unified product suite for its customers  (</a:t>
-            </a:r>
-            <a:r>
-              <a:rPr lang="en-US" sz="1800" dirty="0" err="1">
-                <a:effectLst/>
-                <a:latin typeface="Times New Roman" panose="02020603050405020304" pitchFamily="18" charset="0"/>
-                <a:ea typeface="Calibri" panose="020F0502020204030204" pitchFamily="34" charset="0"/>
-              </a:rPr>
-              <a:t>Iyamu</a:t>
-            </a:r>
-            <a:r>
-              <a:rPr lang="en-US" sz="1800" dirty="0">
-                <a:effectLst/>
-                <a:latin typeface="Times New Roman" panose="02020603050405020304" pitchFamily="18" charset="0"/>
-                <a:ea typeface="Calibri" panose="020F0502020204030204" pitchFamily="34" charset="0"/>
-              </a:rPr>
-              <a:t>, 2015).  </a:t>
-            </a:r>
-          </a:p>
-          <a:p>
-            <a:pPr marL="0" marR="0">
-              <a:lnSpc>
-                <a:spcPct val="200000"/>
-              </a:lnSpc>
-              <a:spcBef>
-                <a:spcPts val="0"/>
-              </a:spcBef>
-              <a:spcAft>
-                <a:spcPts val="0"/>
-              </a:spcAft>
-            </a:pPr>
-            <a:r>
-              <a:rPr lang="en-US" sz="1800" dirty="0">
-                <a:effectLst/>
-                <a:latin typeface="Times New Roman" panose="02020603050405020304" pitchFamily="18" charset="0"/>
-                <a:ea typeface="Calibri" panose="020F0502020204030204" pitchFamily="34" charset="0"/>
-              </a:rPr>
-              <a:t>NCU-F’s governance model requires mechanisms and processes to enforce consistency, standardization, and choose the best-in-company implementations.  These controls must foster intellectual (e.g., planning and infrastructure) and social (e.g., shared understanding) alignment across the organization (Ping-Ju, Straub, &amp; Liang, 2015).  When team members understand the desired end-state, they can more efficiently plan and prioritize work.  It also removes design choices that would not align with business goals.</a:t>
-            </a:r>
-          </a:p>
-          <a:p>
             <a:endParaRPr lang="en-US" dirty="0"/>
           </a:p>
         </p:txBody>
@@ -31695,7 +31751,7 @@
           <a:p>
             <a:fld id="{CEE7ED23-8054-42FC-A808-6FDE147C0F4B}" type="slidenum">
               <a:rPr lang="en-US" smtClean="0"/>
-              <a:t>4</a:t>
+              <a:t>11</a:t>
             </a:fld>
             <a:endParaRPr lang="en-US"/>
           </a:p>
@@ -31704,7 +31760,7 @@
     </p:spTree>
     <p:extLst>
       <p:ext uri="{BB962C8B-B14F-4D97-AF65-F5344CB8AC3E}">
-        <p14:creationId xmlns:p14="http://schemas.microsoft.com/office/powerpoint/2010/main" val="1945003877"/>
+        <p14:creationId xmlns:p14="http://schemas.microsoft.com/office/powerpoint/2010/main" val="3721055469"/>
       </p:ext>
     </p:extLst>
   </p:cSld>
@@ -31714,801 +31770,7 @@
 </p:notes>
 </file>
 
-<file path=ppt/notesSlides/notesSlide3.xml><?xml version="1.0" encoding="utf-8"?>
-<p:notes xmlns:a="http://schemas.openxmlformats.org/drawingml/2006/main" xmlns:r="http://schemas.openxmlformats.org/officeDocument/2006/relationships" xmlns:p="http://schemas.openxmlformats.org/presentationml/2006/main">
-  <p:cSld>
-    <p:spTree>
-      <p:nvGrpSpPr>
-        <p:cNvPr id="1" name=""/>
-        <p:cNvGrpSpPr/>
-        <p:nvPr/>
-      </p:nvGrpSpPr>
-      <p:grpSpPr>
-        <a:xfrm>
-          <a:off x="0" y="0"/>
-          <a:ext cx="0" cy="0"/>
-          <a:chOff x="0" y="0"/>
-          <a:chExt cx="0" cy="0"/>
-        </a:xfrm>
-      </p:grpSpPr>
-      <p:sp>
-        <p:nvSpPr>
-          <p:cNvPr id="2" name="Slide Image Placeholder 1"/>
-          <p:cNvSpPr>
-            <a:spLocks noGrp="1" noRot="1" noChangeAspect="1"/>
-          </p:cNvSpPr>
-          <p:nvPr>
-            <p:ph type="sldImg"/>
-          </p:nvPr>
-        </p:nvSpPr>
-        <p:spPr/>
-      </p:sp>
-      <p:sp>
-        <p:nvSpPr>
-          <p:cNvPr id="3" name="Notes Placeholder 2"/>
-          <p:cNvSpPr>
-            <a:spLocks noGrp="1"/>
-          </p:cNvSpPr>
-          <p:nvPr>
-            <p:ph type="body" idx="1"/>
-          </p:nvPr>
-        </p:nvSpPr>
-        <p:spPr/>
-        <p:txBody>
-          <a:bodyPr/>
-          <a:lstStyle/>
-          <a:p>
-            <a:r>
-              <a:rPr lang="en-US" b="1" dirty="0"/>
-              <a:t>Establish the Steering Committee</a:t>
-            </a:r>
-          </a:p>
-          <a:p>
-            <a:endParaRPr lang="en-US" b="1" dirty="0"/>
-          </a:p>
-          <a:p>
-            <a:pPr marL="0" marR="0">
-              <a:lnSpc>
-                <a:spcPct val="200000"/>
-              </a:lnSpc>
-              <a:spcBef>
-                <a:spcPts val="0"/>
-              </a:spcBef>
-              <a:spcAft>
-                <a:spcPts val="0"/>
-              </a:spcAft>
-            </a:pPr>
-            <a:r>
-              <a:rPr lang="en-US" sz="1800" dirty="0">
-                <a:effectLst/>
-                <a:latin typeface="Times New Roman" panose="02020603050405020304" pitchFamily="18" charset="0"/>
-                <a:ea typeface="Calibri" panose="020F0502020204030204" pitchFamily="34" charset="0"/>
-              </a:rPr>
-              <a:t>The senior leadership team must establish an IT steering committee that collectively agrees on the organizational patterns and practices.  This group requires executive sponsorship to ensure decisions carry weight.  When the committee identifies high-value work, such as centralizing customer identity, there must be processes to appoint a Single-Threaded Leader (STL)  (</a:t>
-            </a:r>
-            <a:r>
-              <a:rPr lang="en-US" sz="1800" dirty="0" err="1">
-                <a:effectLst/>
-                <a:latin typeface="Times New Roman" panose="02020603050405020304" pitchFamily="18" charset="0"/>
-                <a:ea typeface="Calibri" panose="020F0502020204030204" pitchFamily="34" charset="0"/>
-              </a:rPr>
-              <a:t>Bryar</a:t>
-            </a:r>
-            <a:r>
-              <a:rPr lang="en-US" sz="1800" dirty="0">
-                <a:effectLst/>
-                <a:latin typeface="Times New Roman" panose="02020603050405020304" pitchFamily="18" charset="0"/>
-                <a:ea typeface="Calibri" panose="020F0502020204030204" pitchFamily="34" charset="0"/>
-              </a:rPr>
-              <a:t> &amp; </a:t>
-            </a:r>
-            <a:r>
-              <a:rPr lang="en-US" sz="1800" dirty="0" err="1">
-                <a:effectLst/>
-                <a:latin typeface="Times New Roman" panose="02020603050405020304" pitchFamily="18" charset="0"/>
-                <a:ea typeface="Calibri" panose="020F0502020204030204" pitchFamily="34" charset="0"/>
-              </a:rPr>
-              <a:t>Carr</a:t>
-            </a:r>
-            <a:r>
-              <a:rPr lang="en-US" sz="1800" dirty="0">
-                <a:effectLst/>
-                <a:latin typeface="Times New Roman" panose="02020603050405020304" pitchFamily="18" charset="0"/>
-                <a:ea typeface="Calibri" panose="020F0502020204030204" pitchFamily="34" charset="0"/>
-              </a:rPr>
-              <a:t>, 2021).  An STL is a project owner who manages the goal’s lifecycle, Governance, and stakeholder communication.  This owner should not work on multiple goals in parallel, as it introduces project risk.</a:t>
-            </a:r>
-          </a:p>
-          <a:p>
-            <a:pPr marL="0" marR="0">
-              <a:lnSpc>
-                <a:spcPct val="200000"/>
-              </a:lnSpc>
-              <a:spcBef>
-                <a:spcPts val="0"/>
-              </a:spcBef>
-              <a:spcAft>
-                <a:spcPts val="0"/>
-              </a:spcAft>
-            </a:pPr>
-            <a:endParaRPr lang="en-US" sz="1800" dirty="0">
-              <a:effectLst/>
-              <a:latin typeface="Times New Roman" panose="02020603050405020304" pitchFamily="18" charset="0"/>
-              <a:ea typeface="Calibri" panose="020F0502020204030204" pitchFamily="34" charset="0"/>
-            </a:endParaRPr>
-          </a:p>
-          <a:p>
-            <a:pPr marL="0" marR="0">
-              <a:lnSpc>
-                <a:spcPct val="200000"/>
-              </a:lnSpc>
-              <a:spcBef>
-                <a:spcPts val="0"/>
-              </a:spcBef>
-              <a:spcAft>
-                <a:spcPts val="0"/>
-              </a:spcAft>
-            </a:pPr>
-            <a:r>
-              <a:rPr lang="en-US" sz="1800" dirty="0">
-                <a:effectLst/>
-                <a:latin typeface="Times New Roman" panose="02020603050405020304" pitchFamily="18" charset="0"/>
-                <a:ea typeface="Calibri" panose="020F0502020204030204" pitchFamily="34" charset="0"/>
-              </a:rPr>
-              <a:t>While the IT steering committee(s) establish patterns and practices, it would be unrealistic to assume complete uniformity.  For example, the savings and checking business unit runs on Windows and .NET versus the personal loan features are written in Perl.  Requiring that one group rewrites their implementation would be both challenging and a poor investment.  Instead, the committee must focus on interoperability and code portability through industry standard patterns.  For instance, each product should have an Application Programming Interface (API) that supports RESTful methods (Representational State Transfer protocol).  Those service contracts must support versioning and consistent performance objectives.  However, it is not a goal that those services implement a specific library or language construct.  Steering committees must focus on high-level guidance and architectural guard rails, not implementation nuance.  </a:t>
-            </a:r>
-          </a:p>
-          <a:p>
-            <a:endParaRPr lang="en-US" b="1" dirty="0"/>
-          </a:p>
-          <a:p>
-            <a:r>
-              <a:rPr lang="en-US" b="1" dirty="0"/>
-              <a:t>Standardize Policy Management</a:t>
-            </a:r>
-          </a:p>
-          <a:p>
-            <a:endParaRPr lang="en-US" b="1" dirty="0"/>
-          </a:p>
-          <a:p>
-            <a:pPr marL="0" marR="0" lvl="0" indent="0" algn="l" defTabSz="914400" rtl="0" eaLnBrk="1" fontAlgn="auto" latinLnBrk="0" hangingPunct="1">
-              <a:lnSpc>
-                <a:spcPct val="100000"/>
-              </a:lnSpc>
-              <a:spcBef>
-                <a:spcPts val="0"/>
-              </a:spcBef>
-              <a:spcAft>
-                <a:spcPts val="0"/>
-              </a:spcAft>
-              <a:buClrTx/>
-              <a:buSzTx/>
-              <a:buFontTx/>
-              <a:buNone/>
-              <a:tabLst/>
-              <a:defRPr/>
-            </a:pPr>
-            <a:r>
-              <a:rPr lang="en-US" sz="1800" dirty="0">
-                <a:effectLst/>
-                <a:latin typeface="Times New Roman" panose="02020603050405020304" pitchFamily="18" charset="0"/>
-                <a:ea typeface="Calibri" panose="020F0502020204030204" pitchFamily="34" charset="0"/>
-              </a:rPr>
-              <a:t>Next, the organization must adopt a policy control framework.  Leaders approach this situation by combining existing frameworks, such as COBIT, ITIL, COSO, CMMI, and FAIR (Lindros, 2017).  These industry-standard frameworks assist project teams in implementing their artifacts using a secure, reliable, and maintainable process.  However, using only engineering-centric frameworks is potentially too narrow.  Many projects span different teams, role families, and organizations (e.g., vendors, consultants, and partners).  NCU-F must address these issues and limitations by formally declaring its project artifacts like charters, mandates, and roadmaps (</a:t>
-            </a:r>
-            <a:r>
-              <a:rPr lang="en-US" sz="1800" dirty="0" err="1">
-                <a:effectLst/>
-                <a:latin typeface="Times New Roman" panose="02020603050405020304" pitchFamily="18" charset="0"/>
-                <a:ea typeface="Calibri" panose="020F0502020204030204" pitchFamily="34" charset="0"/>
-              </a:rPr>
-              <a:t>Bonnal</a:t>
-            </a:r>
-            <a:r>
-              <a:rPr lang="en-US" sz="1800" dirty="0">
-                <a:effectLst/>
-                <a:latin typeface="Times New Roman" panose="02020603050405020304" pitchFamily="18" charset="0"/>
-                <a:ea typeface="Calibri" panose="020F0502020204030204" pitchFamily="34" charset="0"/>
-              </a:rPr>
-              <a:t> &amp; </a:t>
-            </a:r>
-            <a:r>
-              <a:rPr lang="en-US" sz="1800" dirty="0" err="1">
-                <a:effectLst/>
-                <a:latin typeface="Times New Roman" panose="02020603050405020304" pitchFamily="18" charset="0"/>
-                <a:ea typeface="Calibri" panose="020F0502020204030204" pitchFamily="34" charset="0"/>
-              </a:rPr>
-              <a:t>Rauser</a:t>
-            </a:r>
-            <a:r>
-              <a:rPr lang="en-US" sz="1800" dirty="0">
-                <a:effectLst/>
-                <a:latin typeface="Times New Roman" panose="02020603050405020304" pitchFamily="18" charset="0"/>
-                <a:ea typeface="Calibri" panose="020F0502020204030204" pitchFamily="34" charset="0"/>
-              </a:rPr>
-              <a:t>, 2017).  When documents explicitly declare universal agreements across the direction and appropriate guardrails, it unifies team communication.  Business professionals can then efficiently map the guiding decisions to their role and team-specific operating models.</a:t>
-            </a:r>
-          </a:p>
-          <a:p>
-            <a:endParaRPr lang="en-US" b="1" dirty="0"/>
-          </a:p>
-          <a:p>
-            <a:r>
-              <a:rPr lang="en-US" b="1" dirty="0"/>
-              <a:t>Delegate Area Ownership</a:t>
-            </a:r>
-          </a:p>
-          <a:p>
-            <a:endParaRPr lang="en-US" b="1" dirty="0"/>
-          </a:p>
-          <a:p>
-            <a:pPr marL="0" marR="0">
-              <a:lnSpc>
-                <a:spcPct val="200000"/>
-              </a:lnSpc>
-              <a:spcBef>
-                <a:spcPts val="0"/>
-              </a:spcBef>
-              <a:spcAft>
-                <a:spcPts val="0"/>
-              </a:spcAft>
-            </a:pPr>
-            <a:r>
-              <a:rPr lang="en-US" sz="1800" dirty="0">
-                <a:effectLst/>
-                <a:latin typeface="Times New Roman" panose="02020603050405020304" pitchFamily="18" charset="0"/>
-                <a:ea typeface="Calibri" panose="020F0502020204030204" pitchFamily="34" charset="0"/>
-              </a:rPr>
-              <a:t>The task force delegates many day-to-day decisions to internal Technical Communities.  Each community owns a specific cross-cutting concern (e.g., disaster recovery) and self-manages any enrollment criteria that govern membership eligibility.  Community members are responsible for reviewing new policy requests, debating ambiguity with existing policies, and proposing technical guidance.  Employees can define new technical communities by submitting requests to the task force oversight committee.  After approving the new community, the committee must appoint a sponsor to ensure the group successfully forms, storms, and eventually norms.</a:t>
-            </a:r>
-          </a:p>
-          <a:p>
-            <a:pPr marL="0" marR="0">
-              <a:lnSpc>
-                <a:spcPct val="200000"/>
-              </a:lnSpc>
-              <a:spcBef>
-                <a:spcPts val="0"/>
-              </a:spcBef>
-              <a:spcAft>
-                <a:spcPts val="0"/>
-              </a:spcAft>
-            </a:pPr>
-            <a:endParaRPr lang="en-US" sz="1800" dirty="0">
-              <a:effectLst/>
-              <a:latin typeface="Times New Roman" panose="02020603050405020304" pitchFamily="18" charset="0"/>
-              <a:ea typeface="Calibri" panose="020F0502020204030204" pitchFamily="34" charset="0"/>
-            </a:endParaRPr>
-          </a:p>
-          <a:p>
-            <a:pPr marL="0" marR="0">
-              <a:lnSpc>
-                <a:spcPct val="200000"/>
-              </a:lnSpc>
-              <a:spcBef>
-                <a:spcPts val="0"/>
-              </a:spcBef>
-              <a:spcAft>
-                <a:spcPts val="0"/>
-              </a:spcAft>
-            </a:pPr>
-            <a:r>
-              <a:rPr lang="en-US" sz="1800" dirty="0">
-                <a:effectLst/>
-                <a:latin typeface="Times New Roman" panose="02020603050405020304" pitchFamily="18" charset="0"/>
-                <a:ea typeface="Calibri" panose="020F0502020204030204" pitchFamily="34" charset="0"/>
-              </a:rPr>
-              <a:t>Employees that want to create a new policy must identify an appropriate community to vet their proposal.  The community will assign one or two reviewers to iterate the proposal until it adheres to internal standards.  After the reviewers approve the document, the authors request that their policy be globally visible within Policy Central, a proprietary document management system.  This system utilizes a NoSQL graph database representing the relationship between various documents, like a university citation library.  Policy documents initialize to a draft state that is only visible to their working team.  This design prevents external teams from accidentally referencing incomplete or unauthorized plans.  Typically, the community leaders promote the new concept through appropriate media (e.g., email group).  Suppose the reviewers do not support the change.  In that case, the authors can optionally escalate to the community’s program manager or executive stakeholder.</a:t>
-            </a:r>
-          </a:p>
-          <a:p>
-            <a:pPr marL="0" marR="0">
-              <a:lnSpc>
-                <a:spcPct val="200000"/>
-              </a:lnSpc>
-              <a:spcBef>
-                <a:spcPts val="0"/>
-              </a:spcBef>
-              <a:spcAft>
-                <a:spcPts val="0"/>
-              </a:spcAft>
-            </a:pPr>
-            <a:endParaRPr lang="en-US" sz="1800" dirty="0">
-              <a:effectLst/>
-              <a:latin typeface="Times New Roman" panose="02020603050405020304" pitchFamily="18" charset="0"/>
-              <a:ea typeface="Calibri" panose="020F0502020204030204" pitchFamily="34" charset="0"/>
-            </a:endParaRPr>
-          </a:p>
-          <a:p>
-            <a:pPr marL="0" marR="0">
-              <a:lnSpc>
-                <a:spcPct val="200000"/>
-              </a:lnSpc>
-              <a:spcBef>
-                <a:spcPts val="0"/>
-              </a:spcBef>
-              <a:spcAft>
-                <a:spcPts val="0"/>
-              </a:spcAft>
-            </a:pPr>
-            <a:r>
-              <a:rPr lang="en-US" sz="1800" b="1" dirty="0">
-                <a:effectLst/>
-                <a:latin typeface="Times New Roman" panose="02020603050405020304" pitchFamily="18" charset="0"/>
-                <a:ea typeface="Calibri" panose="020F0502020204030204" pitchFamily="34" charset="0"/>
-              </a:rPr>
-              <a:t>Audit Investment Results</a:t>
-            </a:r>
-          </a:p>
-          <a:p>
-            <a:pPr marL="0" marR="0">
-              <a:lnSpc>
-                <a:spcPct val="200000"/>
-              </a:lnSpc>
-              <a:spcBef>
-                <a:spcPts val="0"/>
-              </a:spcBef>
-              <a:spcAft>
-                <a:spcPts val="0"/>
-              </a:spcAft>
-            </a:pPr>
-            <a:endParaRPr lang="en-US" sz="1800" b="1" dirty="0">
-              <a:effectLst/>
-              <a:latin typeface="Times New Roman" panose="02020603050405020304" pitchFamily="18" charset="0"/>
-              <a:ea typeface="Calibri" panose="020F0502020204030204" pitchFamily="34" charset="0"/>
-            </a:endParaRPr>
-          </a:p>
-          <a:p>
-            <a:pPr marL="0" marR="0" lvl="0" indent="0" algn="l" defTabSz="914400" rtl="0" eaLnBrk="1" fontAlgn="auto" latinLnBrk="0" hangingPunct="1">
-              <a:lnSpc>
-                <a:spcPct val="200000"/>
-              </a:lnSpc>
-              <a:spcBef>
-                <a:spcPts val="0"/>
-              </a:spcBef>
-              <a:spcAft>
-                <a:spcPts val="0"/>
-              </a:spcAft>
-              <a:buClrTx/>
-              <a:buSzTx/>
-              <a:buFontTx/>
-              <a:buNone/>
-              <a:tabLst/>
-              <a:defRPr/>
-            </a:pPr>
-            <a:r>
-              <a:rPr lang="en-US" sz="1800" dirty="0">
-                <a:effectLst/>
-                <a:latin typeface="Times New Roman" panose="02020603050405020304" pitchFamily="18" charset="0"/>
-                <a:ea typeface="Calibri" panose="020F0502020204030204" pitchFamily="34" charset="0"/>
-              </a:rPr>
-              <a:t>Another expectation of the IT steering committee is to audit investments into IT resources (Ali, Green, &amp; Robb, 2015).  Many businesses like NCU-F purchase technology widgets to address challenges and introduce new capabilities.  Though, these widgets can fall to the wayside as new paradigms appear.  For instance, most enterprise data centers have an Apache Hadoop cluster because the platform provides high-available and elasticity.  Managing those environments is challenging, which gave rise to Kubernetes.  Eventually, something cloud-native will supersede Kubernetes.  Each application migration comes with costs and reliability risks.  Businesses must be cognizant of these trade-offs and understand the reasons not to embrace new technologies blindly.</a:t>
-            </a:r>
-          </a:p>
-          <a:p>
-            <a:pPr marL="0" marR="0">
-              <a:lnSpc>
-                <a:spcPct val="200000"/>
-              </a:lnSpc>
-              <a:spcBef>
-                <a:spcPts val="0"/>
-              </a:spcBef>
-              <a:spcAft>
-                <a:spcPts val="0"/>
-              </a:spcAft>
-            </a:pPr>
-            <a:endParaRPr lang="en-US" sz="1800" b="1" dirty="0">
-              <a:effectLst/>
-              <a:latin typeface="Times New Roman" panose="02020603050405020304" pitchFamily="18" charset="0"/>
-              <a:ea typeface="Calibri" panose="020F0502020204030204" pitchFamily="34" charset="0"/>
-            </a:endParaRPr>
-          </a:p>
-          <a:p>
-            <a:endParaRPr lang="en-US" b="1" dirty="0"/>
-          </a:p>
-        </p:txBody>
-      </p:sp>
-      <p:sp>
-        <p:nvSpPr>
-          <p:cNvPr id="4" name="Slide Number Placeholder 3"/>
-          <p:cNvSpPr>
-            <a:spLocks noGrp="1"/>
-          </p:cNvSpPr>
-          <p:nvPr>
-            <p:ph type="sldNum" sz="quarter" idx="5"/>
-          </p:nvPr>
-        </p:nvSpPr>
-        <p:spPr/>
-        <p:txBody>
-          <a:bodyPr/>
-          <a:lstStyle/>
-          <a:p>
-            <a:fld id="{CEE7ED23-8054-42FC-A808-6FDE147C0F4B}" type="slidenum">
-              <a:rPr lang="en-US" smtClean="0"/>
-              <a:t>6</a:t>
-            </a:fld>
-            <a:endParaRPr lang="en-US"/>
-          </a:p>
-        </p:txBody>
-      </p:sp>
-    </p:spTree>
-    <p:extLst>
-      <p:ext uri="{BB962C8B-B14F-4D97-AF65-F5344CB8AC3E}">
-        <p14:creationId xmlns:p14="http://schemas.microsoft.com/office/powerpoint/2010/main" val="3502487265"/>
-      </p:ext>
-    </p:extLst>
-  </p:cSld>
-  <p:clrMapOvr>
-    <a:masterClrMapping/>
-  </p:clrMapOvr>
-</p:notes>
-</file>
-
-<file path=ppt/notesSlides/notesSlide4.xml><?xml version="1.0" encoding="utf-8"?>
-<p:notes xmlns:a="http://schemas.openxmlformats.org/drawingml/2006/main" xmlns:r="http://schemas.openxmlformats.org/officeDocument/2006/relationships" xmlns:p="http://schemas.openxmlformats.org/presentationml/2006/main">
-  <p:cSld>
-    <p:spTree>
-      <p:nvGrpSpPr>
-        <p:cNvPr id="1" name=""/>
-        <p:cNvGrpSpPr/>
-        <p:nvPr/>
-      </p:nvGrpSpPr>
-      <p:grpSpPr>
-        <a:xfrm>
-          <a:off x="0" y="0"/>
-          <a:ext cx="0" cy="0"/>
-          <a:chOff x="0" y="0"/>
-          <a:chExt cx="0" cy="0"/>
-        </a:xfrm>
-      </p:grpSpPr>
-      <p:sp>
-        <p:nvSpPr>
-          <p:cNvPr id="2" name="Slide Image Placeholder 1"/>
-          <p:cNvSpPr>
-            <a:spLocks noGrp="1" noRot="1" noChangeAspect="1"/>
-          </p:cNvSpPr>
-          <p:nvPr>
-            <p:ph type="sldImg"/>
-          </p:nvPr>
-        </p:nvSpPr>
-        <p:spPr/>
-      </p:sp>
-      <p:sp>
-        <p:nvSpPr>
-          <p:cNvPr id="3" name="Notes Placeholder 2"/>
-          <p:cNvSpPr>
-            <a:spLocks noGrp="1"/>
-          </p:cNvSpPr>
-          <p:nvPr>
-            <p:ph type="body" idx="1"/>
-          </p:nvPr>
-        </p:nvSpPr>
-        <p:spPr/>
-        <p:txBody>
-          <a:bodyPr/>
-          <a:lstStyle/>
-          <a:p>
-            <a:pPr marL="0" marR="0">
-              <a:lnSpc>
-                <a:spcPct val="200000"/>
-              </a:lnSpc>
-              <a:spcBef>
-                <a:spcPts val="0"/>
-              </a:spcBef>
-              <a:spcAft>
-                <a:spcPts val="0"/>
-              </a:spcAft>
-            </a:pPr>
-            <a:r>
-              <a:rPr lang="en-US" sz="1800" b="1" dirty="0">
-                <a:effectLst/>
-                <a:latin typeface="Times New Roman" panose="02020603050405020304" pitchFamily="18" charset="0"/>
-              </a:rPr>
-              <a:t>Naming Standards</a:t>
-            </a:r>
-          </a:p>
-          <a:p>
-            <a:pPr marL="0" marR="0">
-              <a:lnSpc>
-                <a:spcPct val="200000"/>
-              </a:lnSpc>
-              <a:spcBef>
-                <a:spcPts val="0"/>
-              </a:spcBef>
-              <a:spcAft>
-                <a:spcPts val="0"/>
-              </a:spcAft>
-            </a:pPr>
-            <a:r>
-              <a:rPr lang="en-US" sz="1800" dirty="0">
-                <a:effectLst/>
-                <a:latin typeface="Times New Roman" panose="02020603050405020304" pitchFamily="18" charset="0"/>
-                <a:ea typeface="Calibri" panose="020F0502020204030204" pitchFamily="34" charset="0"/>
-              </a:rPr>
-              <a:t>Enterprise organizations like NCU-F manage hundreds of thousands to millions of resources.  Historically, individual business units set naming schemas and deferred enforcement to their operations teams.  This strategy enables more autonomy and flexibility in exchange for less organizational consistency.  However, it is challenging to discover, monitor, and react to operational issues without naming conventions and standards.  For example, central alerting rules must explicitly support the various permutations, manifesting complexity throughout the systems management lifecycle.</a:t>
-            </a:r>
-          </a:p>
-          <a:p>
-            <a:pPr marL="0" marR="0">
-              <a:lnSpc>
-                <a:spcPct val="200000"/>
-              </a:lnSpc>
-              <a:spcBef>
-                <a:spcPts val="0"/>
-              </a:spcBef>
-              <a:spcAft>
-                <a:spcPts val="0"/>
-              </a:spcAft>
-            </a:pPr>
-            <a:endParaRPr lang="en-US" sz="1800" dirty="0">
-              <a:effectLst/>
-              <a:latin typeface="Times New Roman" panose="02020603050405020304" pitchFamily="18" charset="0"/>
-              <a:ea typeface="Calibri" panose="020F0502020204030204" pitchFamily="34" charset="0"/>
-            </a:endParaRPr>
-          </a:p>
-          <a:p>
-            <a:pPr marL="0" marR="0">
-              <a:lnSpc>
-                <a:spcPct val="200000"/>
-              </a:lnSpc>
-              <a:spcBef>
-                <a:spcPts val="0"/>
-              </a:spcBef>
-              <a:spcAft>
-                <a:spcPts val="0"/>
-              </a:spcAft>
-            </a:pPr>
-            <a:r>
-              <a:rPr lang="en-US" sz="1800" b="1" dirty="0">
-                <a:effectLst/>
-                <a:latin typeface="Times New Roman" panose="02020603050405020304" pitchFamily="18" charset="0"/>
-              </a:rPr>
-              <a:t>Rejected Solutions</a:t>
-            </a:r>
-          </a:p>
-          <a:p>
-            <a:pPr marL="0" marR="0">
-              <a:lnSpc>
-                <a:spcPct val="200000"/>
-              </a:lnSpc>
-              <a:spcBef>
-                <a:spcPts val="0"/>
-              </a:spcBef>
-              <a:spcAft>
-                <a:spcPts val="0"/>
-              </a:spcAft>
-            </a:pPr>
-            <a:r>
-              <a:rPr lang="en-US" sz="1800" dirty="0">
-                <a:effectLst/>
-                <a:latin typeface="Times New Roman" panose="02020603050405020304" pitchFamily="18" charset="0"/>
-                <a:ea typeface="Calibri" panose="020F0502020204030204" pitchFamily="34" charset="0"/>
-              </a:rPr>
-              <a:t>Nevertheless, renaming every object is prohibitively expensive.  The enterprise could embark upon prolonged migration that seeks to reach a point of eventual consistency.  During the transition phase, department leaders prioritize shared resources over internal implementation details.  For instance, the edge router into the Credit team’s app must be discoverable by all NCU-F personal.  In contrast, a smaller cohort must interact with traffic policies within the Credit team’s private subnets.  Since the team size directly impacts its ability to support a custom vocabulary, this dimension forms a natural sorting order.</a:t>
-            </a:r>
-          </a:p>
-          <a:p>
-            <a:pPr marL="0" marR="0">
-              <a:lnSpc>
-                <a:spcPct val="200000"/>
-              </a:lnSpc>
-              <a:spcBef>
-                <a:spcPts val="0"/>
-              </a:spcBef>
-              <a:spcAft>
-                <a:spcPts val="0"/>
-              </a:spcAft>
-            </a:pPr>
-            <a:endParaRPr lang="en-US" sz="1800" dirty="0">
-              <a:effectLst/>
-              <a:latin typeface="Times New Roman" panose="02020603050405020304" pitchFamily="18" charset="0"/>
-              <a:ea typeface="Calibri" panose="020F0502020204030204" pitchFamily="34" charset="0"/>
-            </a:endParaRPr>
-          </a:p>
-          <a:p>
-            <a:pPr marL="0" marR="0">
-              <a:lnSpc>
-                <a:spcPct val="200000"/>
-              </a:lnSpc>
-              <a:spcBef>
-                <a:spcPts val="0"/>
-              </a:spcBef>
-              <a:spcAft>
-                <a:spcPts val="0"/>
-              </a:spcAft>
-            </a:pPr>
-            <a:r>
-              <a:rPr lang="en-US" sz="1800" b="1" dirty="0">
-                <a:effectLst/>
-                <a:latin typeface="Times New Roman" panose="02020603050405020304" pitchFamily="18" charset="0"/>
-              </a:rPr>
-              <a:t>Accepted Solution</a:t>
-            </a:r>
-          </a:p>
-          <a:p>
-            <a:pPr marL="0" marR="0">
-              <a:lnSpc>
-                <a:spcPct val="200000"/>
-              </a:lnSpc>
-              <a:spcBef>
-                <a:spcPts val="0"/>
-              </a:spcBef>
-              <a:spcAft>
-                <a:spcPts val="0"/>
-              </a:spcAft>
-            </a:pPr>
-            <a:r>
-              <a:rPr lang="en-US" sz="1800" b="0" dirty="0">
-                <a:effectLst/>
-                <a:latin typeface="Times New Roman" panose="02020603050405020304" pitchFamily="18" charset="0"/>
-                <a:ea typeface="Calibri" panose="020F0502020204030204" pitchFamily="34" charset="0"/>
-              </a:rPr>
-              <a:t>H</a:t>
-            </a:r>
-            <a:r>
-              <a:rPr lang="en-US" sz="1800" dirty="0">
-                <a:effectLst/>
-                <a:latin typeface="Times New Roman" panose="02020603050405020304" pitchFamily="18" charset="0"/>
-                <a:ea typeface="Calibri" panose="020F0502020204030204" pitchFamily="34" charset="0"/>
-              </a:rPr>
-              <a:t>owever, the time to reach organizational consistency can become too costly as well.  The operational and engineering teams will surely encounter feature regression risk, and the customer will not see any direct value.  Furthermore, the hybrid state will disrupt the existing team vocabularies and cause unnecessary pain.  NCU-F wants to avoid these scenarios and is willing to accept the technical debt.  This decision pushes the organization toward standardizing the metadata associated with the various resources (Harper, 2019).  That metadata can reside within Enterprise Resource Management Systems (ERMS), which meets the discovery and monitoring requirements.  Additionally, third-party tools exist for bulk importing resources and enabling version control capabilities.</a:t>
-            </a:r>
-          </a:p>
-          <a:p>
-            <a:pPr marL="0" marR="0">
-              <a:lnSpc>
-                <a:spcPct val="200000"/>
-              </a:lnSpc>
-              <a:spcBef>
-                <a:spcPts val="0"/>
-              </a:spcBef>
-              <a:spcAft>
-                <a:spcPts val="0"/>
-              </a:spcAft>
-            </a:pPr>
-            <a:endParaRPr lang="en-US" sz="1800" b="1" dirty="0">
-              <a:effectLst/>
-              <a:latin typeface="Times New Roman" panose="02020603050405020304" pitchFamily="18" charset="0"/>
-            </a:endParaRPr>
-          </a:p>
-          <a:p>
-            <a:pPr marL="0" marR="0">
-              <a:lnSpc>
-                <a:spcPct val="200000"/>
-              </a:lnSpc>
-              <a:spcBef>
-                <a:spcPts val="0"/>
-              </a:spcBef>
-              <a:spcAft>
-                <a:spcPts val="0"/>
-              </a:spcAft>
-            </a:pPr>
-            <a:r>
-              <a:rPr lang="en-US" sz="1800" b="1" dirty="0">
-                <a:effectLst/>
-                <a:latin typeface="Times New Roman" panose="02020603050405020304" pitchFamily="18" charset="0"/>
-              </a:rPr>
-              <a:t>Resource Hierarchy</a:t>
-            </a:r>
-          </a:p>
-          <a:p>
-            <a:pPr marL="0" marR="0">
-              <a:lnSpc>
-                <a:spcPct val="200000"/>
-              </a:lnSpc>
-              <a:spcBef>
-                <a:spcPts val="0"/>
-              </a:spcBef>
-              <a:spcAft>
-                <a:spcPts val="0"/>
-              </a:spcAft>
-            </a:pPr>
-            <a:r>
-              <a:rPr lang="en-US" sz="1800" dirty="0">
-                <a:effectLst/>
-                <a:latin typeface="Times New Roman" panose="02020603050405020304" pitchFamily="18" charset="0"/>
-                <a:ea typeface="Calibri" panose="020F0502020204030204" pitchFamily="34" charset="0"/>
-              </a:rPr>
-              <a:t>NCU-F requires business units to record their resources within the central ERMS database.  The database utilizes a hierarchical structure with strict rules where resource definitions can reside (Table 2).  For instance, all routers exist under the namespace /devices/routers, and all workstations follow the format /domain policies/workstations.  </a:t>
-            </a:r>
-          </a:p>
-          <a:p>
-            <a:pPr marL="0" marR="0">
-              <a:lnSpc>
-                <a:spcPct val="200000"/>
-              </a:lnSpc>
-              <a:spcBef>
-                <a:spcPts val="0"/>
-              </a:spcBef>
-              <a:spcAft>
-                <a:spcPts val="0"/>
-              </a:spcAft>
-            </a:pPr>
-            <a:endParaRPr lang="en-US" sz="1800" b="1" dirty="0">
-              <a:effectLst/>
-              <a:latin typeface="Times New Roman" panose="02020603050405020304" pitchFamily="18" charset="0"/>
-            </a:endParaRPr>
-          </a:p>
-          <a:p>
-            <a:pPr marL="0" marR="0">
-              <a:lnSpc>
-                <a:spcPct val="200000"/>
-              </a:lnSpc>
-              <a:spcBef>
-                <a:spcPts val="0"/>
-              </a:spcBef>
-              <a:spcAft>
-                <a:spcPts val="0"/>
-              </a:spcAft>
-            </a:pPr>
-            <a:r>
-              <a:rPr lang="en-US" sz="1800" b="1" dirty="0">
-                <a:effectLst/>
-                <a:latin typeface="Times New Roman" panose="02020603050405020304" pitchFamily="18" charset="0"/>
-              </a:rPr>
-              <a:t>Mandatory Tags</a:t>
-            </a:r>
-          </a:p>
-          <a:p>
-            <a:pPr marL="0" marR="0">
-              <a:lnSpc>
-                <a:spcPct val="200000"/>
-              </a:lnSpc>
-              <a:spcBef>
-                <a:spcPts val="0"/>
-              </a:spcBef>
-              <a:spcAft>
-                <a:spcPts val="0"/>
-              </a:spcAft>
-            </a:pPr>
-            <a:r>
-              <a:rPr lang="en-US" sz="1800" dirty="0">
-                <a:effectLst/>
-                <a:latin typeface="Times New Roman" panose="02020603050405020304" pitchFamily="18" charset="0"/>
-                <a:ea typeface="Calibri" panose="020F0502020204030204" pitchFamily="34" charset="0"/>
-              </a:rPr>
-              <a:t>After declaring the resource, operations staff must add several resource-type specific mandatory tags (Table 3).  Optionally, the team can include arbitrary additional tags to align with legacy asset management processes.  Data validation processes periodically assess the metadata and report inaccurate or incomplete information.  It is the responsibility of the owning team to remediate the issue promptly.</a:t>
-            </a:r>
-          </a:p>
-        </p:txBody>
-      </p:sp>
-      <p:sp>
-        <p:nvSpPr>
-          <p:cNvPr id="4" name="Slide Number Placeholder 3"/>
-          <p:cNvSpPr>
-            <a:spLocks noGrp="1"/>
-          </p:cNvSpPr>
-          <p:nvPr>
-            <p:ph type="sldNum" sz="quarter" idx="5"/>
-          </p:nvPr>
-        </p:nvSpPr>
-        <p:spPr/>
-        <p:txBody>
-          <a:bodyPr/>
-          <a:lstStyle/>
-          <a:p>
-            <a:fld id="{CEE7ED23-8054-42FC-A808-6FDE147C0F4B}" type="slidenum">
-              <a:rPr lang="en-US" smtClean="0"/>
-              <a:t>7</a:t>
-            </a:fld>
-            <a:endParaRPr lang="en-US"/>
-          </a:p>
-        </p:txBody>
-      </p:sp>
-    </p:spTree>
-    <p:extLst>
-      <p:ext uri="{BB962C8B-B14F-4D97-AF65-F5344CB8AC3E}">
-        <p14:creationId xmlns:p14="http://schemas.microsoft.com/office/powerpoint/2010/main" val="1180685283"/>
-      </p:ext>
-    </p:extLst>
-  </p:cSld>
-  <p:clrMapOvr>
-    <a:masterClrMapping/>
-  </p:clrMapOvr>
-</p:notes>
-</file>
-
-<file path=ppt/notesSlides/notesSlide5.xml><?xml version="1.0" encoding="utf-8"?>
+<file path=ppt/notesSlides/notesSlide11.xml><?xml version="1.0" encoding="utf-8"?>
 <p:notes xmlns:a="http://schemas.openxmlformats.org/drawingml/2006/main" xmlns:r="http://schemas.openxmlformats.org/officeDocument/2006/relationships" xmlns:p="http://schemas.openxmlformats.org/presentationml/2006/main">
   <p:cSld>
     <p:spTree>
@@ -33124,7 +32386,7 @@
 </p:notes>
 </file>
 
-<file path=ppt/notesSlides/notesSlide6.xml><?xml version="1.0" encoding="utf-8"?>
+<file path=ppt/notesSlides/notesSlide12.xml><?xml version="1.0" encoding="utf-8"?>
 <p:notes xmlns:a="http://schemas.openxmlformats.org/drawingml/2006/main" xmlns:r="http://schemas.openxmlformats.org/officeDocument/2006/relationships" xmlns:p="http://schemas.openxmlformats.org/presentationml/2006/main">
   <p:cSld>
     <p:spTree>
@@ -33215,7 +32477,7 @@
 </p:notes>
 </file>
 
-<file path=ppt/notesSlides/notesSlide7.xml><?xml version="1.0" encoding="utf-8"?>
+<file path=ppt/notesSlides/notesSlide13.xml><?xml version="1.0" encoding="utf-8"?>
 <p:notes xmlns:a="http://schemas.openxmlformats.org/drawingml/2006/main" xmlns:r="http://schemas.openxmlformats.org/officeDocument/2006/relationships" xmlns:p="http://schemas.openxmlformats.org/presentationml/2006/main">
   <p:cSld>
     <p:spTree>
@@ -33290,6 +32552,2978 @@
     <p:extLst>
       <p:ext uri="{BB962C8B-B14F-4D97-AF65-F5344CB8AC3E}">
         <p14:creationId xmlns:p14="http://schemas.microsoft.com/office/powerpoint/2010/main" val="917252190"/>
+      </p:ext>
+    </p:extLst>
+  </p:cSld>
+  <p:clrMapOvr>
+    <a:masterClrMapping/>
+  </p:clrMapOvr>
+</p:notes>
+</file>
+
+<file path=ppt/notesSlides/notesSlide2.xml><?xml version="1.0" encoding="utf-8"?>
+<p:notes xmlns:a="http://schemas.openxmlformats.org/drawingml/2006/main" xmlns:r="http://schemas.openxmlformats.org/officeDocument/2006/relationships" xmlns:p="http://schemas.openxmlformats.org/presentationml/2006/main">
+  <p:cSld>
+    <p:spTree>
+      <p:nvGrpSpPr>
+        <p:cNvPr id="1" name=""/>
+        <p:cNvGrpSpPr/>
+        <p:nvPr/>
+      </p:nvGrpSpPr>
+      <p:grpSpPr>
+        <a:xfrm>
+          <a:off x="0" y="0"/>
+          <a:ext cx="0" cy="0"/>
+          <a:chOff x="0" y="0"/>
+          <a:chExt cx="0" cy="0"/>
+        </a:xfrm>
+      </p:grpSpPr>
+      <p:sp>
+        <p:nvSpPr>
+          <p:cNvPr id="2" name="Slide Image Placeholder 1"/>
+          <p:cNvSpPr>
+            <a:spLocks noGrp="1" noRot="1" noChangeAspect="1"/>
+          </p:cNvSpPr>
+          <p:nvPr>
+            <p:ph type="sldImg"/>
+          </p:nvPr>
+        </p:nvSpPr>
+        <p:spPr/>
+      </p:sp>
+      <p:sp>
+        <p:nvSpPr>
+          <p:cNvPr id="3" name="Notes Placeholder 2"/>
+          <p:cNvSpPr>
+            <a:spLocks noGrp="1"/>
+          </p:cNvSpPr>
+          <p:nvPr>
+            <p:ph type="body" idx="1"/>
+          </p:nvPr>
+        </p:nvSpPr>
+        <p:spPr/>
+        <p:txBody>
+          <a:bodyPr/>
+          <a:lstStyle/>
+          <a:p>
+            <a:pPr marL="342900" marR="0" lvl="0" indent="-342900">
+              <a:lnSpc>
+                <a:spcPct val="107000"/>
+              </a:lnSpc>
+              <a:spcBef>
+                <a:spcPts val="0"/>
+              </a:spcBef>
+              <a:spcAft>
+                <a:spcPts val="0"/>
+              </a:spcAft>
+              <a:buFont typeface="Symbol" panose="05050102010706020507" pitchFamily="18" charset="2"/>
+              <a:buChar char=""/>
+            </a:pPr>
+            <a:r>
+              <a:rPr lang="en-US" sz="1800" dirty="0">
+                <a:effectLst/>
+                <a:latin typeface="Calibri" panose="020F0502020204030204" pitchFamily="34" charset="0"/>
+                <a:ea typeface="Calibri" panose="020F0502020204030204" pitchFamily="34" charset="0"/>
+                <a:cs typeface="Times New Roman" panose="02020603050405020304" pitchFamily="18" charset="0"/>
+              </a:rPr>
+              <a:t>Today we will be covering a breadth of topics</a:t>
+            </a:r>
+          </a:p>
+          <a:p>
+            <a:pPr marL="342900" marR="0" lvl="0" indent="-342900">
+              <a:lnSpc>
+                <a:spcPct val="107000"/>
+              </a:lnSpc>
+              <a:spcBef>
+                <a:spcPts val="0"/>
+              </a:spcBef>
+              <a:spcAft>
+                <a:spcPts val="0"/>
+              </a:spcAft>
+              <a:buFont typeface="Symbol" panose="05050102010706020507" pitchFamily="18" charset="2"/>
+              <a:buChar char=""/>
+            </a:pPr>
+            <a:r>
+              <a:rPr lang="en-US" sz="1800" dirty="0">
+                <a:effectLst/>
+                <a:latin typeface="Calibri" panose="020F0502020204030204" pitchFamily="34" charset="0"/>
+                <a:ea typeface="Calibri" panose="020F0502020204030204" pitchFamily="34" charset="0"/>
+                <a:cs typeface="Times New Roman" panose="02020603050405020304" pitchFamily="18" charset="0"/>
+              </a:rPr>
+              <a:t>First, we will review both our mission and problem statement</a:t>
+            </a:r>
+          </a:p>
+          <a:p>
+            <a:pPr marL="342900" marR="0" lvl="0" indent="-342900">
+              <a:lnSpc>
+                <a:spcPct val="107000"/>
+              </a:lnSpc>
+              <a:spcBef>
+                <a:spcPts val="0"/>
+              </a:spcBef>
+              <a:spcAft>
+                <a:spcPts val="0"/>
+              </a:spcAft>
+              <a:buFont typeface="Symbol" panose="05050102010706020507" pitchFamily="18" charset="2"/>
+              <a:buChar char=""/>
+            </a:pPr>
+            <a:r>
+              <a:rPr lang="en-US" sz="1800" dirty="0">
+                <a:effectLst/>
+                <a:latin typeface="Calibri" panose="020F0502020204030204" pitchFamily="34" charset="0"/>
+                <a:ea typeface="Calibri" panose="020F0502020204030204" pitchFamily="34" charset="0"/>
+                <a:cs typeface="Times New Roman" panose="02020603050405020304" pitchFamily="18" charset="0"/>
+              </a:rPr>
+              <a:t>Following that is a discussion on our strategic approach</a:t>
+            </a:r>
+          </a:p>
+          <a:p>
+            <a:pPr marL="342900" marR="0" lvl="0" indent="-342900">
+              <a:lnSpc>
+                <a:spcPct val="107000"/>
+              </a:lnSpc>
+              <a:spcBef>
+                <a:spcPts val="0"/>
+              </a:spcBef>
+              <a:spcAft>
+                <a:spcPts val="0"/>
+              </a:spcAft>
+              <a:buFont typeface="Symbol" panose="05050102010706020507" pitchFamily="18" charset="2"/>
+              <a:buChar char=""/>
+            </a:pPr>
+            <a:r>
+              <a:rPr lang="en-US" sz="1800" dirty="0">
+                <a:effectLst/>
+                <a:latin typeface="Calibri" panose="020F0502020204030204" pitchFamily="34" charset="0"/>
+                <a:ea typeface="Calibri" panose="020F0502020204030204" pitchFamily="34" charset="0"/>
+                <a:cs typeface="Times New Roman" panose="02020603050405020304" pitchFamily="18" charset="0"/>
+              </a:rPr>
+              <a:t>Then during the Policy design and implementation section </a:t>
+            </a:r>
+          </a:p>
+          <a:p>
+            <a:pPr marL="342900" marR="0" lvl="0" indent="-342900">
+              <a:lnSpc>
+                <a:spcPct val="107000"/>
+              </a:lnSpc>
+              <a:spcBef>
+                <a:spcPts val="0"/>
+              </a:spcBef>
+              <a:spcAft>
+                <a:spcPts val="800"/>
+              </a:spcAft>
+              <a:buFont typeface="Symbol" panose="05050102010706020507" pitchFamily="18" charset="2"/>
+              <a:buChar char=""/>
+            </a:pPr>
+            <a:r>
+              <a:rPr lang="en-US" sz="1800" dirty="0">
+                <a:effectLst/>
+                <a:latin typeface="Calibri" panose="020F0502020204030204" pitchFamily="34" charset="0"/>
+                <a:ea typeface="Calibri" panose="020F0502020204030204" pitchFamily="34" charset="0"/>
+                <a:cs typeface="Times New Roman" panose="02020603050405020304" pitchFamily="18" charset="0"/>
+              </a:rPr>
+              <a:t>Finally concluding with roadmap timelines, budgeting, and our call to action</a:t>
+            </a:r>
+          </a:p>
+          <a:p>
+            <a:endParaRPr lang="en-US" dirty="0"/>
+          </a:p>
+        </p:txBody>
+      </p:sp>
+      <p:sp>
+        <p:nvSpPr>
+          <p:cNvPr id="4" name="Slide Number Placeholder 3"/>
+          <p:cNvSpPr>
+            <a:spLocks noGrp="1"/>
+          </p:cNvSpPr>
+          <p:nvPr>
+            <p:ph type="sldNum" sz="quarter" idx="5"/>
+          </p:nvPr>
+        </p:nvSpPr>
+        <p:spPr/>
+        <p:txBody>
+          <a:bodyPr/>
+          <a:lstStyle/>
+          <a:p>
+            <a:fld id="{CEE7ED23-8054-42FC-A808-6FDE147C0F4B}" type="slidenum">
+              <a:rPr lang="en-US" smtClean="0"/>
+              <a:t>2</a:t>
+            </a:fld>
+            <a:endParaRPr lang="en-US"/>
+          </a:p>
+        </p:txBody>
+      </p:sp>
+    </p:spTree>
+    <p:extLst>
+      <p:ext uri="{BB962C8B-B14F-4D97-AF65-F5344CB8AC3E}">
+        <p14:creationId xmlns:p14="http://schemas.microsoft.com/office/powerpoint/2010/main" val="2271939296"/>
+      </p:ext>
+    </p:extLst>
+  </p:cSld>
+  <p:clrMapOvr>
+    <a:masterClrMapping/>
+  </p:clrMapOvr>
+</p:notes>
+</file>
+
+<file path=ppt/notesSlides/notesSlide3.xml><?xml version="1.0" encoding="utf-8"?>
+<p:notes xmlns:a="http://schemas.openxmlformats.org/drawingml/2006/main" xmlns:r="http://schemas.openxmlformats.org/officeDocument/2006/relationships" xmlns:p="http://schemas.openxmlformats.org/presentationml/2006/main">
+  <p:cSld>
+    <p:spTree>
+      <p:nvGrpSpPr>
+        <p:cNvPr id="1" name=""/>
+        <p:cNvGrpSpPr/>
+        <p:nvPr/>
+      </p:nvGrpSpPr>
+      <p:grpSpPr>
+        <a:xfrm>
+          <a:off x="0" y="0"/>
+          <a:ext cx="0" cy="0"/>
+          <a:chOff x="0" y="0"/>
+          <a:chExt cx="0" cy="0"/>
+        </a:xfrm>
+      </p:grpSpPr>
+      <p:sp>
+        <p:nvSpPr>
+          <p:cNvPr id="2" name="Slide Image Placeholder 1"/>
+          <p:cNvSpPr>
+            <a:spLocks noGrp="1" noRot="1" noChangeAspect="1"/>
+          </p:cNvSpPr>
+          <p:nvPr>
+            <p:ph type="sldImg"/>
+          </p:nvPr>
+        </p:nvSpPr>
+        <p:spPr/>
+      </p:sp>
+      <p:sp>
+        <p:nvSpPr>
+          <p:cNvPr id="3" name="Notes Placeholder 2"/>
+          <p:cNvSpPr>
+            <a:spLocks noGrp="1"/>
+          </p:cNvSpPr>
+          <p:nvPr>
+            <p:ph type="body" idx="1"/>
+          </p:nvPr>
+        </p:nvSpPr>
+        <p:spPr/>
+        <p:txBody>
+          <a:bodyPr/>
+          <a:lstStyle/>
+          <a:p>
+            <a:pPr marL="342900" marR="0" lvl="0" indent="-342900">
+              <a:lnSpc>
+                <a:spcPct val="107000"/>
+              </a:lnSpc>
+              <a:spcBef>
+                <a:spcPts val="0"/>
+              </a:spcBef>
+              <a:spcAft>
+                <a:spcPts val="0"/>
+              </a:spcAft>
+              <a:buFont typeface="Symbol" panose="05050102010706020507" pitchFamily="18" charset="2"/>
+              <a:buChar char=""/>
+            </a:pPr>
+            <a:r>
+              <a:rPr lang="en-US" sz="1800" dirty="0">
+                <a:effectLst/>
+                <a:latin typeface="Calibri" panose="020F0502020204030204" pitchFamily="34" charset="0"/>
+                <a:ea typeface="Calibri" panose="020F0502020204030204" pitchFamily="34" charset="0"/>
+                <a:cs typeface="Times New Roman" panose="02020603050405020304" pitchFamily="18" charset="0"/>
+              </a:rPr>
+              <a:t>Our goal is to provide the best customer experience.</a:t>
+            </a:r>
+          </a:p>
+          <a:p>
+            <a:pPr marL="342900" marR="0" lvl="0" indent="-342900">
+              <a:lnSpc>
+                <a:spcPct val="107000"/>
+              </a:lnSpc>
+              <a:spcBef>
+                <a:spcPts val="0"/>
+              </a:spcBef>
+              <a:spcAft>
+                <a:spcPts val="0"/>
+              </a:spcAft>
+              <a:buFont typeface="Symbol" panose="05050102010706020507" pitchFamily="18" charset="2"/>
+              <a:buChar char=""/>
+            </a:pPr>
+            <a:r>
+              <a:rPr lang="en-US" sz="1800" dirty="0">
+                <a:effectLst/>
+                <a:latin typeface="Calibri" panose="020F0502020204030204" pitchFamily="34" charset="0"/>
+                <a:ea typeface="Calibri" panose="020F0502020204030204" pitchFamily="34" charset="0"/>
+                <a:cs typeface="Times New Roman" panose="02020603050405020304" pitchFamily="18" charset="0"/>
+              </a:rPr>
+              <a:t>This requires a long-term focus on sustainable value</a:t>
+            </a:r>
+          </a:p>
+          <a:p>
+            <a:pPr marL="342900" marR="0" lvl="0" indent="-342900">
+              <a:lnSpc>
+                <a:spcPct val="107000"/>
+              </a:lnSpc>
+              <a:spcBef>
+                <a:spcPts val="0"/>
+              </a:spcBef>
+              <a:spcAft>
+                <a:spcPts val="800"/>
+              </a:spcAft>
+              <a:buFont typeface="Symbol" panose="05050102010706020507" pitchFamily="18" charset="2"/>
+              <a:buChar char=""/>
+            </a:pPr>
+            <a:r>
+              <a:rPr lang="en-US" sz="1800" dirty="0">
+                <a:effectLst/>
+                <a:latin typeface="Calibri" panose="020F0502020204030204" pitchFamily="34" charset="0"/>
+                <a:ea typeface="Calibri" panose="020F0502020204030204" pitchFamily="34" charset="0"/>
+                <a:cs typeface="Times New Roman" panose="02020603050405020304" pitchFamily="18" charset="0"/>
+              </a:rPr>
+              <a:t>We plan to continue growing into the #1 global name in banking</a:t>
+            </a:r>
+          </a:p>
+          <a:p>
+            <a:endParaRPr lang="en-US" sz="1800" dirty="0">
+              <a:effectLst/>
+              <a:latin typeface="Times New Roman" panose="02020603050405020304" pitchFamily="18" charset="0"/>
+              <a:ea typeface="Calibri" panose="020F0502020204030204" pitchFamily="34" charset="0"/>
+            </a:endParaRPr>
+          </a:p>
+          <a:p>
+            <a:endParaRPr lang="en-US" sz="1800" dirty="0">
+              <a:effectLst/>
+              <a:latin typeface="Times New Roman" panose="02020603050405020304" pitchFamily="18" charset="0"/>
+              <a:ea typeface="Calibri" panose="020F0502020204030204" pitchFamily="34" charset="0"/>
+            </a:endParaRPr>
+          </a:p>
+          <a:p>
+            <a:endParaRPr lang="en-US" sz="1800" dirty="0">
+              <a:effectLst/>
+              <a:latin typeface="Times New Roman" panose="02020603050405020304" pitchFamily="18" charset="0"/>
+              <a:ea typeface="Calibri" panose="020F0502020204030204" pitchFamily="34" charset="0"/>
+            </a:endParaRPr>
+          </a:p>
+          <a:p>
+            <a:endParaRPr lang="en-US" sz="1800" dirty="0">
+              <a:effectLst/>
+              <a:latin typeface="Times New Roman" panose="02020603050405020304" pitchFamily="18" charset="0"/>
+              <a:ea typeface="Calibri" panose="020F0502020204030204" pitchFamily="34" charset="0"/>
+            </a:endParaRPr>
+          </a:p>
+          <a:p>
+            <a:r>
+              <a:rPr lang="en-US" sz="1800" dirty="0">
+                <a:effectLst/>
+                <a:latin typeface="Times New Roman" panose="02020603050405020304" pitchFamily="18" charset="0"/>
+                <a:ea typeface="Calibri" panose="020F0502020204030204" pitchFamily="34" charset="0"/>
+              </a:rPr>
+              <a:t>NCU-F democratizes financial serves through a comprehensive portfolio of capabilities.  The company’s founders found that existing banking services were not inclusive, often penalizing small account holders with arbitrary fees.  While this approach is profitable, it does not create a positive customer experience or lead to a sustainable business model.  This long-term focus earned the organization a broad customer base, which fuels its ability to acquire innovative competitors.  Today, the business has numerous financial products that exist as application silos without a consistent interface.  Instead, NCU-F envisions modernizing these systems to improve cross-selling, reduce operational overhead, and standardize the experience.  These capabilities would benefit the organization and its customers. </a:t>
+            </a:r>
+            <a:endParaRPr lang="en-US" dirty="0"/>
+          </a:p>
+        </p:txBody>
+      </p:sp>
+      <p:sp>
+        <p:nvSpPr>
+          <p:cNvPr id="4" name="Slide Number Placeholder 3"/>
+          <p:cNvSpPr>
+            <a:spLocks noGrp="1"/>
+          </p:cNvSpPr>
+          <p:nvPr>
+            <p:ph type="sldNum" sz="quarter" idx="5"/>
+          </p:nvPr>
+        </p:nvSpPr>
+        <p:spPr/>
+        <p:txBody>
+          <a:bodyPr/>
+          <a:lstStyle/>
+          <a:p>
+            <a:fld id="{CEE7ED23-8054-42FC-A808-6FDE147C0F4B}" type="slidenum">
+              <a:rPr lang="en-US" smtClean="0"/>
+              <a:t>3</a:t>
+            </a:fld>
+            <a:endParaRPr lang="en-US"/>
+          </a:p>
+        </p:txBody>
+      </p:sp>
+    </p:spTree>
+    <p:extLst>
+      <p:ext uri="{BB962C8B-B14F-4D97-AF65-F5344CB8AC3E}">
+        <p14:creationId xmlns:p14="http://schemas.microsoft.com/office/powerpoint/2010/main" val="2611245531"/>
+      </p:ext>
+    </p:extLst>
+  </p:cSld>
+  <p:clrMapOvr>
+    <a:masterClrMapping/>
+  </p:clrMapOvr>
+</p:notes>
+</file>
+
+<file path=ppt/notesSlides/notesSlide4.xml><?xml version="1.0" encoding="utf-8"?>
+<p:notes xmlns:a="http://schemas.openxmlformats.org/drawingml/2006/main" xmlns:r="http://schemas.openxmlformats.org/officeDocument/2006/relationships" xmlns:p="http://schemas.openxmlformats.org/presentationml/2006/main">
+  <p:cSld>
+    <p:spTree>
+      <p:nvGrpSpPr>
+        <p:cNvPr id="1" name=""/>
+        <p:cNvGrpSpPr/>
+        <p:nvPr/>
+      </p:nvGrpSpPr>
+      <p:grpSpPr>
+        <a:xfrm>
+          <a:off x="0" y="0"/>
+          <a:ext cx="0" cy="0"/>
+          <a:chOff x="0" y="0"/>
+          <a:chExt cx="0" cy="0"/>
+        </a:xfrm>
+      </p:grpSpPr>
+      <p:sp>
+        <p:nvSpPr>
+          <p:cNvPr id="2" name="Slide Image Placeholder 1"/>
+          <p:cNvSpPr>
+            <a:spLocks noGrp="1" noRot="1" noChangeAspect="1"/>
+          </p:cNvSpPr>
+          <p:nvPr>
+            <p:ph type="sldImg"/>
+          </p:nvPr>
+        </p:nvSpPr>
+        <p:spPr/>
+      </p:sp>
+      <p:sp>
+        <p:nvSpPr>
+          <p:cNvPr id="3" name="Notes Placeholder 2"/>
+          <p:cNvSpPr>
+            <a:spLocks noGrp="1"/>
+          </p:cNvSpPr>
+          <p:nvPr>
+            <p:ph type="body" idx="1"/>
+          </p:nvPr>
+        </p:nvSpPr>
+        <p:spPr/>
+        <p:txBody>
+          <a:bodyPr/>
+          <a:lstStyle/>
+          <a:p>
+            <a:pPr marL="342900" marR="0" lvl="0" indent="-342900">
+              <a:lnSpc>
+                <a:spcPct val="107000"/>
+              </a:lnSpc>
+              <a:spcBef>
+                <a:spcPts val="0"/>
+              </a:spcBef>
+              <a:spcAft>
+                <a:spcPts val="0"/>
+              </a:spcAft>
+              <a:buFont typeface="Symbol" panose="05050102010706020507" pitchFamily="18" charset="2"/>
+              <a:buChar char=""/>
+            </a:pPr>
+            <a:r>
+              <a:rPr lang="en-US" sz="1100" dirty="0">
+                <a:effectLst/>
+                <a:latin typeface="Calibri" panose="020F0502020204030204" pitchFamily="34" charset="0"/>
+                <a:ea typeface="Calibri" panose="020F0502020204030204" pitchFamily="34" charset="0"/>
+                <a:cs typeface="Times New Roman" panose="02020603050405020304" pitchFamily="18" charset="0"/>
+              </a:rPr>
+              <a:t>Over the past decade we experienced aggressive growth through acquisition</a:t>
+            </a:r>
+          </a:p>
+          <a:p>
+            <a:pPr marL="742950" marR="0" lvl="1" indent="-285750">
+              <a:lnSpc>
+                <a:spcPct val="107000"/>
+              </a:lnSpc>
+              <a:spcBef>
+                <a:spcPts val="0"/>
+              </a:spcBef>
+              <a:spcAft>
+                <a:spcPts val="0"/>
+              </a:spcAft>
+              <a:buFont typeface="Courier New" panose="02070309020205020404" pitchFamily="49" charset="0"/>
+              <a:buChar char="o"/>
+            </a:pPr>
+            <a:r>
+              <a:rPr lang="en-US" sz="1100" dirty="0">
+                <a:effectLst/>
+                <a:latin typeface="Calibri" panose="020F0502020204030204" pitchFamily="34" charset="0"/>
+                <a:ea typeface="Calibri" panose="020F0502020204030204" pitchFamily="34" charset="0"/>
+                <a:cs typeface="Times New Roman" panose="02020603050405020304" pitchFamily="18" charset="0"/>
+              </a:rPr>
+              <a:t>This approach enables us to quickly roll out new technologies</a:t>
+            </a:r>
+          </a:p>
+          <a:p>
+            <a:pPr marL="342900" marR="0" lvl="0" indent="-342900">
+              <a:lnSpc>
+                <a:spcPct val="107000"/>
+              </a:lnSpc>
+              <a:spcBef>
+                <a:spcPts val="0"/>
+              </a:spcBef>
+              <a:spcAft>
+                <a:spcPts val="0"/>
+              </a:spcAft>
+              <a:buFont typeface="Symbol" panose="05050102010706020507" pitchFamily="18" charset="2"/>
+              <a:buChar char=""/>
+            </a:pPr>
+            <a:r>
+              <a:rPr lang="en-US" sz="1100" dirty="0">
+                <a:effectLst/>
+                <a:latin typeface="Calibri" panose="020F0502020204030204" pitchFamily="34" charset="0"/>
+                <a:ea typeface="Calibri" panose="020F0502020204030204" pitchFamily="34" charset="0"/>
+                <a:cs typeface="Times New Roman" panose="02020603050405020304" pitchFamily="18" charset="0"/>
+              </a:rPr>
+              <a:t>But it has also led to a fragmented infrastructure</a:t>
+            </a:r>
+          </a:p>
+          <a:p>
+            <a:pPr marL="742950" marR="0" lvl="1" indent="-285750">
+              <a:lnSpc>
+                <a:spcPct val="107000"/>
+              </a:lnSpc>
+              <a:spcBef>
+                <a:spcPts val="0"/>
+              </a:spcBef>
+              <a:spcAft>
+                <a:spcPts val="0"/>
+              </a:spcAft>
+              <a:buFont typeface="Courier New" panose="02070309020205020404" pitchFamily="49" charset="0"/>
+              <a:buChar char="o"/>
+            </a:pPr>
+            <a:r>
+              <a:rPr lang="en-US" sz="1100" dirty="0">
+                <a:effectLst/>
+                <a:latin typeface="Calibri" panose="020F0502020204030204" pitchFamily="34" charset="0"/>
+                <a:ea typeface="Calibri" panose="020F0502020204030204" pitchFamily="34" charset="0"/>
+                <a:cs typeface="Times New Roman" panose="02020603050405020304" pitchFamily="18" charset="0"/>
+              </a:rPr>
+              <a:t>Each acquisition has its own policies and procedures</a:t>
+            </a:r>
+          </a:p>
+          <a:p>
+            <a:pPr marL="742950" marR="0" lvl="1" indent="-285750">
+              <a:lnSpc>
+                <a:spcPct val="107000"/>
+              </a:lnSpc>
+              <a:spcBef>
+                <a:spcPts val="0"/>
+              </a:spcBef>
+              <a:spcAft>
+                <a:spcPts val="0"/>
+              </a:spcAft>
+              <a:buFont typeface="Courier New" panose="02070309020205020404" pitchFamily="49" charset="0"/>
+              <a:buChar char="o"/>
+            </a:pPr>
+            <a:r>
+              <a:rPr lang="en-US" sz="1100" dirty="0">
+                <a:effectLst/>
+                <a:latin typeface="Calibri" panose="020F0502020204030204" pitchFamily="34" charset="0"/>
+                <a:ea typeface="Calibri" panose="020F0502020204030204" pitchFamily="34" charset="0"/>
+                <a:cs typeface="Times New Roman" panose="02020603050405020304" pitchFamily="18" charset="0"/>
+              </a:rPr>
+              <a:t>Internally its challenging to share learnings and custom tooling</a:t>
+            </a:r>
+          </a:p>
+          <a:p>
+            <a:pPr marL="742950" marR="0" lvl="1" indent="-285750">
+              <a:lnSpc>
+                <a:spcPct val="107000"/>
+              </a:lnSpc>
+              <a:spcBef>
+                <a:spcPts val="0"/>
+              </a:spcBef>
+              <a:spcAft>
+                <a:spcPts val="0"/>
+              </a:spcAft>
+              <a:buFont typeface="Courier New" panose="02070309020205020404" pitchFamily="49" charset="0"/>
+              <a:buChar char="o"/>
+            </a:pPr>
+            <a:r>
+              <a:rPr lang="en-US" sz="1100" dirty="0">
+                <a:effectLst/>
+                <a:latin typeface="Calibri" panose="020F0502020204030204" pitchFamily="34" charset="0"/>
+                <a:ea typeface="Calibri" panose="020F0502020204030204" pitchFamily="34" charset="0"/>
+                <a:cs typeface="Times New Roman" panose="02020603050405020304" pitchFamily="18" charset="0"/>
+              </a:rPr>
+              <a:t>Externally cracks between our product lines are highly visible</a:t>
+            </a:r>
+          </a:p>
+          <a:p>
+            <a:pPr marL="742950" marR="0" lvl="1" indent="-285750">
+              <a:lnSpc>
+                <a:spcPct val="107000"/>
+              </a:lnSpc>
+              <a:spcBef>
+                <a:spcPts val="0"/>
+              </a:spcBef>
+              <a:spcAft>
+                <a:spcPts val="0"/>
+              </a:spcAft>
+              <a:buFont typeface="Courier New" panose="02070309020205020404" pitchFamily="49" charset="0"/>
+              <a:buChar char="o"/>
+            </a:pPr>
+            <a:r>
+              <a:rPr lang="en-US" sz="1100" dirty="0">
+                <a:effectLst/>
+                <a:latin typeface="Calibri" panose="020F0502020204030204" pitchFamily="34" charset="0"/>
+                <a:ea typeface="Calibri" panose="020F0502020204030204" pitchFamily="34" charset="0"/>
+                <a:cs typeface="Times New Roman" panose="02020603050405020304" pitchFamily="18" charset="0"/>
+              </a:rPr>
+              <a:t>For instance, many customers must maintain different accounts between our services (e.g., mortgage and personal loan).</a:t>
+            </a:r>
+          </a:p>
+          <a:p>
+            <a:pPr marL="342900" marR="0" lvl="0" indent="-342900">
+              <a:lnSpc>
+                <a:spcPct val="107000"/>
+              </a:lnSpc>
+              <a:spcBef>
+                <a:spcPts val="0"/>
+              </a:spcBef>
+              <a:spcAft>
+                <a:spcPts val="0"/>
+              </a:spcAft>
+              <a:buFont typeface="Symbol" panose="05050102010706020507" pitchFamily="18" charset="2"/>
+              <a:buChar char=""/>
+            </a:pPr>
+            <a:r>
+              <a:rPr lang="en-US" sz="1100" dirty="0">
+                <a:effectLst/>
+                <a:latin typeface="Calibri" panose="020F0502020204030204" pitchFamily="34" charset="0"/>
+                <a:ea typeface="Calibri" panose="020F0502020204030204" pitchFamily="34" charset="0"/>
+                <a:cs typeface="Times New Roman" panose="02020603050405020304" pitchFamily="18" charset="0"/>
+              </a:rPr>
+              <a:t>There is also a lot of waste across our company.  For example, why do we need four CRM systems for three different vendors?  These inconsistencies hurt our bottom line distort our perception of our customers.</a:t>
+            </a:r>
+          </a:p>
+          <a:p>
+            <a:pPr marL="342900" marR="0" lvl="0" indent="-342900">
+              <a:lnSpc>
+                <a:spcPct val="107000"/>
+              </a:lnSpc>
+              <a:spcBef>
+                <a:spcPts val="0"/>
+              </a:spcBef>
+              <a:spcAft>
+                <a:spcPts val="800"/>
+              </a:spcAft>
+              <a:buFont typeface="Symbol" panose="05050102010706020507" pitchFamily="18" charset="2"/>
+              <a:buChar char=""/>
+            </a:pPr>
+            <a:r>
+              <a:rPr lang="en-US" sz="1100" dirty="0">
+                <a:effectLst/>
+                <a:latin typeface="Calibri" panose="020F0502020204030204" pitchFamily="34" charset="0"/>
+                <a:ea typeface="Calibri" panose="020F0502020204030204" pitchFamily="34" charset="0"/>
+                <a:cs typeface="Times New Roman" panose="02020603050405020304" pitchFamily="18" charset="0"/>
+              </a:rPr>
+              <a:t>We need to identify and remove these inefficiencies to provide the best-in-class experience</a:t>
+            </a:r>
+          </a:p>
+          <a:p>
+            <a:pPr marL="0" marR="0" lvl="0" indent="0" algn="l" defTabSz="914400" rtl="0" eaLnBrk="1" fontAlgn="auto" latinLnBrk="0" hangingPunct="1">
+              <a:lnSpc>
+                <a:spcPct val="100000"/>
+              </a:lnSpc>
+              <a:spcBef>
+                <a:spcPts val="0"/>
+              </a:spcBef>
+              <a:spcAft>
+                <a:spcPts val="0"/>
+              </a:spcAft>
+              <a:buClrTx/>
+              <a:buSzTx/>
+              <a:buFontTx/>
+              <a:buNone/>
+              <a:tabLst/>
+              <a:defRPr/>
+            </a:pPr>
+            <a:endParaRPr lang="en-US" sz="1800" dirty="0">
+              <a:effectLst/>
+              <a:latin typeface="Times New Roman" panose="02020603050405020304" pitchFamily="18" charset="0"/>
+              <a:ea typeface="Calibri" panose="020F0502020204030204" pitchFamily="34" charset="0"/>
+            </a:endParaRPr>
+          </a:p>
+          <a:p>
+            <a:pPr marL="0" marR="0" lvl="0" indent="0" algn="l" defTabSz="914400" rtl="0" eaLnBrk="1" fontAlgn="auto" latinLnBrk="0" hangingPunct="1">
+              <a:lnSpc>
+                <a:spcPct val="100000"/>
+              </a:lnSpc>
+              <a:spcBef>
+                <a:spcPts val="0"/>
+              </a:spcBef>
+              <a:spcAft>
+                <a:spcPts val="0"/>
+              </a:spcAft>
+              <a:buClrTx/>
+              <a:buSzTx/>
+              <a:buFontTx/>
+              <a:buNone/>
+              <a:tabLst/>
+              <a:defRPr/>
+            </a:pPr>
+            <a:endParaRPr lang="en-US" sz="1800" dirty="0">
+              <a:effectLst/>
+              <a:latin typeface="Times New Roman" panose="02020603050405020304" pitchFamily="18" charset="0"/>
+              <a:ea typeface="Calibri" panose="020F0502020204030204" pitchFamily="34" charset="0"/>
+            </a:endParaRPr>
+          </a:p>
+          <a:p>
+            <a:pPr marL="0" marR="0" lvl="0" indent="0" algn="l" defTabSz="914400" rtl="0" eaLnBrk="1" fontAlgn="auto" latinLnBrk="0" hangingPunct="1">
+              <a:lnSpc>
+                <a:spcPct val="100000"/>
+              </a:lnSpc>
+              <a:spcBef>
+                <a:spcPts val="0"/>
+              </a:spcBef>
+              <a:spcAft>
+                <a:spcPts val="0"/>
+              </a:spcAft>
+              <a:buClrTx/>
+              <a:buSzTx/>
+              <a:buFontTx/>
+              <a:buNone/>
+              <a:tabLst/>
+              <a:defRPr/>
+            </a:pPr>
+            <a:r>
+              <a:rPr lang="en-US" sz="1800" dirty="0">
+                <a:effectLst/>
+                <a:latin typeface="Times New Roman" panose="02020603050405020304" pitchFamily="18" charset="0"/>
+                <a:ea typeface="Calibri" panose="020F0502020204030204" pitchFamily="34" charset="0"/>
+              </a:rPr>
+              <a:t>NCU-F specializes in Banking-as-a-Service and payment processing services across North America, Europe, and Asia.  The organization has ten thousand employees that serve over a million customers.  Those customers rely on the business for several integral capabilities, such as facilitating online purchases and enabling friends to send one another money.  NCU-F also offers mortgage services, investment specializations, checking and savings accounts, and personal loans.  Over the last decade, the organization has seen aggressive expansion through acquisitions.  While this strategy enables the organization to reach new markets and deliver customer value quickly, it also leads to a fragmented technology platform.  For instance, customers must maintain multiple distinct profiles and cannot easily navigate between the various products.  Additionally, NCU-F is inefficiently utilizing its resources as many business units are recreating similar solutions to the same problems. The senior leadership team wants to improve upon these issues through IT Governance.</a:t>
+            </a:r>
+          </a:p>
+          <a:p>
+            <a:endParaRPr lang="en-US" dirty="0"/>
+          </a:p>
+          <a:p>
+            <a:pPr marL="0" marR="0">
+              <a:lnSpc>
+                <a:spcPct val="200000"/>
+              </a:lnSpc>
+              <a:spcBef>
+                <a:spcPts val="0"/>
+              </a:spcBef>
+              <a:spcAft>
+                <a:spcPts val="0"/>
+              </a:spcAft>
+            </a:pPr>
+            <a:r>
+              <a:rPr lang="en-US" sz="1800" dirty="0">
+                <a:effectLst/>
+                <a:latin typeface="Times New Roman" panose="02020603050405020304" pitchFamily="18" charset="0"/>
+                <a:ea typeface="Calibri" panose="020F0502020204030204" pitchFamily="34" charset="0"/>
+              </a:rPr>
+              <a:t>The organization cannot provide the best-in-class user experience until it changes its IT Governance model.  Only through a strategic alignment between the information systems and business goals can NCU-F present a unified product suite for its customers  (</a:t>
+            </a:r>
+            <a:r>
+              <a:rPr lang="en-US" sz="1800" dirty="0" err="1">
+                <a:effectLst/>
+                <a:latin typeface="Times New Roman" panose="02020603050405020304" pitchFamily="18" charset="0"/>
+                <a:ea typeface="Calibri" panose="020F0502020204030204" pitchFamily="34" charset="0"/>
+              </a:rPr>
+              <a:t>Iyamu</a:t>
+            </a:r>
+            <a:r>
+              <a:rPr lang="en-US" sz="1800" dirty="0">
+                <a:effectLst/>
+                <a:latin typeface="Times New Roman" panose="02020603050405020304" pitchFamily="18" charset="0"/>
+                <a:ea typeface="Calibri" panose="020F0502020204030204" pitchFamily="34" charset="0"/>
+              </a:rPr>
+              <a:t>, 2015).  </a:t>
+            </a:r>
+          </a:p>
+          <a:p>
+            <a:pPr marL="0" marR="0">
+              <a:lnSpc>
+                <a:spcPct val="200000"/>
+              </a:lnSpc>
+              <a:spcBef>
+                <a:spcPts val="0"/>
+              </a:spcBef>
+              <a:spcAft>
+                <a:spcPts val="0"/>
+              </a:spcAft>
+            </a:pPr>
+            <a:r>
+              <a:rPr lang="en-US" sz="1800" dirty="0">
+                <a:effectLst/>
+                <a:latin typeface="Times New Roman" panose="02020603050405020304" pitchFamily="18" charset="0"/>
+                <a:ea typeface="Calibri" panose="020F0502020204030204" pitchFamily="34" charset="0"/>
+              </a:rPr>
+              <a:t>NCU-F’s governance model requires mechanisms and processes to enforce consistency, standardization, and choose the best-in-company implementations.  These controls must foster intellectual (e.g., planning and infrastructure) and social (e.g., shared understanding) alignment across the organization (Ping-Ju, Straub, &amp; Liang, 2015).  When team members understand the desired end-state, they can more efficiently plan and prioritize work.  It also removes design choices that would not align with business goals.</a:t>
+            </a:r>
+          </a:p>
+          <a:p>
+            <a:endParaRPr lang="en-US" dirty="0"/>
+          </a:p>
+        </p:txBody>
+      </p:sp>
+      <p:sp>
+        <p:nvSpPr>
+          <p:cNvPr id="4" name="Slide Number Placeholder 3"/>
+          <p:cNvSpPr>
+            <a:spLocks noGrp="1"/>
+          </p:cNvSpPr>
+          <p:nvPr>
+            <p:ph type="sldNum" sz="quarter" idx="5"/>
+          </p:nvPr>
+        </p:nvSpPr>
+        <p:spPr/>
+        <p:txBody>
+          <a:bodyPr/>
+          <a:lstStyle/>
+          <a:p>
+            <a:fld id="{CEE7ED23-8054-42FC-A808-6FDE147C0F4B}" type="slidenum">
+              <a:rPr lang="en-US" smtClean="0"/>
+              <a:t>4</a:t>
+            </a:fld>
+            <a:endParaRPr lang="en-US"/>
+          </a:p>
+        </p:txBody>
+      </p:sp>
+    </p:spTree>
+    <p:extLst>
+      <p:ext uri="{BB962C8B-B14F-4D97-AF65-F5344CB8AC3E}">
+        <p14:creationId xmlns:p14="http://schemas.microsoft.com/office/powerpoint/2010/main" val="1945003877"/>
+      </p:ext>
+    </p:extLst>
+  </p:cSld>
+  <p:clrMapOvr>
+    <a:masterClrMapping/>
+  </p:clrMapOvr>
+</p:notes>
+</file>
+
+<file path=ppt/notesSlides/notesSlide5.xml><?xml version="1.0" encoding="utf-8"?>
+<p:notes xmlns:a="http://schemas.openxmlformats.org/drawingml/2006/main" xmlns:r="http://schemas.openxmlformats.org/officeDocument/2006/relationships" xmlns:p="http://schemas.openxmlformats.org/presentationml/2006/main">
+  <p:cSld>
+    <p:spTree>
+      <p:nvGrpSpPr>
+        <p:cNvPr id="1" name=""/>
+        <p:cNvGrpSpPr/>
+        <p:nvPr/>
+      </p:nvGrpSpPr>
+      <p:grpSpPr>
+        <a:xfrm>
+          <a:off x="0" y="0"/>
+          <a:ext cx="0" cy="0"/>
+          <a:chOff x="0" y="0"/>
+          <a:chExt cx="0" cy="0"/>
+        </a:xfrm>
+      </p:grpSpPr>
+      <p:sp>
+        <p:nvSpPr>
+          <p:cNvPr id="2" name="Slide Image Placeholder 1"/>
+          <p:cNvSpPr>
+            <a:spLocks noGrp="1" noRot="1" noChangeAspect="1"/>
+          </p:cNvSpPr>
+          <p:nvPr>
+            <p:ph type="sldImg"/>
+          </p:nvPr>
+        </p:nvSpPr>
+        <p:spPr/>
+      </p:sp>
+      <p:sp>
+        <p:nvSpPr>
+          <p:cNvPr id="3" name="Notes Placeholder 2"/>
+          <p:cNvSpPr>
+            <a:spLocks noGrp="1"/>
+          </p:cNvSpPr>
+          <p:nvPr>
+            <p:ph type="body" idx="1"/>
+          </p:nvPr>
+        </p:nvSpPr>
+        <p:spPr/>
+        <p:txBody>
+          <a:bodyPr/>
+          <a:lstStyle/>
+          <a:p>
+            <a:pPr marL="342900" marR="0" lvl="0" indent="-342900">
+              <a:lnSpc>
+                <a:spcPct val="107000"/>
+              </a:lnSpc>
+              <a:spcBef>
+                <a:spcPts val="0"/>
+              </a:spcBef>
+              <a:spcAft>
+                <a:spcPts val="0"/>
+              </a:spcAft>
+              <a:buFont typeface="Symbol" panose="05050102010706020507" pitchFamily="18" charset="2"/>
+              <a:buChar char=""/>
+            </a:pPr>
+            <a:r>
+              <a:rPr lang="en-US" sz="1100" dirty="0">
+                <a:effectLst/>
+                <a:latin typeface="Calibri" panose="020F0502020204030204" pitchFamily="34" charset="0"/>
+                <a:ea typeface="Calibri" panose="020F0502020204030204" pitchFamily="34" charset="0"/>
+                <a:cs typeface="Times New Roman" panose="02020603050405020304" pitchFamily="18" charset="0"/>
+              </a:rPr>
+              <a:t>These challenges stem from our corporate policy management, or more specifically lack-of.</a:t>
+            </a:r>
+          </a:p>
+          <a:p>
+            <a:pPr marL="342900" marR="0" lvl="0" indent="-342900">
+              <a:lnSpc>
+                <a:spcPct val="107000"/>
+              </a:lnSpc>
+              <a:spcBef>
+                <a:spcPts val="0"/>
+              </a:spcBef>
+              <a:spcAft>
+                <a:spcPts val="0"/>
+              </a:spcAft>
+              <a:buFont typeface="Symbol" panose="05050102010706020507" pitchFamily="18" charset="2"/>
+              <a:buChar char=""/>
+            </a:pPr>
+            <a:r>
+              <a:rPr lang="en-US" sz="1100" dirty="0">
+                <a:effectLst/>
+                <a:latin typeface="Calibri" panose="020F0502020204030204" pitchFamily="34" charset="0"/>
+                <a:ea typeface="Calibri" panose="020F0502020204030204" pitchFamily="34" charset="0"/>
+                <a:cs typeface="Times New Roman" panose="02020603050405020304" pitchFamily="18" charset="0"/>
+              </a:rPr>
+              <a:t>Policies encode our corporate values as controls, guardrails, and standards</a:t>
+            </a:r>
+          </a:p>
+          <a:p>
+            <a:pPr marL="342900" marR="0" lvl="0" indent="-342900">
+              <a:lnSpc>
+                <a:spcPct val="107000"/>
+              </a:lnSpc>
+              <a:spcBef>
+                <a:spcPts val="0"/>
+              </a:spcBef>
+              <a:spcAft>
+                <a:spcPts val="0"/>
+              </a:spcAft>
+              <a:buFont typeface="Symbol" panose="05050102010706020507" pitchFamily="18" charset="2"/>
+              <a:buChar char=""/>
+            </a:pPr>
+            <a:r>
+              <a:rPr lang="en-US" sz="1100" dirty="0">
+                <a:effectLst/>
+                <a:latin typeface="Calibri" panose="020F0502020204030204" pitchFamily="34" charset="0"/>
+                <a:ea typeface="Calibri" panose="020F0502020204030204" pitchFamily="34" charset="0"/>
+                <a:cs typeface="Times New Roman" panose="02020603050405020304" pitchFamily="18" charset="0"/>
+              </a:rPr>
+              <a:t>When teams have visibility into these expectations, it becomes easier for them become strategically aligned.</a:t>
+            </a:r>
+          </a:p>
+          <a:p>
+            <a:pPr marL="742950" marR="0" lvl="1" indent="-285750">
+              <a:lnSpc>
+                <a:spcPct val="107000"/>
+              </a:lnSpc>
+              <a:spcBef>
+                <a:spcPts val="0"/>
+              </a:spcBef>
+              <a:spcAft>
+                <a:spcPts val="0"/>
+              </a:spcAft>
+              <a:buFont typeface="Courier New" panose="02070309020205020404" pitchFamily="49" charset="0"/>
+              <a:buChar char="o"/>
+            </a:pPr>
+            <a:r>
+              <a:rPr lang="en-US" sz="1100" dirty="0">
+                <a:effectLst/>
+                <a:latin typeface="Calibri" panose="020F0502020204030204" pitchFamily="34" charset="0"/>
+                <a:ea typeface="Calibri" panose="020F0502020204030204" pitchFamily="34" charset="0"/>
+                <a:cs typeface="Times New Roman" panose="02020603050405020304" pitchFamily="18" charset="0"/>
+              </a:rPr>
+              <a:t>Employees want to do the right thing, they just don’t know what that means</a:t>
+            </a:r>
+          </a:p>
+          <a:p>
+            <a:pPr marL="342900" marR="0" lvl="0" indent="-342900">
+              <a:lnSpc>
+                <a:spcPct val="107000"/>
+              </a:lnSpc>
+              <a:spcBef>
+                <a:spcPts val="0"/>
+              </a:spcBef>
+              <a:spcAft>
+                <a:spcPts val="0"/>
+              </a:spcAft>
+              <a:buFont typeface="Symbol" panose="05050102010706020507" pitchFamily="18" charset="2"/>
+              <a:buChar char=""/>
+            </a:pPr>
+            <a:r>
+              <a:rPr lang="en-US" sz="1100" dirty="0">
+                <a:effectLst/>
+                <a:latin typeface="Calibri" panose="020F0502020204030204" pitchFamily="34" charset="0"/>
+                <a:ea typeface="Calibri" panose="020F0502020204030204" pitchFamily="34" charset="0"/>
+                <a:cs typeface="Times New Roman" panose="02020603050405020304" pitchFamily="18" charset="0"/>
+              </a:rPr>
+              <a:t>We need to define policy lifecycle management rules.  For instance…</a:t>
+            </a:r>
+          </a:p>
+          <a:p>
+            <a:pPr marL="342900" marR="0" lvl="0" indent="-342900">
+              <a:lnSpc>
+                <a:spcPct val="107000"/>
+              </a:lnSpc>
+              <a:spcBef>
+                <a:spcPts val="0"/>
+              </a:spcBef>
+              <a:spcAft>
+                <a:spcPts val="0"/>
+              </a:spcAft>
+              <a:buFont typeface="Symbol" panose="05050102010706020507" pitchFamily="18" charset="2"/>
+              <a:buChar char=""/>
+            </a:pPr>
+            <a:r>
+              <a:rPr lang="en-US" sz="1100" dirty="0">
+                <a:effectLst/>
+                <a:latin typeface="Calibri" panose="020F0502020204030204" pitchFamily="34" charset="0"/>
+                <a:ea typeface="Calibri" panose="020F0502020204030204" pitchFamily="34" charset="0"/>
+                <a:cs typeface="Times New Roman" panose="02020603050405020304" pitchFamily="18" charset="0"/>
+              </a:rPr>
+              <a:t>Additionally, policies must be discoverable and referenceable through a policy repository</a:t>
+            </a:r>
+          </a:p>
+          <a:p>
+            <a:pPr marL="742950" marR="0" lvl="1" indent="-285750">
+              <a:lnSpc>
+                <a:spcPct val="107000"/>
+              </a:lnSpc>
+              <a:spcBef>
+                <a:spcPts val="0"/>
+              </a:spcBef>
+              <a:spcAft>
+                <a:spcPts val="0"/>
+              </a:spcAft>
+              <a:buFont typeface="Courier New" panose="02070309020205020404" pitchFamily="49" charset="0"/>
+              <a:buChar char="o"/>
+            </a:pPr>
+            <a:r>
+              <a:rPr lang="en-US" sz="1100" dirty="0">
+                <a:effectLst/>
+                <a:latin typeface="Calibri" panose="020F0502020204030204" pitchFamily="34" charset="0"/>
+                <a:ea typeface="Calibri" panose="020F0502020204030204" pitchFamily="34" charset="0"/>
+                <a:cs typeface="Times New Roman" panose="02020603050405020304" pitchFamily="18" charset="0"/>
+              </a:rPr>
+              <a:t>Later, we will cover Policy Center, our proprietary implementation</a:t>
+            </a:r>
+          </a:p>
+          <a:p>
+            <a:pPr marL="342900" marR="0" lvl="0" indent="-342900">
+              <a:lnSpc>
+                <a:spcPct val="107000"/>
+              </a:lnSpc>
+              <a:spcBef>
+                <a:spcPts val="0"/>
+              </a:spcBef>
+              <a:spcAft>
+                <a:spcPts val="0"/>
+              </a:spcAft>
+              <a:buFont typeface="Symbol" panose="05050102010706020507" pitchFamily="18" charset="2"/>
+              <a:buChar char=""/>
+            </a:pPr>
+            <a:r>
+              <a:rPr lang="en-US" sz="1100" dirty="0">
+                <a:effectLst/>
+                <a:latin typeface="Calibri" panose="020F0502020204030204" pitchFamily="34" charset="0"/>
+                <a:ea typeface="Calibri" panose="020F0502020204030204" pitchFamily="34" charset="0"/>
+                <a:cs typeface="Times New Roman" panose="02020603050405020304" pitchFamily="18" charset="0"/>
+              </a:rPr>
+              <a:t>Lastly, what should we avoid</a:t>
+            </a:r>
+          </a:p>
+          <a:p>
+            <a:pPr marL="742950" marR="0" lvl="1" indent="-285750">
+              <a:lnSpc>
+                <a:spcPct val="107000"/>
+              </a:lnSpc>
+              <a:spcBef>
+                <a:spcPts val="0"/>
+              </a:spcBef>
+              <a:spcAft>
+                <a:spcPts val="0"/>
+              </a:spcAft>
+              <a:buFont typeface="Courier New" panose="02070309020205020404" pitchFamily="49" charset="0"/>
+              <a:buChar char="o"/>
+            </a:pPr>
+            <a:r>
+              <a:rPr lang="en-US" sz="1100" dirty="0">
+                <a:effectLst/>
+                <a:latin typeface="Calibri" panose="020F0502020204030204" pitchFamily="34" charset="0"/>
+                <a:ea typeface="Calibri" panose="020F0502020204030204" pitchFamily="34" charset="0"/>
+                <a:cs typeface="Times New Roman" panose="02020603050405020304" pitchFamily="18" charset="0"/>
+              </a:rPr>
+              <a:t>Mandating new controls requires non-compliant teams to do unplanned work</a:t>
+            </a:r>
+          </a:p>
+          <a:p>
+            <a:pPr marL="742950" marR="0" lvl="1" indent="-285750">
+              <a:lnSpc>
+                <a:spcPct val="107000"/>
+              </a:lnSpc>
+              <a:spcBef>
+                <a:spcPts val="0"/>
+              </a:spcBef>
+              <a:spcAft>
+                <a:spcPts val="0"/>
+              </a:spcAft>
+              <a:buFont typeface="Courier New" panose="02070309020205020404" pitchFamily="49" charset="0"/>
+              <a:buChar char="o"/>
+            </a:pPr>
+            <a:r>
+              <a:rPr lang="en-US" sz="1100" dirty="0">
+                <a:effectLst/>
+                <a:latin typeface="Calibri" panose="020F0502020204030204" pitchFamily="34" charset="0"/>
+                <a:ea typeface="Calibri" panose="020F0502020204030204" pitchFamily="34" charset="0"/>
+                <a:cs typeface="Times New Roman" panose="02020603050405020304" pitchFamily="18" charset="0"/>
+              </a:rPr>
+              <a:t>There needs to be a balance between removing technical debt and adding new features</a:t>
+            </a:r>
+          </a:p>
+          <a:p>
+            <a:pPr marL="742950" marR="0" lvl="1" indent="-285750">
+              <a:lnSpc>
+                <a:spcPct val="107000"/>
+              </a:lnSpc>
+              <a:spcBef>
+                <a:spcPts val="0"/>
+              </a:spcBef>
+              <a:spcAft>
+                <a:spcPts val="0"/>
+              </a:spcAft>
+              <a:buFont typeface="Courier New" panose="02070309020205020404" pitchFamily="49" charset="0"/>
+              <a:buChar char="o"/>
+            </a:pPr>
+            <a:r>
+              <a:rPr lang="en-US" sz="1100" dirty="0">
+                <a:effectLst/>
+                <a:latin typeface="Calibri" panose="020F0502020204030204" pitchFamily="34" charset="0"/>
+                <a:ea typeface="Calibri" panose="020F0502020204030204" pitchFamily="34" charset="0"/>
+                <a:cs typeface="Times New Roman" panose="02020603050405020304" pitchFamily="18" charset="0"/>
+              </a:rPr>
+              <a:t>This will lead to different levels of maturity across the organization</a:t>
+            </a:r>
+          </a:p>
+          <a:p>
+            <a:pPr marL="1143000" marR="0" lvl="2" indent="-228600">
+              <a:lnSpc>
+                <a:spcPct val="107000"/>
+              </a:lnSpc>
+              <a:spcBef>
+                <a:spcPts val="0"/>
+              </a:spcBef>
+              <a:spcAft>
+                <a:spcPts val="0"/>
+              </a:spcAft>
+              <a:buFont typeface="Wingdings" panose="05000000000000000000" pitchFamily="2" charset="2"/>
+              <a:buChar char=""/>
+            </a:pPr>
+            <a:r>
+              <a:rPr lang="en-US" sz="1100" dirty="0">
+                <a:effectLst/>
+                <a:latin typeface="Calibri" panose="020F0502020204030204" pitchFamily="34" charset="0"/>
+                <a:ea typeface="Calibri" panose="020F0502020204030204" pitchFamily="34" charset="0"/>
+                <a:cs typeface="Times New Roman" panose="02020603050405020304" pitchFamily="18" charset="0"/>
+              </a:rPr>
+              <a:t>It should be the organization’s goal to </a:t>
+            </a:r>
+            <a:r>
+              <a:rPr lang="en-US" sz="1100" i="1" dirty="0">
+                <a:effectLst/>
+                <a:latin typeface="Calibri" panose="020F0502020204030204" pitchFamily="34" charset="0"/>
+                <a:ea typeface="Calibri" panose="020F0502020204030204" pitchFamily="34" charset="0"/>
+                <a:cs typeface="Times New Roman" panose="02020603050405020304" pitchFamily="18" charset="0"/>
+              </a:rPr>
+              <a:t>eventually </a:t>
+            </a:r>
+            <a:r>
+              <a:rPr lang="en-US" sz="1100" dirty="0">
+                <a:effectLst/>
+                <a:latin typeface="Calibri" panose="020F0502020204030204" pitchFamily="34" charset="0"/>
+                <a:ea typeface="Calibri" panose="020F0502020204030204" pitchFamily="34" charset="0"/>
+                <a:cs typeface="Times New Roman" panose="02020603050405020304" pitchFamily="18" charset="0"/>
+              </a:rPr>
+              <a:t>mature </a:t>
+            </a:r>
+            <a:r>
+              <a:rPr lang="en-US" sz="1100" i="1" dirty="0">
+                <a:effectLst/>
+                <a:latin typeface="Calibri" panose="020F0502020204030204" pitchFamily="34" charset="0"/>
+                <a:ea typeface="Calibri" panose="020F0502020204030204" pitchFamily="34" charset="0"/>
+                <a:cs typeface="Times New Roman" panose="02020603050405020304" pitchFamily="18" charset="0"/>
+              </a:rPr>
+              <a:t>most</a:t>
+            </a:r>
+            <a:r>
+              <a:rPr lang="en-US" sz="1100" dirty="0">
+                <a:effectLst/>
+                <a:latin typeface="Calibri" panose="020F0502020204030204" pitchFamily="34" charset="0"/>
+                <a:ea typeface="Calibri" panose="020F0502020204030204" pitchFamily="34" charset="0"/>
+                <a:cs typeface="Times New Roman" panose="02020603050405020304" pitchFamily="18" charset="0"/>
+              </a:rPr>
+              <a:t> implementations</a:t>
+            </a:r>
+          </a:p>
+          <a:p>
+            <a:pPr marL="1143000" marR="0" lvl="2" indent="-228600">
+              <a:lnSpc>
+                <a:spcPct val="107000"/>
+              </a:lnSpc>
+              <a:spcBef>
+                <a:spcPts val="0"/>
+              </a:spcBef>
+              <a:spcAft>
+                <a:spcPts val="800"/>
+              </a:spcAft>
+              <a:buFont typeface="Wingdings" panose="05000000000000000000" pitchFamily="2" charset="2"/>
+              <a:buChar char=""/>
+            </a:pPr>
+            <a:r>
+              <a:rPr lang="en-US" sz="1100" dirty="0">
+                <a:effectLst/>
+                <a:latin typeface="Calibri" panose="020F0502020204030204" pitchFamily="34" charset="0"/>
+                <a:ea typeface="Calibri" panose="020F0502020204030204" pitchFamily="34" charset="0"/>
+                <a:cs typeface="Times New Roman" panose="02020603050405020304" pitchFamily="18" charset="0"/>
+              </a:rPr>
+              <a:t>That lowers future costs</a:t>
+            </a:r>
+          </a:p>
+          <a:p>
+            <a:endParaRPr lang="en-US" dirty="0"/>
+          </a:p>
+        </p:txBody>
+      </p:sp>
+      <p:sp>
+        <p:nvSpPr>
+          <p:cNvPr id="4" name="Slide Number Placeholder 3"/>
+          <p:cNvSpPr>
+            <a:spLocks noGrp="1"/>
+          </p:cNvSpPr>
+          <p:nvPr>
+            <p:ph type="sldNum" sz="quarter" idx="5"/>
+          </p:nvPr>
+        </p:nvSpPr>
+        <p:spPr/>
+        <p:txBody>
+          <a:bodyPr/>
+          <a:lstStyle/>
+          <a:p>
+            <a:fld id="{CEE7ED23-8054-42FC-A808-6FDE147C0F4B}" type="slidenum">
+              <a:rPr lang="en-US" smtClean="0"/>
+              <a:t>5</a:t>
+            </a:fld>
+            <a:endParaRPr lang="en-US"/>
+          </a:p>
+        </p:txBody>
+      </p:sp>
+    </p:spTree>
+    <p:extLst>
+      <p:ext uri="{BB962C8B-B14F-4D97-AF65-F5344CB8AC3E}">
+        <p14:creationId xmlns:p14="http://schemas.microsoft.com/office/powerpoint/2010/main" val="2266815824"/>
+      </p:ext>
+    </p:extLst>
+  </p:cSld>
+  <p:clrMapOvr>
+    <a:masterClrMapping/>
+  </p:clrMapOvr>
+</p:notes>
+</file>
+
+<file path=ppt/notesSlides/notesSlide6.xml><?xml version="1.0" encoding="utf-8"?>
+<p:notes xmlns:a="http://schemas.openxmlformats.org/drawingml/2006/main" xmlns:r="http://schemas.openxmlformats.org/officeDocument/2006/relationships" xmlns:p="http://schemas.openxmlformats.org/presentationml/2006/main">
+  <p:cSld>
+    <p:spTree>
+      <p:nvGrpSpPr>
+        <p:cNvPr id="1" name=""/>
+        <p:cNvGrpSpPr/>
+        <p:nvPr/>
+      </p:nvGrpSpPr>
+      <p:grpSpPr>
+        <a:xfrm>
+          <a:off x="0" y="0"/>
+          <a:ext cx="0" cy="0"/>
+          <a:chOff x="0" y="0"/>
+          <a:chExt cx="0" cy="0"/>
+        </a:xfrm>
+      </p:grpSpPr>
+      <p:sp>
+        <p:nvSpPr>
+          <p:cNvPr id="2" name="Slide Image Placeholder 1"/>
+          <p:cNvSpPr>
+            <a:spLocks noGrp="1" noRot="1" noChangeAspect="1"/>
+          </p:cNvSpPr>
+          <p:nvPr>
+            <p:ph type="sldImg"/>
+          </p:nvPr>
+        </p:nvSpPr>
+        <p:spPr/>
+      </p:sp>
+      <p:sp>
+        <p:nvSpPr>
+          <p:cNvPr id="3" name="Notes Placeholder 2"/>
+          <p:cNvSpPr>
+            <a:spLocks noGrp="1"/>
+          </p:cNvSpPr>
+          <p:nvPr>
+            <p:ph type="body" idx="1"/>
+          </p:nvPr>
+        </p:nvSpPr>
+        <p:spPr/>
+        <p:txBody>
+          <a:bodyPr/>
+          <a:lstStyle/>
+          <a:p>
+            <a:pPr marL="342900" marR="0" lvl="0" indent="-342900">
+              <a:lnSpc>
+                <a:spcPct val="107000"/>
+              </a:lnSpc>
+              <a:spcBef>
+                <a:spcPts val="0"/>
+              </a:spcBef>
+              <a:spcAft>
+                <a:spcPts val="0"/>
+              </a:spcAft>
+              <a:buFont typeface="Symbol" panose="05050102010706020507" pitchFamily="18" charset="2"/>
+              <a:buChar char=""/>
+            </a:pPr>
+            <a:r>
+              <a:rPr lang="en-US" sz="1100" dirty="0">
+                <a:effectLst/>
+                <a:latin typeface="Calibri" panose="020F0502020204030204" pitchFamily="34" charset="0"/>
+                <a:ea typeface="Calibri" panose="020F0502020204030204" pitchFamily="34" charset="0"/>
+                <a:cs typeface="Times New Roman" panose="02020603050405020304" pitchFamily="18" charset="0"/>
+              </a:rPr>
+              <a:t>Our new strategy has four components</a:t>
+            </a:r>
+          </a:p>
+          <a:p>
+            <a:pPr marL="342900" marR="0" lvl="0" indent="-342900">
+              <a:lnSpc>
+                <a:spcPct val="107000"/>
+              </a:lnSpc>
+              <a:spcBef>
+                <a:spcPts val="0"/>
+              </a:spcBef>
+              <a:spcAft>
+                <a:spcPts val="0"/>
+              </a:spcAft>
+              <a:buFont typeface="Symbol" panose="05050102010706020507" pitchFamily="18" charset="2"/>
+              <a:buChar char=""/>
+            </a:pPr>
+            <a:r>
+              <a:rPr lang="en-US" sz="1100" dirty="0">
+                <a:effectLst/>
+                <a:latin typeface="Calibri" panose="020F0502020204030204" pitchFamily="34" charset="0"/>
+                <a:ea typeface="Calibri" panose="020F0502020204030204" pitchFamily="34" charset="0"/>
+                <a:cs typeface="Times New Roman" panose="02020603050405020304" pitchFamily="18" charset="0"/>
+              </a:rPr>
+              <a:t>First, we will establish a IT steering committee to centrally govern policy management</a:t>
+            </a:r>
+          </a:p>
+          <a:p>
+            <a:pPr marL="742950" marR="0" lvl="1" indent="-285750">
+              <a:lnSpc>
+                <a:spcPct val="107000"/>
+              </a:lnSpc>
+              <a:spcBef>
+                <a:spcPts val="0"/>
+              </a:spcBef>
+              <a:spcAft>
+                <a:spcPts val="0"/>
+              </a:spcAft>
+              <a:buFont typeface="Courier New" panose="02070309020205020404" pitchFamily="49" charset="0"/>
+              <a:buChar char="o"/>
+            </a:pPr>
+            <a:r>
+              <a:rPr lang="en-US" sz="1100" dirty="0">
+                <a:effectLst/>
+                <a:latin typeface="Calibri" panose="020F0502020204030204" pitchFamily="34" charset="0"/>
+                <a:ea typeface="Calibri" panose="020F0502020204030204" pitchFamily="34" charset="0"/>
+                <a:cs typeface="Times New Roman" panose="02020603050405020304" pitchFamily="18" charset="0"/>
+              </a:rPr>
+              <a:t>The group will contain senior leaders from across the organization</a:t>
+            </a:r>
+          </a:p>
+          <a:p>
+            <a:pPr marL="342900" marR="0" lvl="0" indent="-342900">
+              <a:lnSpc>
+                <a:spcPct val="107000"/>
+              </a:lnSpc>
+              <a:spcBef>
+                <a:spcPts val="0"/>
+              </a:spcBef>
+              <a:spcAft>
+                <a:spcPts val="0"/>
+              </a:spcAft>
+              <a:buFont typeface="Symbol" panose="05050102010706020507" pitchFamily="18" charset="2"/>
+              <a:buChar char=""/>
+            </a:pPr>
+            <a:r>
+              <a:rPr lang="en-US" sz="1100" dirty="0">
+                <a:effectLst/>
+                <a:latin typeface="Calibri" panose="020F0502020204030204" pitchFamily="34" charset="0"/>
+                <a:ea typeface="Calibri" panose="020F0502020204030204" pitchFamily="34" charset="0"/>
+                <a:cs typeface="Times New Roman" panose="02020603050405020304" pitchFamily="18" charset="0"/>
+              </a:rPr>
+              <a:t>Next, we will adopt policy controls using industry standards like COBIT</a:t>
+            </a:r>
+          </a:p>
+          <a:p>
+            <a:pPr marL="742950" marR="0" lvl="1" indent="-285750">
+              <a:lnSpc>
+                <a:spcPct val="107000"/>
+              </a:lnSpc>
+              <a:spcBef>
+                <a:spcPts val="0"/>
+              </a:spcBef>
+              <a:spcAft>
+                <a:spcPts val="0"/>
+              </a:spcAft>
+              <a:buFont typeface="Courier New" panose="02070309020205020404" pitchFamily="49" charset="0"/>
+              <a:buChar char="o"/>
+            </a:pPr>
+            <a:r>
+              <a:rPr lang="en-US" sz="1100" dirty="0">
+                <a:effectLst/>
+                <a:latin typeface="Calibri" panose="020F0502020204030204" pitchFamily="34" charset="0"/>
+                <a:ea typeface="Calibri" panose="020F0502020204030204" pitchFamily="34" charset="0"/>
+                <a:cs typeface="Times New Roman" panose="02020603050405020304" pitchFamily="18" charset="0"/>
+              </a:rPr>
+              <a:t>These tools define the methodologies for applying guardrails</a:t>
+            </a:r>
+          </a:p>
+          <a:p>
+            <a:pPr marL="342900" marR="0" lvl="0" indent="-342900">
+              <a:lnSpc>
+                <a:spcPct val="107000"/>
+              </a:lnSpc>
+              <a:spcBef>
+                <a:spcPts val="0"/>
+              </a:spcBef>
+              <a:spcAft>
+                <a:spcPts val="0"/>
+              </a:spcAft>
+              <a:buFont typeface="Symbol" panose="05050102010706020507" pitchFamily="18" charset="2"/>
+              <a:buChar char=""/>
+            </a:pPr>
+            <a:r>
+              <a:rPr lang="en-US" sz="1100" dirty="0">
+                <a:effectLst/>
+                <a:latin typeface="Calibri" panose="020F0502020204030204" pitchFamily="34" charset="0"/>
+                <a:ea typeface="Calibri" panose="020F0502020204030204" pitchFamily="34" charset="0"/>
+                <a:cs typeface="Times New Roman" panose="02020603050405020304" pitchFamily="18" charset="0"/>
+              </a:rPr>
+              <a:t>Third, we will form cross-cutting concern technical communities</a:t>
+            </a:r>
+          </a:p>
+          <a:p>
+            <a:pPr marL="742950" marR="0" lvl="1" indent="-285750">
+              <a:lnSpc>
+                <a:spcPct val="107000"/>
+              </a:lnSpc>
+              <a:spcBef>
+                <a:spcPts val="0"/>
+              </a:spcBef>
+              <a:spcAft>
+                <a:spcPts val="0"/>
+              </a:spcAft>
+              <a:buFont typeface="Courier New" panose="02070309020205020404" pitchFamily="49" charset="0"/>
+              <a:buChar char="o"/>
+            </a:pPr>
+            <a:r>
+              <a:rPr lang="en-US" sz="1100" dirty="0">
+                <a:effectLst/>
+                <a:latin typeface="Calibri" panose="020F0502020204030204" pitchFamily="34" charset="0"/>
+                <a:ea typeface="Calibri" panose="020F0502020204030204" pitchFamily="34" charset="0"/>
+                <a:cs typeface="Times New Roman" panose="02020603050405020304" pitchFamily="18" charset="0"/>
+              </a:rPr>
+              <a:t>The v-team is the SME and will own the day-to-day work of the committee</a:t>
+            </a:r>
+          </a:p>
+          <a:p>
+            <a:pPr marL="742950" marR="0" lvl="1" indent="-285750">
+              <a:lnSpc>
+                <a:spcPct val="107000"/>
+              </a:lnSpc>
+              <a:spcBef>
+                <a:spcPts val="0"/>
+              </a:spcBef>
+              <a:spcAft>
+                <a:spcPts val="0"/>
+              </a:spcAft>
+              <a:buFont typeface="Courier New" panose="02070309020205020404" pitchFamily="49" charset="0"/>
+              <a:buChar char="o"/>
+            </a:pPr>
+            <a:r>
+              <a:rPr lang="en-US" sz="1100" dirty="0">
+                <a:effectLst/>
+                <a:latin typeface="Calibri" panose="020F0502020204030204" pitchFamily="34" charset="0"/>
+                <a:ea typeface="Calibri" panose="020F0502020204030204" pitchFamily="34" charset="0"/>
+                <a:cs typeface="Times New Roman" panose="02020603050405020304" pitchFamily="18" charset="0"/>
+              </a:rPr>
+              <a:t>Existing employees will join 1-2 v-teams</a:t>
+            </a:r>
+          </a:p>
+          <a:p>
+            <a:pPr marL="742950" marR="0" lvl="1" indent="-285750">
+              <a:lnSpc>
+                <a:spcPct val="107000"/>
+              </a:lnSpc>
+              <a:spcBef>
+                <a:spcPts val="0"/>
+              </a:spcBef>
+              <a:spcAft>
+                <a:spcPts val="0"/>
+              </a:spcAft>
+              <a:buFont typeface="Courier New" panose="02070309020205020404" pitchFamily="49" charset="0"/>
+              <a:buChar char="o"/>
+            </a:pPr>
+            <a:r>
+              <a:rPr lang="en-US" sz="1100" dirty="0">
+                <a:effectLst/>
+                <a:latin typeface="Calibri" panose="020F0502020204030204" pitchFamily="34" charset="0"/>
+                <a:ea typeface="Calibri" panose="020F0502020204030204" pitchFamily="34" charset="0"/>
+                <a:cs typeface="Times New Roman" panose="02020603050405020304" pitchFamily="18" charset="0"/>
+              </a:rPr>
+              <a:t>Each team must have an executive sponsor and a program manager</a:t>
+            </a:r>
+          </a:p>
+          <a:p>
+            <a:pPr marL="342900" marR="0" lvl="0" indent="-342900">
+              <a:lnSpc>
+                <a:spcPct val="107000"/>
+              </a:lnSpc>
+              <a:spcBef>
+                <a:spcPts val="0"/>
+              </a:spcBef>
+              <a:spcAft>
+                <a:spcPts val="800"/>
+              </a:spcAft>
+              <a:buFont typeface="Symbol" panose="05050102010706020507" pitchFamily="18" charset="2"/>
+              <a:buChar char=""/>
+            </a:pPr>
+            <a:r>
+              <a:rPr lang="en-US" sz="1100" dirty="0">
+                <a:effectLst/>
+                <a:latin typeface="Calibri" panose="020F0502020204030204" pitchFamily="34" charset="0"/>
+                <a:ea typeface="Calibri" panose="020F0502020204030204" pitchFamily="34" charset="0"/>
+                <a:cs typeface="Times New Roman" panose="02020603050405020304" pitchFamily="18" charset="0"/>
+              </a:rPr>
+              <a:t>Lastly, reporting mechanisms and structures will inform the committee what results are being delivered.  It is the responsibility of the PM to collect this information for their sponsor</a:t>
+            </a:r>
+          </a:p>
+          <a:p>
+            <a:endParaRPr lang="en-US" b="1" dirty="0"/>
+          </a:p>
+          <a:p>
+            <a:endParaRPr lang="en-US" b="1" dirty="0"/>
+          </a:p>
+          <a:p>
+            <a:endParaRPr lang="en-US" b="1" dirty="0"/>
+          </a:p>
+          <a:p>
+            <a:endParaRPr lang="en-US" b="1" dirty="0"/>
+          </a:p>
+          <a:p>
+            <a:endParaRPr lang="en-US" b="1" dirty="0"/>
+          </a:p>
+          <a:p>
+            <a:r>
+              <a:rPr lang="en-US" b="1" dirty="0"/>
+              <a:t>Establish the Steering Committee</a:t>
+            </a:r>
+          </a:p>
+          <a:p>
+            <a:endParaRPr lang="en-US" b="1" dirty="0"/>
+          </a:p>
+          <a:p>
+            <a:pPr marL="0" marR="0">
+              <a:lnSpc>
+                <a:spcPct val="200000"/>
+              </a:lnSpc>
+              <a:spcBef>
+                <a:spcPts val="0"/>
+              </a:spcBef>
+              <a:spcAft>
+                <a:spcPts val="0"/>
+              </a:spcAft>
+            </a:pPr>
+            <a:r>
+              <a:rPr lang="en-US" sz="1800" dirty="0">
+                <a:effectLst/>
+                <a:latin typeface="Times New Roman" panose="02020603050405020304" pitchFamily="18" charset="0"/>
+                <a:ea typeface="Calibri" panose="020F0502020204030204" pitchFamily="34" charset="0"/>
+              </a:rPr>
+              <a:t>The senior leadership team must establish an IT steering committee that collectively agrees on the organizational patterns and practices.  This group requires executive sponsorship to ensure decisions carry weight.  When the committee identifies high-value work, such as centralizing customer identity, there must be processes to appoint a Single-Threaded Leader (STL)  (</a:t>
+            </a:r>
+            <a:r>
+              <a:rPr lang="en-US" sz="1800" dirty="0" err="1">
+                <a:effectLst/>
+                <a:latin typeface="Times New Roman" panose="02020603050405020304" pitchFamily="18" charset="0"/>
+                <a:ea typeface="Calibri" panose="020F0502020204030204" pitchFamily="34" charset="0"/>
+              </a:rPr>
+              <a:t>Bryar</a:t>
+            </a:r>
+            <a:r>
+              <a:rPr lang="en-US" sz="1800" dirty="0">
+                <a:effectLst/>
+                <a:latin typeface="Times New Roman" panose="02020603050405020304" pitchFamily="18" charset="0"/>
+                <a:ea typeface="Calibri" panose="020F0502020204030204" pitchFamily="34" charset="0"/>
+              </a:rPr>
+              <a:t> &amp; </a:t>
+            </a:r>
+            <a:r>
+              <a:rPr lang="en-US" sz="1800" dirty="0" err="1">
+                <a:effectLst/>
+                <a:latin typeface="Times New Roman" panose="02020603050405020304" pitchFamily="18" charset="0"/>
+                <a:ea typeface="Calibri" panose="020F0502020204030204" pitchFamily="34" charset="0"/>
+              </a:rPr>
+              <a:t>Carr</a:t>
+            </a:r>
+            <a:r>
+              <a:rPr lang="en-US" sz="1800" dirty="0">
+                <a:effectLst/>
+                <a:latin typeface="Times New Roman" panose="02020603050405020304" pitchFamily="18" charset="0"/>
+                <a:ea typeface="Calibri" panose="020F0502020204030204" pitchFamily="34" charset="0"/>
+              </a:rPr>
+              <a:t>, 2021).  An STL is a project owner who manages the goal’s lifecycle, Governance, and stakeholder communication.  This owner should not work on multiple goals in parallel, as it introduces project risk.</a:t>
+            </a:r>
+          </a:p>
+          <a:p>
+            <a:pPr marL="0" marR="0">
+              <a:lnSpc>
+                <a:spcPct val="200000"/>
+              </a:lnSpc>
+              <a:spcBef>
+                <a:spcPts val="0"/>
+              </a:spcBef>
+              <a:spcAft>
+                <a:spcPts val="0"/>
+              </a:spcAft>
+            </a:pPr>
+            <a:endParaRPr lang="en-US" sz="1800" dirty="0">
+              <a:effectLst/>
+              <a:latin typeface="Times New Roman" panose="02020603050405020304" pitchFamily="18" charset="0"/>
+              <a:ea typeface="Calibri" panose="020F0502020204030204" pitchFamily="34" charset="0"/>
+            </a:endParaRPr>
+          </a:p>
+          <a:p>
+            <a:pPr marL="0" marR="0">
+              <a:lnSpc>
+                <a:spcPct val="200000"/>
+              </a:lnSpc>
+              <a:spcBef>
+                <a:spcPts val="0"/>
+              </a:spcBef>
+              <a:spcAft>
+                <a:spcPts val="0"/>
+              </a:spcAft>
+            </a:pPr>
+            <a:r>
+              <a:rPr lang="en-US" sz="1800" dirty="0">
+                <a:effectLst/>
+                <a:latin typeface="Times New Roman" panose="02020603050405020304" pitchFamily="18" charset="0"/>
+                <a:ea typeface="Calibri" panose="020F0502020204030204" pitchFamily="34" charset="0"/>
+              </a:rPr>
+              <a:t>While the IT steering committee(s) establish patterns and practices, it would be unrealistic to assume complete uniformity.  For example, the savings and checking business unit runs on Windows and .NET versus the personal loan features are written in Perl.  Requiring that one group rewrites their implementation would be both challenging and a poor investment.  Instead, the committee must focus on interoperability and code portability through industry standard patterns.  For instance, each product should have an Application Programming Interface (API) that supports RESTful methods (Representational State Transfer protocol).  Those service contracts must support versioning and consistent performance objectives.  However, it is not a goal that those services implement a specific library or language construct.  Steering committees must focus on high-level guidance and architectural guard rails, not implementation nuance.  </a:t>
+            </a:r>
+          </a:p>
+          <a:p>
+            <a:endParaRPr lang="en-US" b="1" dirty="0"/>
+          </a:p>
+          <a:p>
+            <a:r>
+              <a:rPr lang="en-US" b="1" dirty="0"/>
+              <a:t>Standardize Policy Management</a:t>
+            </a:r>
+          </a:p>
+          <a:p>
+            <a:endParaRPr lang="en-US" b="1" dirty="0"/>
+          </a:p>
+          <a:p>
+            <a:pPr marL="0" marR="0" lvl="0" indent="0" algn="l" defTabSz="914400" rtl="0" eaLnBrk="1" fontAlgn="auto" latinLnBrk="0" hangingPunct="1">
+              <a:lnSpc>
+                <a:spcPct val="100000"/>
+              </a:lnSpc>
+              <a:spcBef>
+                <a:spcPts val="0"/>
+              </a:spcBef>
+              <a:spcAft>
+                <a:spcPts val="0"/>
+              </a:spcAft>
+              <a:buClrTx/>
+              <a:buSzTx/>
+              <a:buFontTx/>
+              <a:buNone/>
+              <a:tabLst/>
+              <a:defRPr/>
+            </a:pPr>
+            <a:r>
+              <a:rPr lang="en-US" sz="1800" dirty="0">
+                <a:effectLst/>
+                <a:latin typeface="Times New Roman" panose="02020603050405020304" pitchFamily="18" charset="0"/>
+                <a:ea typeface="Calibri" panose="020F0502020204030204" pitchFamily="34" charset="0"/>
+              </a:rPr>
+              <a:t>Next, the organization must adopt a policy control framework.  Leaders approach this situation by combining existing frameworks, such as COBIT, ITIL, COSO, CMMI, and FAIR (Lindros, 2017).  These industry-standard frameworks assist project teams in implementing their artifacts using a secure, reliable, and maintainable process.  However, using only engineering-centric frameworks is potentially too narrow.  Many projects span different teams, role families, and organizations (e.g., vendors, consultants, and partners).  NCU-F must address these issues and limitations by formally declaring its project artifacts like charters, mandates, and roadmaps (</a:t>
+            </a:r>
+            <a:r>
+              <a:rPr lang="en-US" sz="1800" dirty="0" err="1">
+                <a:effectLst/>
+                <a:latin typeface="Times New Roman" panose="02020603050405020304" pitchFamily="18" charset="0"/>
+                <a:ea typeface="Calibri" panose="020F0502020204030204" pitchFamily="34" charset="0"/>
+              </a:rPr>
+              <a:t>Bonnal</a:t>
+            </a:r>
+            <a:r>
+              <a:rPr lang="en-US" sz="1800" dirty="0">
+                <a:effectLst/>
+                <a:latin typeface="Times New Roman" panose="02020603050405020304" pitchFamily="18" charset="0"/>
+                <a:ea typeface="Calibri" panose="020F0502020204030204" pitchFamily="34" charset="0"/>
+              </a:rPr>
+              <a:t> &amp; </a:t>
+            </a:r>
+            <a:r>
+              <a:rPr lang="en-US" sz="1800" dirty="0" err="1">
+                <a:effectLst/>
+                <a:latin typeface="Times New Roman" panose="02020603050405020304" pitchFamily="18" charset="0"/>
+                <a:ea typeface="Calibri" panose="020F0502020204030204" pitchFamily="34" charset="0"/>
+              </a:rPr>
+              <a:t>Rauser</a:t>
+            </a:r>
+            <a:r>
+              <a:rPr lang="en-US" sz="1800" dirty="0">
+                <a:effectLst/>
+                <a:latin typeface="Times New Roman" panose="02020603050405020304" pitchFamily="18" charset="0"/>
+                <a:ea typeface="Calibri" panose="020F0502020204030204" pitchFamily="34" charset="0"/>
+              </a:rPr>
+              <a:t>, 2017).  When documents explicitly declare universal agreements across the direction and appropriate guardrails, it unifies team communication.  Business professionals can then efficiently map the guiding decisions to their role and team-specific operating models.</a:t>
+            </a:r>
+          </a:p>
+          <a:p>
+            <a:endParaRPr lang="en-US" b="1" dirty="0"/>
+          </a:p>
+          <a:p>
+            <a:r>
+              <a:rPr lang="en-US" b="1" dirty="0"/>
+              <a:t>Delegate Area Ownership</a:t>
+            </a:r>
+          </a:p>
+          <a:p>
+            <a:endParaRPr lang="en-US" b="1" dirty="0"/>
+          </a:p>
+          <a:p>
+            <a:pPr marL="0" marR="0">
+              <a:lnSpc>
+                <a:spcPct val="200000"/>
+              </a:lnSpc>
+              <a:spcBef>
+                <a:spcPts val="0"/>
+              </a:spcBef>
+              <a:spcAft>
+                <a:spcPts val="0"/>
+              </a:spcAft>
+            </a:pPr>
+            <a:r>
+              <a:rPr lang="en-US" sz="1800" dirty="0">
+                <a:effectLst/>
+                <a:latin typeface="Times New Roman" panose="02020603050405020304" pitchFamily="18" charset="0"/>
+                <a:ea typeface="Calibri" panose="020F0502020204030204" pitchFamily="34" charset="0"/>
+              </a:rPr>
+              <a:t>The task force delegates many day-to-day decisions to internal Technical Communities.  Each community owns a specific cross-cutting concern (e.g., disaster recovery) and self-manages any enrollment criteria that govern membership eligibility.  Community members are responsible for reviewing new policy requests, debating ambiguity with existing policies, and proposing technical guidance.  Employees can define new technical communities by submitting requests to the task force oversight committee.  After approving the new community, the committee must appoint a sponsor to ensure the group successfully forms, storms, and eventually norms.</a:t>
+            </a:r>
+          </a:p>
+          <a:p>
+            <a:pPr marL="0" marR="0">
+              <a:lnSpc>
+                <a:spcPct val="200000"/>
+              </a:lnSpc>
+              <a:spcBef>
+                <a:spcPts val="0"/>
+              </a:spcBef>
+              <a:spcAft>
+                <a:spcPts val="0"/>
+              </a:spcAft>
+            </a:pPr>
+            <a:endParaRPr lang="en-US" sz="1800" dirty="0">
+              <a:effectLst/>
+              <a:latin typeface="Times New Roman" panose="02020603050405020304" pitchFamily="18" charset="0"/>
+              <a:ea typeface="Calibri" panose="020F0502020204030204" pitchFamily="34" charset="0"/>
+            </a:endParaRPr>
+          </a:p>
+          <a:p>
+            <a:pPr marL="0" marR="0">
+              <a:lnSpc>
+                <a:spcPct val="200000"/>
+              </a:lnSpc>
+              <a:spcBef>
+                <a:spcPts val="0"/>
+              </a:spcBef>
+              <a:spcAft>
+                <a:spcPts val="0"/>
+              </a:spcAft>
+            </a:pPr>
+            <a:r>
+              <a:rPr lang="en-US" sz="1800" dirty="0">
+                <a:effectLst/>
+                <a:latin typeface="Times New Roman" panose="02020603050405020304" pitchFamily="18" charset="0"/>
+                <a:ea typeface="Calibri" panose="020F0502020204030204" pitchFamily="34" charset="0"/>
+              </a:rPr>
+              <a:t>Employees that want to create a new policy must identify an appropriate community to vet their proposal.  The community will assign one or two reviewers to iterate the proposal until it adheres to internal standards.  After the reviewers approve the document, the authors request that their policy be globally visible within Policy Central, a proprietary document management system.  This system utilizes a NoSQL graph database representing the relationship between various documents, like a university citation library.  Policy documents initialize to a draft state that is only visible to their working team.  This design prevents external teams from accidentally referencing incomplete or unauthorized plans.  Typically, the community leaders promote the new concept through appropriate media (e.g., email group).  Suppose the reviewers do not support the change.  In that case, the authors can optionally escalate to the community’s program manager or executive stakeholder.</a:t>
+            </a:r>
+          </a:p>
+          <a:p>
+            <a:pPr marL="0" marR="0">
+              <a:lnSpc>
+                <a:spcPct val="200000"/>
+              </a:lnSpc>
+              <a:spcBef>
+                <a:spcPts val="0"/>
+              </a:spcBef>
+              <a:spcAft>
+                <a:spcPts val="0"/>
+              </a:spcAft>
+            </a:pPr>
+            <a:endParaRPr lang="en-US" sz="1800" dirty="0">
+              <a:effectLst/>
+              <a:latin typeface="Times New Roman" panose="02020603050405020304" pitchFamily="18" charset="0"/>
+              <a:ea typeface="Calibri" panose="020F0502020204030204" pitchFamily="34" charset="0"/>
+            </a:endParaRPr>
+          </a:p>
+          <a:p>
+            <a:pPr marL="0" marR="0">
+              <a:lnSpc>
+                <a:spcPct val="200000"/>
+              </a:lnSpc>
+              <a:spcBef>
+                <a:spcPts val="0"/>
+              </a:spcBef>
+              <a:spcAft>
+                <a:spcPts val="0"/>
+              </a:spcAft>
+            </a:pPr>
+            <a:r>
+              <a:rPr lang="en-US" sz="1800" b="1" dirty="0">
+                <a:effectLst/>
+                <a:latin typeface="Times New Roman" panose="02020603050405020304" pitchFamily="18" charset="0"/>
+                <a:ea typeface="Calibri" panose="020F0502020204030204" pitchFamily="34" charset="0"/>
+              </a:rPr>
+              <a:t>Audit Investment Results</a:t>
+            </a:r>
+          </a:p>
+          <a:p>
+            <a:pPr marL="0" marR="0">
+              <a:lnSpc>
+                <a:spcPct val="200000"/>
+              </a:lnSpc>
+              <a:spcBef>
+                <a:spcPts val="0"/>
+              </a:spcBef>
+              <a:spcAft>
+                <a:spcPts val="0"/>
+              </a:spcAft>
+            </a:pPr>
+            <a:endParaRPr lang="en-US" sz="1800" b="1" dirty="0">
+              <a:effectLst/>
+              <a:latin typeface="Times New Roman" panose="02020603050405020304" pitchFamily="18" charset="0"/>
+              <a:ea typeface="Calibri" panose="020F0502020204030204" pitchFamily="34" charset="0"/>
+            </a:endParaRPr>
+          </a:p>
+          <a:p>
+            <a:pPr marL="0" marR="0" lvl="0" indent="0" algn="l" defTabSz="914400" rtl="0" eaLnBrk="1" fontAlgn="auto" latinLnBrk="0" hangingPunct="1">
+              <a:lnSpc>
+                <a:spcPct val="200000"/>
+              </a:lnSpc>
+              <a:spcBef>
+                <a:spcPts val="0"/>
+              </a:spcBef>
+              <a:spcAft>
+                <a:spcPts val="0"/>
+              </a:spcAft>
+              <a:buClrTx/>
+              <a:buSzTx/>
+              <a:buFontTx/>
+              <a:buNone/>
+              <a:tabLst/>
+              <a:defRPr/>
+            </a:pPr>
+            <a:r>
+              <a:rPr lang="en-US" sz="1800" dirty="0">
+                <a:effectLst/>
+                <a:latin typeface="Times New Roman" panose="02020603050405020304" pitchFamily="18" charset="0"/>
+                <a:ea typeface="Calibri" panose="020F0502020204030204" pitchFamily="34" charset="0"/>
+              </a:rPr>
+              <a:t>Another expectation of the IT steering committee is to audit investments into IT resources (Ali, Green, &amp; Robb, 2015).  Many businesses like NCU-F purchase technology widgets to address challenges and introduce new capabilities.  Though, these widgets can fall to the wayside as new paradigms appear.  For instance, most enterprise data centers have an Apache Hadoop cluster because the platform provides high-available and elasticity.  Managing those environments is challenging, which gave rise to Kubernetes.  Eventually, something cloud-native will supersede Kubernetes.  Each application migration comes with costs and reliability risks.  Businesses must be cognizant of these trade-offs and understand the reasons not to embrace new technologies blindly.</a:t>
+            </a:r>
+          </a:p>
+          <a:p>
+            <a:pPr marL="0" marR="0">
+              <a:lnSpc>
+                <a:spcPct val="200000"/>
+              </a:lnSpc>
+              <a:spcBef>
+                <a:spcPts val="0"/>
+              </a:spcBef>
+              <a:spcAft>
+                <a:spcPts val="0"/>
+              </a:spcAft>
+            </a:pPr>
+            <a:endParaRPr lang="en-US" sz="1800" b="1" dirty="0">
+              <a:effectLst/>
+              <a:latin typeface="Times New Roman" panose="02020603050405020304" pitchFamily="18" charset="0"/>
+              <a:ea typeface="Calibri" panose="020F0502020204030204" pitchFamily="34" charset="0"/>
+            </a:endParaRPr>
+          </a:p>
+          <a:p>
+            <a:endParaRPr lang="en-US" b="1" dirty="0"/>
+          </a:p>
+        </p:txBody>
+      </p:sp>
+      <p:sp>
+        <p:nvSpPr>
+          <p:cNvPr id="4" name="Slide Number Placeholder 3"/>
+          <p:cNvSpPr>
+            <a:spLocks noGrp="1"/>
+          </p:cNvSpPr>
+          <p:nvPr>
+            <p:ph type="sldNum" sz="quarter" idx="5"/>
+          </p:nvPr>
+        </p:nvSpPr>
+        <p:spPr/>
+        <p:txBody>
+          <a:bodyPr/>
+          <a:lstStyle/>
+          <a:p>
+            <a:fld id="{CEE7ED23-8054-42FC-A808-6FDE147C0F4B}" type="slidenum">
+              <a:rPr lang="en-US" smtClean="0"/>
+              <a:t>6</a:t>
+            </a:fld>
+            <a:endParaRPr lang="en-US"/>
+          </a:p>
+        </p:txBody>
+      </p:sp>
+    </p:spTree>
+    <p:extLst>
+      <p:ext uri="{BB962C8B-B14F-4D97-AF65-F5344CB8AC3E}">
+        <p14:creationId xmlns:p14="http://schemas.microsoft.com/office/powerpoint/2010/main" val="3502487265"/>
+      </p:ext>
+    </p:extLst>
+  </p:cSld>
+  <p:clrMapOvr>
+    <a:masterClrMapping/>
+  </p:clrMapOvr>
+</p:notes>
+</file>
+
+<file path=ppt/notesSlides/notesSlide7.xml><?xml version="1.0" encoding="utf-8"?>
+<p:notes xmlns:a="http://schemas.openxmlformats.org/drawingml/2006/main" xmlns:r="http://schemas.openxmlformats.org/officeDocument/2006/relationships" xmlns:p="http://schemas.openxmlformats.org/presentationml/2006/main">
+  <p:cSld>
+    <p:spTree>
+      <p:nvGrpSpPr>
+        <p:cNvPr id="1" name=""/>
+        <p:cNvGrpSpPr/>
+        <p:nvPr/>
+      </p:nvGrpSpPr>
+      <p:grpSpPr>
+        <a:xfrm>
+          <a:off x="0" y="0"/>
+          <a:ext cx="0" cy="0"/>
+          <a:chOff x="0" y="0"/>
+          <a:chExt cx="0" cy="0"/>
+        </a:xfrm>
+      </p:grpSpPr>
+      <p:sp>
+        <p:nvSpPr>
+          <p:cNvPr id="2" name="Slide Image Placeholder 1"/>
+          <p:cNvSpPr>
+            <a:spLocks noGrp="1" noRot="1" noChangeAspect="1"/>
+          </p:cNvSpPr>
+          <p:nvPr>
+            <p:ph type="sldImg"/>
+          </p:nvPr>
+        </p:nvSpPr>
+        <p:spPr/>
+      </p:sp>
+      <p:sp>
+        <p:nvSpPr>
+          <p:cNvPr id="3" name="Notes Placeholder 2"/>
+          <p:cNvSpPr>
+            <a:spLocks noGrp="1"/>
+          </p:cNvSpPr>
+          <p:nvPr>
+            <p:ph type="body" idx="1"/>
+          </p:nvPr>
+        </p:nvSpPr>
+        <p:spPr/>
+        <p:txBody>
+          <a:bodyPr/>
+          <a:lstStyle/>
+          <a:p>
+            <a:pPr marL="342900" marR="0" lvl="0" indent="-342900">
+              <a:lnSpc>
+                <a:spcPct val="107000"/>
+              </a:lnSpc>
+              <a:spcBef>
+                <a:spcPts val="0"/>
+              </a:spcBef>
+              <a:spcAft>
+                <a:spcPts val="0"/>
+              </a:spcAft>
+              <a:buFont typeface="Symbol" panose="05050102010706020507" pitchFamily="18" charset="2"/>
+              <a:buChar char=""/>
+            </a:pPr>
+            <a:r>
+              <a:rPr lang="en-US" sz="1100" dirty="0">
+                <a:effectLst/>
+                <a:latin typeface="Calibri" panose="020F0502020204030204" pitchFamily="34" charset="0"/>
+                <a:ea typeface="Calibri" panose="020F0502020204030204" pitchFamily="34" charset="0"/>
+                <a:cs typeface="Times New Roman" panose="02020603050405020304" pitchFamily="18" charset="0"/>
+              </a:rPr>
+              <a:t>We need a common vocabulary between teams and that begins with naming conventions.</a:t>
+            </a:r>
+          </a:p>
+          <a:p>
+            <a:pPr marL="742950" marR="0" lvl="1" indent="-285750">
+              <a:lnSpc>
+                <a:spcPct val="107000"/>
+              </a:lnSpc>
+              <a:spcBef>
+                <a:spcPts val="0"/>
+              </a:spcBef>
+              <a:spcAft>
+                <a:spcPts val="0"/>
+              </a:spcAft>
+              <a:buFont typeface="Courier New" panose="02070309020205020404" pitchFamily="49" charset="0"/>
+              <a:buChar char="o"/>
+            </a:pPr>
+            <a:r>
+              <a:rPr lang="en-US" sz="1100" dirty="0">
+                <a:effectLst/>
+                <a:latin typeface="Calibri" panose="020F0502020204030204" pitchFamily="34" charset="0"/>
+                <a:ea typeface="Calibri" panose="020F0502020204030204" pitchFamily="34" charset="0"/>
+                <a:cs typeface="Times New Roman" panose="02020603050405020304" pitchFamily="18" charset="0"/>
+              </a:rPr>
+              <a:t>Its challenging for teams to assist one another because of these differences</a:t>
+            </a:r>
+          </a:p>
+          <a:p>
+            <a:pPr marL="742950" marR="0" lvl="1" indent="-285750">
+              <a:lnSpc>
+                <a:spcPct val="107000"/>
+              </a:lnSpc>
+              <a:spcBef>
+                <a:spcPts val="0"/>
+              </a:spcBef>
+              <a:spcAft>
+                <a:spcPts val="0"/>
+              </a:spcAft>
+              <a:buFont typeface="Courier New" panose="02070309020205020404" pitchFamily="49" charset="0"/>
+              <a:buChar char="o"/>
+            </a:pPr>
+            <a:r>
+              <a:rPr lang="en-US" sz="1100" dirty="0">
+                <a:effectLst/>
+                <a:latin typeface="Calibri" panose="020F0502020204030204" pitchFamily="34" charset="0"/>
+                <a:ea typeface="Calibri" panose="020F0502020204030204" pitchFamily="34" charset="0"/>
+                <a:cs typeface="Times New Roman" panose="02020603050405020304" pitchFamily="18" charset="0"/>
+              </a:rPr>
+              <a:t>It’s a non-goal to rename every artifact because of the inherent costs</a:t>
+            </a:r>
+          </a:p>
+          <a:p>
+            <a:pPr marL="342900" marR="0" lvl="0" indent="-342900">
+              <a:lnSpc>
+                <a:spcPct val="107000"/>
+              </a:lnSpc>
+              <a:spcBef>
+                <a:spcPts val="0"/>
+              </a:spcBef>
+              <a:spcAft>
+                <a:spcPts val="0"/>
+              </a:spcAft>
+              <a:buFont typeface="Symbol" panose="05050102010706020507" pitchFamily="18" charset="2"/>
+              <a:buChar char=""/>
+            </a:pPr>
+            <a:r>
+              <a:rPr lang="en-US" sz="1100" dirty="0">
+                <a:effectLst/>
+                <a:latin typeface="Calibri" panose="020F0502020204030204" pitchFamily="34" charset="0"/>
+                <a:ea typeface="Calibri" panose="020F0502020204030204" pitchFamily="34" charset="0"/>
+                <a:cs typeface="Times New Roman" panose="02020603050405020304" pitchFamily="18" charset="0"/>
+              </a:rPr>
+              <a:t>Instead, we will create a resource hierarchy and associate metadata within it</a:t>
+            </a:r>
+          </a:p>
+          <a:p>
+            <a:pPr marL="742950" marR="0" lvl="1" indent="-285750">
+              <a:lnSpc>
+                <a:spcPct val="107000"/>
+              </a:lnSpc>
+              <a:spcBef>
+                <a:spcPts val="0"/>
+              </a:spcBef>
+              <a:spcAft>
+                <a:spcPts val="0"/>
+              </a:spcAft>
+              <a:buFont typeface="Courier New" panose="02070309020205020404" pitchFamily="49" charset="0"/>
+              <a:buChar char="o"/>
+            </a:pPr>
+            <a:r>
+              <a:rPr lang="en-US" sz="1100" dirty="0">
+                <a:effectLst/>
+                <a:latin typeface="Calibri" panose="020F0502020204030204" pitchFamily="34" charset="0"/>
+                <a:ea typeface="Calibri" panose="020F0502020204030204" pitchFamily="34" charset="0"/>
+                <a:cs typeface="Times New Roman" panose="02020603050405020304" pitchFamily="18" charset="0"/>
+              </a:rPr>
+              <a:t>For instance, there will are different branches for servers, workstations, and networking devices.  </a:t>
+            </a:r>
+          </a:p>
+          <a:p>
+            <a:pPr marL="742950" marR="0" lvl="1" indent="-285750">
+              <a:lnSpc>
+                <a:spcPct val="107000"/>
+              </a:lnSpc>
+              <a:spcBef>
+                <a:spcPts val="0"/>
+              </a:spcBef>
+              <a:spcAft>
+                <a:spcPts val="0"/>
+              </a:spcAft>
+              <a:buFont typeface="Courier New" panose="02070309020205020404" pitchFamily="49" charset="0"/>
+              <a:buChar char="o"/>
+            </a:pPr>
+            <a:r>
+              <a:rPr lang="en-US" sz="1100" dirty="0">
+                <a:effectLst/>
+                <a:latin typeface="Calibri" panose="020F0502020204030204" pitchFamily="34" charset="0"/>
+                <a:ea typeface="Calibri" panose="020F0502020204030204" pitchFamily="34" charset="0"/>
+                <a:cs typeface="Times New Roman" panose="02020603050405020304" pitchFamily="18" charset="0"/>
+              </a:rPr>
+              <a:t>Under those root paths are specific cross cutting concerns that require community defined policies (e.g., security and disaster recovery)</a:t>
+            </a:r>
+          </a:p>
+          <a:p>
+            <a:pPr marL="742950" marR="0" lvl="1" indent="-285750">
+              <a:lnSpc>
+                <a:spcPct val="107000"/>
+              </a:lnSpc>
+              <a:spcBef>
+                <a:spcPts val="0"/>
+              </a:spcBef>
+              <a:spcAft>
+                <a:spcPts val="0"/>
+              </a:spcAft>
+              <a:buFont typeface="Courier New" panose="02070309020205020404" pitchFamily="49" charset="0"/>
+              <a:buChar char="o"/>
+            </a:pPr>
+            <a:r>
+              <a:rPr lang="en-US" sz="1100" dirty="0">
+                <a:effectLst/>
+                <a:latin typeface="Calibri" panose="020F0502020204030204" pitchFamily="34" charset="0"/>
+                <a:ea typeface="Calibri" panose="020F0502020204030204" pitchFamily="34" charset="0"/>
+                <a:cs typeface="Times New Roman" panose="02020603050405020304" pitchFamily="18" charset="0"/>
+              </a:rPr>
+              <a:t>Teams can review the tree structure to understand guard rails, requirements, and exceptions.</a:t>
+            </a:r>
+          </a:p>
+          <a:p>
+            <a:pPr marL="342900" marR="0" lvl="0" indent="-342900">
+              <a:lnSpc>
+                <a:spcPct val="107000"/>
+              </a:lnSpc>
+              <a:spcBef>
+                <a:spcPts val="0"/>
+              </a:spcBef>
+              <a:spcAft>
+                <a:spcPts val="800"/>
+              </a:spcAft>
+              <a:buFont typeface="Symbol" panose="05050102010706020507" pitchFamily="18" charset="2"/>
+              <a:buChar char=""/>
+            </a:pPr>
+            <a:r>
+              <a:rPr lang="en-US" sz="1100" dirty="0">
+                <a:effectLst/>
+                <a:latin typeface="Calibri" panose="020F0502020204030204" pitchFamily="34" charset="0"/>
+                <a:ea typeface="Calibri" panose="020F0502020204030204" pitchFamily="34" charset="0"/>
+                <a:cs typeface="Times New Roman" panose="02020603050405020304" pitchFamily="18" charset="0"/>
+              </a:rPr>
+              <a:t>The committee owns the policy lifecycle process and communities own its execution</a:t>
+            </a:r>
+          </a:p>
+          <a:p>
+            <a:pPr marL="0" marR="0">
+              <a:lnSpc>
+                <a:spcPct val="200000"/>
+              </a:lnSpc>
+              <a:spcBef>
+                <a:spcPts val="0"/>
+              </a:spcBef>
+              <a:spcAft>
+                <a:spcPts val="0"/>
+              </a:spcAft>
+            </a:pPr>
+            <a:endParaRPr lang="en-US" sz="1800" b="1" dirty="0">
+              <a:effectLst/>
+              <a:latin typeface="Times New Roman" panose="02020603050405020304" pitchFamily="18" charset="0"/>
+            </a:endParaRPr>
+          </a:p>
+          <a:p>
+            <a:pPr marL="0" marR="0">
+              <a:lnSpc>
+                <a:spcPct val="200000"/>
+              </a:lnSpc>
+              <a:spcBef>
+                <a:spcPts val="0"/>
+              </a:spcBef>
+              <a:spcAft>
+                <a:spcPts val="0"/>
+              </a:spcAft>
+            </a:pPr>
+            <a:r>
+              <a:rPr lang="en-US" sz="1800" b="1" dirty="0">
+                <a:effectLst/>
+                <a:latin typeface="Times New Roman" panose="02020603050405020304" pitchFamily="18" charset="0"/>
+              </a:rPr>
+              <a:t>Naming Standards</a:t>
+            </a:r>
+          </a:p>
+          <a:p>
+            <a:pPr marL="0" marR="0">
+              <a:lnSpc>
+                <a:spcPct val="200000"/>
+              </a:lnSpc>
+              <a:spcBef>
+                <a:spcPts val="0"/>
+              </a:spcBef>
+              <a:spcAft>
+                <a:spcPts val="0"/>
+              </a:spcAft>
+            </a:pPr>
+            <a:r>
+              <a:rPr lang="en-US" sz="1800" dirty="0">
+                <a:effectLst/>
+                <a:latin typeface="Times New Roman" panose="02020603050405020304" pitchFamily="18" charset="0"/>
+                <a:ea typeface="Calibri" panose="020F0502020204030204" pitchFamily="34" charset="0"/>
+              </a:rPr>
+              <a:t>Enterprise organizations like NCU-F manage hundreds of thousands to millions of resources.  Historically, individual business units set naming schemas and deferred enforcement to their operations teams.  This strategy enables more autonomy and flexibility in exchange for less organizational consistency.  However, it is challenging to discover, monitor, and react to operational issues without naming conventions and standards.  For example, central alerting rules must explicitly support the various permutations, manifesting complexity throughout the systems management lifecycle.</a:t>
+            </a:r>
+          </a:p>
+          <a:p>
+            <a:pPr marL="0" marR="0">
+              <a:lnSpc>
+                <a:spcPct val="200000"/>
+              </a:lnSpc>
+              <a:spcBef>
+                <a:spcPts val="0"/>
+              </a:spcBef>
+              <a:spcAft>
+                <a:spcPts val="0"/>
+              </a:spcAft>
+            </a:pPr>
+            <a:endParaRPr lang="en-US" sz="1800" dirty="0">
+              <a:effectLst/>
+              <a:latin typeface="Times New Roman" panose="02020603050405020304" pitchFamily="18" charset="0"/>
+              <a:ea typeface="Calibri" panose="020F0502020204030204" pitchFamily="34" charset="0"/>
+            </a:endParaRPr>
+          </a:p>
+          <a:p>
+            <a:pPr marL="0" marR="0">
+              <a:lnSpc>
+                <a:spcPct val="200000"/>
+              </a:lnSpc>
+              <a:spcBef>
+                <a:spcPts val="0"/>
+              </a:spcBef>
+              <a:spcAft>
+                <a:spcPts val="0"/>
+              </a:spcAft>
+            </a:pPr>
+            <a:r>
+              <a:rPr lang="en-US" sz="1800" b="1" dirty="0">
+                <a:effectLst/>
+                <a:latin typeface="Times New Roman" panose="02020603050405020304" pitchFamily="18" charset="0"/>
+              </a:rPr>
+              <a:t>Rejected Solutions</a:t>
+            </a:r>
+          </a:p>
+          <a:p>
+            <a:pPr marL="0" marR="0">
+              <a:lnSpc>
+                <a:spcPct val="200000"/>
+              </a:lnSpc>
+              <a:spcBef>
+                <a:spcPts val="0"/>
+              </a:spcBef>
+              <a:spcAft>
+                <a:spcPts val="0"/>
+              </a:spcAft>
+            </a:pPr>
+            <a:r>
+              <a:rPr lang="en-US" sz="1800" dirty="0">
+                <a:effectLst/>
+                <a:latin typeface="Times New Roman" panose="02020603050405020304" pitchFamily="18" charset="0"/>
+                <a:ea typeface="Calibri" panose="020F0502020204030204" pitchFamily="34" charset="0"/>
+              </a:rPr>
+              <a:t>Nevertheless, renaming every object is prohibitively expensive.  The enterprise could embark upon prolonged migration that seeks to reach a point of eventual consistency.  During the transition phase, department leaders prioritize shared resources over internal implementation details.  For instance, the edge router into the Credit team’s app must be discoverable by all NCU-F personal.  In contrast, a smaller cohort must interact with traffic policies within the Credit team’s private subnets.  Since the team size directly impacts its ability to support a custom vocabulary, this dimension forms a natural sorting order.</a:t>
+            </a:r>
+          </a:p>
+          <a:p>
+            <a:pPr marL="0" marR="0">
+              <a:lnSpc>
+                <a:spcPct val="200000"/>
+              </a:lnSpc>
+              <a:spcBef>
+                <a:spcPts val="0"/>
+              </a:spcBef>
+              <a:spcAft>
+                <a:spcPts val="0"/>
+              </a:spcAft>
+            </a:pPr>
+            <a:endParaRPr lang="en-US" sz="1800" dirty="0">
+              <a:effectLst/>
+              <a:latin typeface="Times New Roman" panose="02020603050405020304" pitchFamily="18" charset="0"/>
+              <a:ea typeface="Calibri" panose="020F0502020204030204" pitchFamily="34" charset="0"/>
+            </a:endParaRPr>
+          </a:p>
+          <a:p>
+            <a:pPr marL="0" marR="0">
+              <a:lnSpc>
+                <a:spcPct val="200000"/>
+              </a:lnSpc>
+              <a:spcBef>
+                <a:spcPts val="0"/>
+              </a:spcBef>
+              <a:spcAft>
+                <a:spcPts val="0"/>
+              </a:spcAft>
+            </a:pPr>
+            <a:r>
+              <a:rPr lang="en-US" sz="1800" b="1" dirty="0">
+                <a:effectLst/>
+                <a:latin typeface="Times New Roman" panose="02020603050405020304" pitchFamily="18" charset="0"/>
+              </a:rPr>
+              <a:t>Accepted Solution</a:t>
+            </a:r>
+          </a:p>
+          <a:p>
+            <a:pPr marL="0" marR="0">
+              <a:lnSpc>
+                <a:spcPct val="200000"/>
+              </a:lnSpc>
+              <a:spcBef>
+                <a:spcPts val="0"/>
+              </a:spcBef>
+              <a:spcAft>
+                <a:spcPts val="0"/>
+              </a:spcAft>
+            </a:pPr>
+            <a:r>
+              <a:rPr lang="en-US" sz="1800" b="0" dirty="0">
+                <a:effectLst/>
+                <a:latin typeface="Times New Roman" panose="02020603050405020304" pitchFamily="18" charset="0"/>
+                <a:ea typeface="Calibri" panose="020F0502020204030204" pitchFamily="34" charset="0"/>
+              </a:rPr>
+              <a:t>H</a:t>
+            </a:r>
+            <a:r>
+              <a:rPr lang="en-US" sz="1800" dirty="0">
+                <a:effectLst/>
+                <a:latin typeface="Times New Roman" panose="02020603050405020304" pitchFamily="18" charset="0"/>
+                <a:ea typeface="Calibri" panose="020F0502020204030204" pitchFamily="34" charset="0"/>
+              </a:rPr>
+              <a:t>owever, the time to reach organizational consistency can become too costly as well.  The operational and engineering teams will surely encounter feature regression risk, and the customer will not see any direct value.  Furthermore, the hybrid state will disrupt the existing team vocabularies and cause unnecessary pain.  NCU-F wants to avoid these scenarios and is willing to accept the technical debt.  This decision pushes the organization toward standardizing the metadata associated with the various resources (Harper, 2019).  That metadata can reside within Enterprise Resource Management Systems (ERMS), which meets the discovery and monitoring requirements.  Additionally, third-party tools exist for bulk importing resources and enabling version control capabilities.</a:t>
+            </a:r>
+          </a:p>
+          <a:p>
+            <a:pPr marL="0" marR="0">
+              <a:lnSpc>
+                <a:spcPct val="200000"/>
+              </a:lnSpc>
+              <a:spcBef>
+                <a:spcPts val="0"/>
+              </a:spcBef>
+              <a:spcAft>
+                <a:spcPts val="0"/>
+              </a:spcAft>
+            </a:pPr>
+            <a:endParaRPr lang="en-US" sz="1800" b="1" dirty="0">
+              <a:effectLst/>
+              <a:latin typeface="Times New Roman" panose="02020603050405020304" pitchFamily="18" charset="0"/>
+            </a:endParaRPr>
+          </a:p>
+          <a:p>
+            <a:pPr marL="0" marR="0">
+              <a:lnSpc>
+                <a:spcPct val="200000"/>
+              </a:lnSpc>
+              <a:spcBef>
+                <a:spcPts val="0"/>
+              </a:spcBef>
+              <a:spcAft>
+                <a:spcPts val="0"/>
+              </a:spcAft>
+            </a:pPr>
+            <a:r>
+              <a:rPr lang="en-US" sz="1800" b="1" dirty="0">
+                <a:effectLst/>
+                <a:latin typeface="Times New Roman" panose="02020603050405020304" pitchFamily="18" charset="0"/>
+              </a:rPr>
+              <a:t>Resource Hierarchy</a:t>
+            </a:r>
+          </a:p>
+          <a:p>
+            <a:pPr marL="0" marR="0">
+              <a:lnSpc>
+                <a:spcPct val="200000"/>
+              </a:lnSpc>
+              <a:spcBef>
+                <a:spcPts val="0"/>
+              </a:spcBef>
+              <a:spcAft>
+                <a:spcPts val="0"/>
+              </a:spcAft>
+            </a:pPr>
+            <a:r>
+              <a:rPr lang="en-US" sz="1800" dirty="0">
+                <a:effectLst/>
+                <a:latin typeface="Times New Roman" panose="02020603050405020304" pitchFamily="18" charset="0"/>
+                <a:ea typeface="Calibri" panose="020F0502020204030204" pitchFamily="34" charset="0"/>
+              </a:rPr>
+              <a:t>NCU-F requires business units to record their resources within the central ERMS database.  The database utilizes a hierarchical structure with strict rules where resource definitions can reside (Table 2).  For instance, all routers exist under the namespace /devices/routers, and all workstations follow the format /domain policies/workstations.  </a:t>
+            </a:r>
+          </a:p>
+          <a:p>
+            <a:pPr marL="0" marR="0">
+              <a:lnSpc>
+                <a:spcPct val="200000"/>
+              </a:lnSpc>
+              <a:spcBef>
+                <a:spcPts val="0"/>
+              </a:spcBef>
+              <a:spcAft>
+                <a:spcPts val="0"/>
+              </a:spcAft>
+            </a:pPr>
+            <a:endParaRPr lang="en-US" sz="1800" b="1" dirty="0">
+              <a:effectLst/>
+              <a:latin typeface="Times New Roman" panose="02020603050405020304" pitchFamily="18" charset="0"/>
+            </a:endParaRPr>
+          </a:p>
+          <a:p>
+            <a:pPr marL="0" marR="0">
+              <a:lnSpc>
+                <a:spcPct val="200000"/>
+              </a:lnSpc>
+              <a:spcBef>
+                <a:spcPts val="0"/>
+              </a:spcBef>
+              <a:spcAft>
+                <a:spcPts val="0"/>
+              </a:spcAft>
+            </a:pPr>
+            <a:r>
+              <a:rPr lang="en-US" sz="1800" b="1" dirty="0">
+                <a:effectLst/>
+                <a:latin typeface="Times New Roman" panose="02020603050405020304" pitchFamily="18" charset="0"/>
+              </a:rPr>
+              <a:t>Mandatory Tags</a:t>
+            </a:r>
+          </a:p>
+          <a:p>
+            <a:pPr marL="0" marR="0">
+              <a:lnSpc>
+                <a:spcPct val="200000"/>
+              </a:lnSpc>
+              <a:spcBef>
+                <a:spcPts val="0"/>
+              </a:spcBef>
+              <a:spcAft>
+                <a:spcPts val="0"/>
+              </a:spcAft>
+            </a:pPr>
+            <a:r>
+              <a:rPr lang="en-US" sz="1800" dirty="0">
+                <a:effectLst/>
+                <a:latin typeface="Times New Roman" panose="02020603050405020304" pitchFamily="18" charset="0"/>
+                <a:ea typeface="Calibri" panose="020F0502020204030204" pitchFamily="34" charset="0"/>
+              </a:rPr>
+              <a:t>After declaring the resource, operations staff must add several resource-type specific mandatory tags (Table 3).  Optionally, the team can include arbitrary additional tags to align with legacy asset management processes.  Data validation processes periodically assess the metadata and report inaccurate or incomplete information.  It is the responsibility of the owning team to remediate the issue promptly.</a:t>
+            </a:r>
+          </a:p>
+        </p:txBody>
+      </p:sp>
+      <p:sp>
+        <p:nvSpPr>
+          <p:cNvPr id="4" name="Slide Number Placeholder 3"/>
+          <p:cNvSpPr>
+            <a:spLocks noGrp="1"/>
+          </p:cNvSpPr>
+          <p:nvPr>
+            <p:ph type="sldNum" sz="quarter" idx="5"/>
+          </p:nvPr>
+        </p:nvSpPr>
+        <p:spPr/>
+        <p:txBody>
+          <a:bodyPr/>
+          <a:lstStyle/>
+          <a:p>
+            <a:fld id="{CEE7ED23-8054-42FC-A808-6FDE147C0F4B}" type="slidenum">
+              <a:rPr lang="en-US" smtClean="0"/>
+              <a:t>7</a:t>
+            </a:fld>
+            <a:endParaRPr lang="en-US"/>
+          </a:p>
+        </p:txBody>
+      </p:sp>
+    </p:spTree>
+    <p:extLst>
+      <p:ext uri="{BB962C8B-B14F-4D97-AF65-F5344CB8AC3E}">
+        <p14:creationId xmlns:p14="http://schemas.microsoft.com/office/powerpoint/2010/main" val="1180685283"/>
+      </p:ext>
+    </p:extLst>
+  </p:cSld>
+  <p:clrMapOvr>
+    <a:masterClrMapping/>
+  </p:clrMapOvr>
+</p:notes>
+</file>
+
+<file path=ppt/notesSlides/notesSlide8.xml><?xml version="1.0" encoding="utf-8"?>
+<p:notes xmlns:a="http://schemas.openxmlformats.org/drawingml/2006/main" xmlns:r="http://schemas.openxmlformats.org/officeDocument/2006/relationships" xmlns:p="http://schemas.openxmlformats.org/presentationml/2006/main">
+  <p:cSld>
+    <p:spTree>
+      <p:nvGrpSpPr>
+        <p:cNvPr id="1" name=""/>
+        <p:cNvGrpSpPr/>
+        <p:nvPr/>
+      </p:nvGrpSpPr>
+      <p:grpSpPr>
+        <a:xfrm>
+          <a:off x="0" y="0"/>
+          <a:ext cx="0" cy="0"/>
+          <a:chOff x="0" y="0"/>
+          <a:chExt cx="0" cy="0"/>
+        </a:xfrm>
+      </p:grpSpPr>
+      <p:sp>
+        <p:nvSpPr>
+          <p:cNvPr id="2" name="Slide Image Placeholder 1"/>
+          <p:cNvSpPr>
+            <a:spLocks noGrp="1" noRot="1" noChangeAspect="1"/>
+          </p:cNvSpPr>
+          <p:nvPr>
+            <p:ph type="sldImg"/>
+          </p:nvPr>
+        </p:nvSpPr>
+        <p:spPr/>
+      </p:sp>
+      <p:sp>
+        <p:nvSpPr>
+          <p:cNvPr id="3" name="Notes Placeholder 2"/>
+          <p:cNvSpPr>
+            <a:spLocks noGrp="1"/>
+          </p:cNvSpPr>
+          <p:nvPr>
+            <p:ph type="body" idx="1"/>
+          </p:nvPr>
+        </p:nvSpPr>
+        <p:spPr/>
+        <p:txBody>
+          <a:bodyPr/>
+          <a:lstStyle/>
+          <a:p>
+            <a:pPr marL="0" marR="0">
+              <a:lnSpc>
+                <a:spcPct val="200000"/>
+              </a:lnSpc>
+              <a:spcBef>
+                <a:spcPts val="0"/>
+              </a:spcBef>
+              <a:spcAft>
+                <a:spcPts val="0"/>
+              </a:spcAft>
+            </a:pPr>
+            <a:r>
+              <a:rPr lang="en-US" sz="1800" dirty="0">
+                <a:effectLst/>
+                <a:latin typeface="Times New Roman" panose="02020603050405020304" pitchFamily="18" charset="0"/>
+                <a:ea typeface="Calibri" panose="020F0502020204030204" pitchFamily="34" charset="0"/>
+              </a:rPr>
+              <a:t>NCU-F’s senior leadership team owns forming the task force to define Information Technology (IT) policies that enable the Business Units to collaborate more efficiently.  This team has stakeholders from the core divisions, executive sponsors, and legal representatives.  The stakeholders are responsible for ensuring standardization is continuously maturing across the organization.  This expectation requires formal processes for managing policy lifecycles.</a:t>
+            </a:r>
+          </a:p>
+          <a:p>
+            <a:pPr marL="0" marR="0">
+              <a:lnSpc>
+                <a:spcPct val="200000"/>
+              </a:lnSpc>
+              <a:spcBef>
+                <a:spcPts val="0"/>
+              </a:spcBef>
+              <a:spcAft>
+                <a:spcPts val="0"/>
+              </a:spcAft>
+            </a:pPr>
+            <a:endParaRPr lang="en-US" sz="1800" b="1" dirty="0">
+              <a:effectLst/>
+              <a:latin typeface="Times New Roman" panose="02020603050405020304" pitchFamily="18" charset="0"/>
+            </a:endParaRPr>
+          </a:p>
+          <a:p>
+            <a:pPr marL="0" marR="0">
+              <a:lnSpc>
+                <a:spcPct val="200000"/>
+              </a:lnSpc>
+              <a:spcBef>
+                <a:spcPts val="0"/>
+              </a:spcBef>
+              <a:spcAft>
+                <a:spcPts val="0"/>
+              </a:spcAft>
+            </a:pPr>
+            <a:r>
+              <a:rPr lang="en-US" sz="1800" b="1" dirty="0">
+                <a:effectLst/>
+                <a:latin typeface="Times New Roman" panose="02020603050405020304" pitchFamily="18" charset="0"/>
+              </a:rPr>
+              <a:t>Policy Creation Process</a:t>
+            </a:r>
+          </a:p>
+          <a:p>
+            <a:pPr marL="0" marR="0">
+              <a:lnSpc>
+                <a:spcPct val="200000"/>
+              </a:lnSpc>
+              <a:spcBef>
+                <a:spcPts val="0"/>
+              </a:spcBef>
+              <a:spcAft>
+                <a:spcPts val="0"/>
+              </a:spcAft>
+            </a:pPr>
+            <a:r>
+              <a:rPr lang="en-US" sz="1800" dirty="0">
+                <a:effectLst/>
+                <a:latin typeface="Times New Roman" panose="02020603050405020304" pitchFamily="18" charset="0"/>
+                <a:ea typeface="Calibri" panose="020F0502020204030204" pitchFamily="34" charset="0"/>
+              </a:rPr>
+              <a:t>NCU-F defines specific norms and expectations for introducing, revising, and removing IT policies (see Figure 1).  All employees are encouraged to participate in these processes and provide relevant feedback for stakeholders.</a:t>
+            </a:r>
+          </a:p>
+          <a:p>
+            <a:endParaRPr lang="en-US" dirty="0"/>
+          </a:p>
+          <a:p>
+            <a:pPr marL="342900" marR="0" lvl="0" indent="-342900">
+              <a:lnSpc>
+                <a:spcPct val="200000"/>
+              </a:lnSpc>
+              <a:spcBef>
+                <a:spcPts val="0"/>
+              </a:spcBef>
+              <a:spcAft>
+                <a:spcPts val="0"/>
+              </a:spcAft>
+              <a:buFont typeface="+mj-lt"/>
+              <a:buAutoNum type="arabicPeriod"/>
+            </a:pPr>
+            <a:r>
+              <a:rPr lang="en-US" sz="1800" dirty="0">
+                <a:effectLst/>
+                <a:latin typeface="Times New Roman" panose="02020603050405020304" pitchFamily="18" charset="0"/>
+                <a:ea typeface="Calibri" panose="020F0502020204030204" pitchFamily="34" charset="0"/>
+              </a:rPr>
+              <a:t>IT policies define processes for approaching business challenges (Gartner, 2021).  The business enforces that perspective by requiring each policy document to explicitly identify the customer (e.g., internal or external users) and their needs. </a:t>
+            </a:r>
+          </a:p>
+          <a:p>
+            <a:pPr marL="342900" marR="0" lvl="0" indent="-342900">
+              <a:lnSpc>
+                <a:spcPct val="200000"/>
+              </a:lnSpc>
+              <a:spcBef>
+                <a:spcPts val="0"/>
+              </a:spcBef>
+              <a:spcAft>
+                <a:spcPts val="0"/>
+              </a:spcAft>
+              <a:buFont typeface="+mj-lt"/>
+              <a:buAutoNum type="arabicPeriod"/>
+            </a:pPr>
+            <a:r>
+              <a:rPr lang="en-US" sz="1800" dirty="0">
+                <a:effectLst/>
+                <a:latin typeface="Times New Roman" panose="02020603050405020304" pitchFamily="18" charset="0"/>
+                <a:ea typeface="Calibri" panose="020F0502020204030204" pitchFamily="34" charset="0"/>
+              </a:rPr>
+              <a:t>Next, the authors must explain in two to three paragraphs what methodology lead to these requirements.  Ideally, the methodology will include direct customer stories and metrics.  </a:t>
+            </a:r>
+          </a:p>
+          <a:p>
+            <a:pPr marL="342900" marR="0" lvl="0" indent="-342900">
+              <a:lnSpc>
+                <a:spcPct val="200000"/>
+              </a:lnSpc>
+              <a:spcBef>
+                <a:spcPts val="0"/>
+              </a:spcBef>
+              <a:spcAft>
+                <a:spcPts val="0"/>
+              </a:spcAft>
+              <a:buFont typeface="+mj-lt"/>
+              <a:buAutoNum type="arabicPeriod"/>
+            </a:pPr>
+            <a:r>
+              <a:rPr lang="en-US" sz="1800" dirty="0">
+                <a:effectLst/>
+                <a:latin typeface="Times New Roman" panose="02020603050405020304" pitchFamily="18" charset="0"/>
+                <a:ea typeface="Calibri" panose="020F0502020204030204" pitchFamily="34" charset="0"/>
+              </a:rPr>
+              <a:t>The third section enumerates existing policies and their relationship.  Those relationships can include standard vocabulary definitions, </a:t>
+            </a:r>
+            <a:r>
+              <a:rPr lang="en-US" sz="1800" dirty="0" err="1">
+                <a:effectLst/>
+                <a:latin typeface="Times New Roman" panose="02020603050405020304" pitchFamily="18" charset="0"/>
+                <a:ea typeface="Calibri" panose="020F0502020204030204" pitchFamily="34" charset="0"/>
+              </a:rPr>
+              <a:t>supersedence</a:t>
+            </a:r>
+            <a:r>
+              <a:rPr lang="en-US" sz="1800" dirty="0">
+                <a:effectLst/>
+                <a:latin typeface="Times New Roman" panose="02020603050405020304" pitchFamily="18" charset="0"/>
+                <a:ea typeface="Calibri" panose="020F0502020204030204" pitchFamily="34" charset="0"/>
+              </a:rPr>
+              <a:t>, and standard procedures.</a:t>
+            </a:r>
+          </a:p>
+          <a:p>
+            <a:pPr marL="342900" marR="0" lvl="0" indent="-342900">
+              <a:lnSpc>
+                <a:spcPct val="200000"/>
+              </a:lnSpc>
+              <a:spcBef>
+                <a:spcPts val="0"/>
+              </a:spcBef>
+              <a:spcAft>
+                <a:spcPts val="0"/>
+              </a:spcAft>
+              <a:buFont typeface="+mj-lt"/>
+              <a:buAutoNum type="arabicPeriod"/>
+            </a:pPr>
+            <a:r>
+              <a:rPr lang="en-US" sz="1800" dirty="0">
+                <a:effectLst/>
+                <a:latin typeface="Times New Roman" panose="02020603050405020304" pitchFamily="18" charset="0"/>
+                <a:ea typeface="Calibri" panose="020F0502020204030204" pitchFamily="34" charset="0"/>
+              </a:rPr>
+              <a:t>Fourth, declare the foundational tenants of this new policy (</a:t>
+            </a:r>
+            <a:r>
+              <a:rPr lang="en-US" sz="1800" dirty="0" err="1">
+                <a:effectLst/>
+                <a:latin typeface="Times New Roman" panose="02020603050405020304" pitchFamily="18" charset="0"/>
+                <a:ea typeface="Calibri" panose="020F0502020204030204" pitchFamily="34" charset="0"/>
+              </a:rPr>
+              <a:t>Bryar</a:t>
+            </a:r>
+            <a:r>
+              <a:rPr lang="en-US" sz="1800" dirty="0">
+                <a:effectLst/>
+                <a:latin typeface="Times New Roman" panose="02020603050405020304" pitchFamily="18" charset="0"/>
+                <a:ea typeface="Calibri" panose="020F0502020204030204" pitchFamily="34" charset="0"/>
+              </a:rPr>
+              <a:t> &amp; </a:t>
+            </a:r>
+            <a:r>
+              <a:rPr lang="en-US" sz="1800" dirty="0" err="1">
+                <a:effectLst/>
+                <a:latin typeface="Times New Roman" panose="02020603050405020304" pitchFamily="18" charset="0"/>
+                <a:ea typeface="Calibri" panose="020F0502020204030204" pitchFamily="34" charset="0"/>
+              </a:rPr>
+              <a:t>Carr</a:t>
+            </a:r>
+            <a:r>
+              <a:rPr lang="en-US" sz="1800" dirty="0">
+                <a:effectLst/>
+                <a:latin typeface="Times New Roman" panose="02020603050405020304" pitchFamily="18" charset="0"/>
+                <a:ea typeface="Calibri" panose="020F0502020204030204" pitchFamily="34" charset="0"/>
+              </a:rPr>
+              <a:t>, 2021).  Each tenant can be a single sentence within a bulleted list.  During future debates around the policy’s expectations, the discussion leaders will defer to this list for guidance.</a:t>
+            </a:r>
+          </a:p>
+          <a:p>
+            <a:pPr marL="342900" marR="0" lvl="0" indent="-342900">
+              <a:lnSpc>
+                <a:spcPct val="200000"/>
+              </a:lnSpc>
+              <a:spcBef>
+                <a:spcPts val="0"/>
+              </a:spcBef>
+              <a:spcAft>
+                <a:spcPts val="0"/>
+              </a:spcAft>
+              <a:buFont typeface="+mj-lt"/>
+              <a:buAutoNum type="arabicPeriod"/>
+            </a:pPr>
+            <a:r>
+              <a:rPr lang="en-US" sz="1800" dirty="0">
+                <a:effectLst/>
+                <a:latin typeface="Times New Roman" panose="02020603050405020304" pitchFamily="18" charset="0"/>
+                <a:ea typeface="Calibri" panose="020F0502020204030204" pitchFamily="34" charset="0"/>
+              </a:rPr>
+              <a:t>Fifth, explain how the mechanisms and frameworks address the business challenges.  Additionally, define success criteria and measurements.  This section is typically one to three pages in length, never more than five.</a:t>
+            </a:r>
+          </a:p>
+          <a:p>
+            <a:pPr marL="342900" marR="0" lvl="0" indent="-342900">
+              <a:lnSpc>
+                <a:spcPct val="200000"/>
+              </a:lnSpc>
+              <a:spcBef>
+                <a:spcPts val="0"/>
+              </a:spcBef>
+              <a:spcAft>
+                <a:spcPts val="0"/>
+              </a:spcAft>
+              <a:buFont typeface="+mj-lt"/>
+              <a:buAutoNum type="arabicPeriod"/>
+            </a:pPr>
+            <a:r>
+              <a:rPr lang="en-US" sz="1800" dirty="0">
+                <a:effectLst/>
+                <a:latin typeface="Times New Roman" panose="02020603050405020304" pitchFamily="18" charset="0"/>
+                <a:ea typeface="Calibri" panose="020F0502020204030204" pitchFamily="34" charset="0"/>
+              </a:rPr>
+              <a:t>Lastly, include a Frequently Asked Questions (FAQ) section that addresses common scenarios.</a:t>
+            </a:r>
+          </a:p>
+          <a:p>
+            <a:endParaRPr lang="en-US" dirty="0"/>
+          </a:p>
+        </p:txBody>
+      </p:sp>
+      <p:sp>
+        <p:nvSpPr>
+          <p:cNvPr id="4" name="Slide Number Placeholder 3"/>
+          <p:cNvSpPr>
+            <a:spLocks noGrp="1"/>
+          </p:cNvSpPr>
+          <p:nvPr>
+            <p:ph type="sldNum" sz="quarter" idx="5"/>
+          </p:nvPr>
+        </p:nvSpPr>
+        <p:spPr/>
+        <p:txBody>
+          <a:bodyPr/>
+          <a:lstStyle/>
+          <a:p>
+            <a:fld id="{CEE7ED23-8054-42FC-A808-6FDE147C0F4B}" type="slidenum">
+              <a:rPr lang="en-US" smtClean="0"/>
+              <a:t>8</a:t>
+            </a:fld>
+            <a:endParaRPr lang="en-US"/>
+          </a:p>
+        </p:txBody>
+      </p:sp>
+    </p:spTree>
+    <p:extLst>
+      <p:ext uri="{BB962C8B-B14F-4D97-AF65-F5344CB8AC3E}">
+        <p14:creationId xmlns:p14="http://schemas.microsoft.com/office/powerpoint/2010/main" val="2220996537"/>
+      </p:ext>
+    </p:extLst>
+  </p:cSld>
+  <p:clrMapOvr>
+    <a:masterClrMapping/>
+  </p:clrMapOvr>
+</p:notes>
+</file>
+
+<file path=ppt/notesSlides/notesSlide9.xml><?xml version="1.0" encoding="utf-8"?>
+<p:notes xmlns:a="http://schemas.openxmlformats.org/drawingml/2006/main" xmlns:r="http://schemas.openxmlformats.org/officeDocument/2006/relationships" xmlns:p="http://schemas.openxmlformats.org/presentationml/2006/main">
+  <p:cSld>
+    <p:spTree>
+      <p:nvGrpSpPr>
+        <p:cNvPr id="1" name=""/>
+        <p:cNvGrpSpPr/>
+        <p:nvPr/>
+      </p:nvGrpSpPr>
+      <p:grpSpPr>
+        <a:xfrm>
+          <a:off x="0" y="0"/>
+          <a:ext cx="0" cy="0"/>
+          <a:chOff x="0" y="0"/>
+          <a:chExt cx="0" cy="0"/>
+        </a:xfrm>
+      </p:grpSpPr>
+      <p:sp>
+        <p:nvSpPr>
+          <p:cNvPr id="2" name="Slide Image Placeholder 1"/>
+          <p:cNvSpPr>
+            <a:spLocks noGrp="1" noRot="1" noChangeAspect="1"/>
+          </p:cNvSpPr>
+          <p:nvPr>
+            <p:ph type="sldImg"/>
+          </p:nvPr>
+        </p:nvSpPr>
+        <p:spPr/>
+      </p:sp>
+      <p:sp>
+        <p:nvSpPr>
+          <p:cNvPr id="3" name="Notes Placeholder 2"/>
+          <p:cNvSpPr>
+            <a:spLocks noGrp="1"/>
+          </p:cNvSpPr>
+          <p:nvPr>
+            <p:ph type="body" idx="1"/>
+          </p:nvPr>
+        </p:nvSpPr>
+        <p:spPr/>
+        <p:txBody>
+          <a:bodyPr/>
+          <a:lstStyle/>
+          <a:p>
+            <a:r>
+              <a:rPr lang="en-US" b="1" dirty="0"/>
+              <a:t>Policy Roadmap</a:t>
+            </a:r>
+            <a:endParaRPr lang="en-US" b="0" dirty="0"/>
+          </a:p>
+          <a:p>
+            <a:endParaRPr lang="en-US" b="0" dirty="0"/>
+          </a:p>
+          <a:p>
+            <a:r>
+              <a:rPr lang="en-US" b="0" dirty="0"/>
+              <a:t>1. </a:t>
+            </a:r>
+            <a:endParaRPr lang="en-US" b="1" dirty="0"/>
+          </a:p>
+        </p:txBody>
+      </p:sp>
+      <p:sp>
+        <p:nvSpPr>
+          <p:cNvPr id="4" name="Slide Number Placeholder 3"/>
+          <p:cNvSpPr>
+            <a:spLocks noGrp="1"/>
+          </p:cNvSpPr>
+          <p:nvPr>
+            <p:ph type="sldNum" sz="quarter" idx="5"/>
+          </p:nvPr>
+        </p:nvSpPr>
+        <p:spPr/>
+        <p:txBody>
+          <a:bodyPr/>
+          <a:lstStyle/>
+          <a:p>
+            <a:fld id="{CEE7ED23-8054-42FC-A808-6FDE147C0F4B}" type="slidenum">
+              <a:rPr lang="en-US" smtClean="0"/>
+              <a:t>9</a:t>
+            </a:fld>
+            <a:endParaRPr lang="en-US"/>
+          </a:p>
+        </p:txBody>
+      </p:sp>
+    </p:spTree>
+    <p:extLst>
+      <p:ext uri="{BB962C8B-B14F-4D97-AF65-F5344CB8AC3E}">
+        <p14:creationId xmlns:p14="http://schemas.microsoft.com/office/powerpoint/2010/main" val="2036863388"/>
       </p:ext>
     </p:extLst>
   </p:cSld>
@@ -40871,7 +43105,7 @@
           <a:p>
             <a:r>
               <a:rPr lang="en-US" dirty="0"/>
-              <a:t>IT Governance &amp; Strategy</a:t>
+              <a:t>IT Governance Strategy</a:t>
             </a:r>
           </a:p>
         </p:txBody>
@@ -41403,7 +43637,7 @@
             </p:nvPr>
           </p:nvPicPr>
           <p:blipFill>
-            <a:blip r:embed="rId2">
+            <a:blip r:embed="rId3">
               <a:alphaModFix amt="10000"/>
               <a:extLst>
                 <a:ext uri="{28A0092B-C50C-407E-A947-70E740481C1C}">
@@ -41469,10 +43703,9 @@
           <a:p>
             <a:pPr lvl="1"/>
             <a:r>
-              <a:rPr lang="en-US" sz="1600"/>
+              <a:rPr lang="en-US" sz="1600" dirty="0"/>
               <a:t>Bachmeier (2021)</a:t>
             </a:r>
-            <a:endParaRPr lang="en-US" sz="1600" dirty="0"/>
           </a:p>
         </p:txBody>
       </p:sp>
@@ -41491,7 +43724,7 @@
           <p:nvPr/>
         </p:nvPicPr>
         <p:blipFill rotWithShape="1">
-          <a:blip r:embed="rId3"/>
+          <a:blip r:embed="rId4"/>
           <a:srcRect l="33352" r="-2" b="-2"/>
           <a:stretch/>
         </p:blipFill>
@@ -41626,7 +43859,7 @@
           </p:nvPr>
         </p:nvPicPr>
         <p:blipFill>
-          <a:blip r:embed="rId4">
+          <a:blip r:embed="rId5">
             <a:extLst>
               <a:ext uri="{28A0092B-C50C-407E-A947-70E740481C1C}">
                 <a14:useLocalDpi xmlns:a14="http://schemas.microsoft.com/office/drawing/2010/main" val="0"/>
@@ -42105,6 +44338,11 @@
           </p:cNvGraphicFramePr>
           <p:nvPr>
             <p:ph idx="1"/>
+            <p:extLst>
+              <p:ext uri="{D42A27DB-BD31-4B8C-83A1-F6EECF244321}">
+                <p14:modId xmlns:p14="http://schemas.microsoft.com/office/powerpoint/2010/main" val="3311386540"/>
+              </p:ext>
+            </p:extLst>
           </p:nvPr>
         </p:nvGraphicFramePr>
         <p:xfrm>
@@ -42113,7 +44351,7 @@
         </p:xfrm>
         <a:graphic>
           <a:graphicData uri="http://schemas.openxmlformats.org/drawingml/2006/diagram">
-            <dgm:relIds xmlns:dgm="http://schemas.openxmlformats.org/drawingml/2006/diagram" xmlns:r="http://schemas.openxmlformats.org/officeDocument/2006/relationships" r:dm="rId2" r:lo="rId3" r:qs="rId4" r:cs="rId5"/>
+            <dgm:relIds xmlns:dgm="http://schemas.openxmlformats.org/drawingml/2006/diagram" xmlns:r="http://schemas.openxmlformats.org/officeDocument/2006/relationships" r:dm="rId3" r:lo="rId4" r:qs="rId5" r:cs="rId6"/>
           </a:graphicData>
         </a:graphic>
       </p:graphicFrame>
@@ -42758,7 +44996,7 @@
         </p:xfrm>
         <a:graphic>
           <a:graphicData uri="http://schemas.openxmlformats.org/drawingml/2006/diagram">
-            <dgm:relIds xmlns:dgm="http://schemas.openxmlformats.org/drawingml/2006/diagram" xmlns:r="http://schemas.openxmlformats.org/officeDocument/2006/relationships" r:dm="rId2" r:lo="rId3" r:qs="rId4" r:cs="rId5"/>
+            <dgm:relIds xmlns:dgm="http://schemas.openxmlformats.org/drawingml/2006/diagram" xmlns:r="http://schemas.openxmlformats.org/officeDocument/2006/relationships" r:dm="rId3" r:lo="rId4" r:qs="rId5" r:cs="rId6"/>
           </a:graphicData>
         </a:graphic>
       </p:graphicFrame>
@@ -43407,7 +45645,7 @@
           <a:p>
             <a:r>
               <a:rPr lang="en-US" dirty="0"/>
-              <a:t>Policy Central Norms and Expectations</a:t>
+              <a:t>Policy Norms and Expectations</a:t>
             </a:r>
           </a:p>
         </p:txBody>
@@ -43571,7 +45809,7 @@
         </p:xfrm>
         <a:graphic>
           <a:graphicData uri="http://schemas.openxmlformats.org/drawingml/2006/diagram">
-            <dgm:relIds xmlns:dgm="http://schemas.openxmlformats.org/drawingml/2006/diagram" xmlns:r="http://schemas.openxmlformats.org/officeDocument/2006/relationships" r:dm="rId2" r:lo="rId3" r:qs="rId4" r:cs="rId5"/>
+            <dgm:relIds xmlns:dgm="http://schemas.openxmlformats.org/drawingml/2006/diagram" xmlns:r="http://schemas.openxmlformats.org/officeDocument/2006/relationships" r:dm="rId3" r:lo="rId4" r:qs="rId5" r:cs="rId6"/>
           </a:graphicData>
         </a:graphic>
       </p:graphicFrame>
@@ -43724,7 +45962,7 @@
           </p:nvPr>
         </p:nvPicPr>
         <p:blipFill>
-          <a:blip r:embed="rId2">
+          <a:blip r:embed="rId3">
             <a:alphaModFix amt="10000"/>
             <a:extLst>
               <a:ext uri="{28A0092B-C50C-407E-A947-70E740481C1C}">
@@ -43928,7 +46166,7 @@
             <a:avLst/>
           </a:prstGeom>
           <a:blipFill>
-            <a:blip r:embed="rId3"/>
+            <a:blip r:embed="rId4"/>
             <a:stretch>
               <a:fillRect/>
             </a:stretch>
@@ -43994,7 +46232,7 @@
             <a:avLst/>
           </a:prstGeom>
           <a:blipFill>
-            <a:blip r:embed="rId3"/>
+            <a:blip r:embed="rId4"/>
             <a:stretch>
               <a:fillRect/>
             </a:stretch>
@@ -44060,7 +46298,7 @@
             <a:avLst/>
           </a:prstGeom>
           <a:blipFill>
-            <a:blip r:embed="rId4"/>
+            <a:blip r:embed="rId5"/>
             <a:stretch>
               <a:fillRect/>
             </a:stretch>
@@ -44110,7 +46348,7 @@
             <p:ph idx="1"/>
             <p:extLst>
               <p:ext uri="{D42A27DB-BD31-4B8C-83A1-F6EECF244321}">
-                <p14:modId xmlns:p14="http://schemas.microsoft.com/office/powerpoint/2010/main" val="2055999189"/>
+                <p14:modId xmlns:p14="http://schemas.microsoft.com/office/powerpoint/2010/main" val="3443674225"/>
               </p:ext>
             </p:extLst>
           </p:nvPr>
@@ -44493,7 +46731,7 @@
                           </a:solidFill>
                           <a:effectLst/>
                         </a:rPr>
-                        <a:t>Assess Community State (Forming)</a:t>
+                        <a:t>Assess Community State (Storming)</a:t>
                       </a:r>
                       <a:endParaRPr lang="en-US" sz="1800" b="1" cap="none" spc="0" dirty="0">
                         <a:solidFill>
@@ -44614,7 +46852,7 @@
                           </a:solidFill>
                           <a:effectLst/>
                         </a:rPr>
-                        <a:t>Implement Changes (Storming)</a:t>
+                        <a:t>Implement Changes (Forming)</a:t>
                       </a:r>
                       <a:endParaRPr lang="en-US" sz="1800" b="1" cap="none" spc="0" dirty="0">
                         <a:solidFill>

</xml_diff>

<commit_message>
ready to start recording
</commit_message>
<xml_diff>
--- a/Section3_Implementation/Week8_Present/BachmeierNTIM8190-8.pptx
+++ b/Section3_Implementation/Week8_Present/BachmeierNTIM8190-8.pptx
@@ -24776,11 +24776,124 @@
               <a:buFont typeface="Symbol" panose="05050102010706020507" pitchFamily="18" charset="2"/>
               <a:buChar char=""/>
             </a:pPr>
+            <a:endParaRPr lang="en-US" sz="1100" b="1" dirty="0">
+              <a:effectLst/>
+              <a:latin typeface="Calibri" panose="020F0502020204030204" pitchFamily="34" charset="0"/>
+              <a:ea typeface="Calibri" panose="020F0502020204030204" pitchFamily="34" charset="0"/>
+              <a:cs typeface="Times New Roman" panose="02020603050405020304" pitchFamily="18" charset="0"/>
+            </a:endParaRPr>
+          </a:p>
+          <a:p>
+            <a:pPr marL="1257300" marR="0" lvl="2" indent="-342900">
+              <a:lnSpc>
+                <a:spcPct val="107000"/>
+              </a:lnSpc>
+              <a:spcBef>
+                <a:spcPts val="0"/>
+              </a:spcBef>
+              <a:spcAft>
+                <a:spcPts val="800"/>
+              </a:spcAft>
+              <a:buFont typeface="Symbol" panose="05050102010706020507" pitchFamily="18" charset="2"/>
+              <a:buChar char=""/>
+            </a:pPr>
             <a:endParaRPr lang="en-US" sz="1100" dirty="0">
               <a:effectLst/>
               <a:latin typeface="Calibri" panose="020F0502020204030204" pitchFamily="34" charset="0"/>
               <a:ea typeface="Calibri" panose="020F0502020204030204" pitchFamily="34" charset="0"/>
               <a:cs typeface="Times New Roman" panose="02020603050405020304" pitchFamily="18" charset="0"/>
+            </a:endParaRPr>
+          </a:p>
+          <a:p>
+            <a:pPr marL="1257300" marR="0" lvl="2" indent="-342900">
+              <a:lnSpc>
+                <a:spcPct val="107000"/>
+              </a:lnSpc>
+              <a:spcBef>
+                <a:spcPts val="0"/>
+              </a:spcBef>
+              <a:spcAft>
+                <a:spcPts val="800"/>
+              </a:spcAft>
+              <a:buFont typeface="Symbol" panose="05050102010706020507" pitchFamily="18" charset="2"/>
+              <a:buChar char=""/>
+            </a:pPr>
+            <a:endParaRPr lang="en-US" sz="1100" dirty="0">
+              <a:effectLst/>
+              <a:latin typeface="Calibri" panose="020F0502020204030204" pitchFamily="34" charset="0"/>
+              <a:ea typeface="Calibri" panose="020F0502020204030204" pitchFamily="34" charset="0"/>
+              <a:cs typeface="Times New Roman" panose="02020603050405020304" pitchFamily="18" charset="0"/>
+            </a:endParaRPr>
+          </a:p>
+          <a:p>
+            <a:pPr marL="0" marR="0" lvl="0" indent="0" algn="l" defTabSz="914400" rtl="0" eaLnBrk="1" fontAlgn="auto" latinLnBrk="0" hangingPunct="1">
+              <a:lnSpc>
+                <a:spcPct val="200000"/>
+              </a:lnSpc>
+              <a:spcBef>
+                <a:spcPts val="0"/>
+              </a:spcBef>
+              <a:spcAft>
+                <a:spcPts val="0"/>
+              </a:spcAft>
+              <a:buClrTx/>
+              <a:buSzTx/>
+              <a:buFontTx/>
+              <a:buNone/>
+              <a:tabLst/>
+              <a:defRPr/>
+            </a:pPr>
+            <a:r>
+              <a:rPr lang="en-US" sz="1800" b="1" dirty="0">
+                <a:effectLst/>
+                <a:latin typeface="Times New Roman" panose="02020603050405020304" pitchFamily="18" charset="0"/>
+                <a:ea typeface="Calibri" panose="020F0502020204030204" pitchFamily="34" charset="0"/>
+              </a:rPr>
+              <a:t>Where do we start</a:t>
+            </a:r>
+          </a:p>
+          <a:p>
+            <a:pPr marL="0" marR="0" lvl="0" indent="0" algn="l" defTabSz="914400" rtl="0" eaLnBrk="1" fontAlgn="auto" latinLnBrk="0" hangingPunct="1">
+              <a:lnSpc>
+                <a:spcPct val="200000"/>
+              </a:lnSpc>
+              <a:spcBef>
+                <a:spcPts val="0"/>
+              </a:spcBef>
+              <a:spcAft>
+                <a:spcPts val="0"/>
+              </a:spcAft>
+              <a:buClrTx/>
+              <a:buSzTx/>
+              <a:buFontTx/>
+              <a:buNone/>
+              <a:tabLst/>
+              <a:defRPr/>
+            </a:pPr>
+            <a:r>
+              <a:rPr lang="en-US" sz="1800" dirty="0">
+                <a:effectLst/>
+                <a:latin typeface="Times New Roman" panose="02020603050405020304" pitchFamily="18" charset="0"/>
+                <a:ea typeface="Calibri" panose="020F0502020204030204" pitchFamily="34" charset="0"/>
+              </a:rPr>
+              <a:t>There are several potential areas to improve, such as data center consolidation.  However, the leadership team must be cognizant of prioritizing business goals over purely technical plans.  Customers do not care if an application runs in the cloud or a private data center.  They only care that it performs its function securely, reliability, and consistently.  Those requirements make focusing on the application integrations more appealing.  While the business makes the necessary changes, it will also encourage intelligence and social alignment.  Through an ever-increasing alignment, future work will come easier and regularly.</a:t>
+            </a:r>
+          </a:p>
+          <a:p>
+            <a:pPr marL="0" marR="0">
+              <a:lnSpc>
+                <a:spcPct val="200000"/>
+              </a:lnSpc>
+              <a:spcBef>
+                <a:spcPts val="0"/>
+              </a:spcBef>
+              <a:spcAft>
+                <a:spcPts val="0"/>
+              </a:spcAft>
+            </a:pPr>
+            <a:endParaRPr lang="en-US" sz="1800" b="1" dirty="0">
+              <a:effectLst/>
+              <a:latin typeface="Times New Roman" panose="02020603050405020304" pitchFamily="18" charset="0"/>
             </a:endParaRPr>
           </a:p>
           <a:p>
@@ -24894,6 +25007,42 @@
               </a:rPr>
               <a:t>, 2021).  Program managers must also report on updates to project scope, schedule, budget, performance, issues, risks, and general notifications (Martinelli &amp; Dragan, 2016).  When a correlation between inputs and outputs does not occur, it signals issues with the control framework.  This situation presents an opportunity for senior leadership to dive deep and examine any process issues.</a:t>
             </a:r>
+          </a:p>
+          <a:p>
+            <a:pPr marL="0" marR="0">
+              <a:lnSpc>
+                <a:spcPct val="200000"/>
+              </a:lnSpc>
+              <a:spcBef>
+                <a:spcPts val="0"/>
+              </a:spcBef>
+              <a:spcAft>
+                <a:spcPts val="0"/>
+              </a:spcAft>
+            </a:pPr>
+            <a:endParaRPr lang="en-US" sz="1800" dirty="0">
+              <a:effectLst/>
+              <a:latin typeface="Times New Roman" panose="02020603050405020304" pitchFamily="18" charset="0"/>
+              <a:ea typeface="Calibri" panose="020F0502020204030204" pitchFamily="34" charset="0"/>
+            </a:endParaRPr>
+          </a:p>
+          <a:p>
+            <a:pPr marL="0" marR="0">
+              <a:lnSpc>
+                <a:spcPct val="200000"/>
+              </a:lnSpc>
+              <a:spcBef>
+                <a:spcPts val="0"/>
+              </a:spcBef>
+              <a:spcAft>
+                <a:spcPts val="0"/>
+              </a:spcAft>
+            </a:pPr>
+            <a:endParaRPr lang="en-US" sz="1800" dirty="0">
+              <a:effectLst/>
+              <a:latin typeface="Times New Roman" panose="02020603050405020304" pitchFamily="18" charset="0"/>
+              <a:ea typeface="Calibri" panose="020F0502020204030204" pitchFamily="34" charset="0"/>
+            </a:endParaRPr>
           </a:p>
           <a:p>
             <a:pPr marL="1257300" marR="0" lvl="2" indent="-342900">
@@ -26630,28 +26779,11 @@
               </a:spcAft>
             </a:pPr>
             <a:r>
-              <a:rPr lang="en-US" sz="1800" dirty="0">
+              <a:rPr lang="en-US" sz="1800" b="1" dirty="0">
                 <a:effectLst/>
                 <a:latin typeface="Times New Roman" panose="02020603050405020304" pitchFamily="18" charset="0"/>
-                <a:ea typeface="Calibri" panose="020F0502020204030204" pitchFamily="34" charset="0"/>
               </a:rPr>
-              <a:t>The organization cannot provide the best-in-class user experience until it changes its IT Governance model.  Only through a strategic alignment between the information systems and business goals can NCU-F present a unified product suite for its customers  (</a:t>
-            </a:r>
-            <a:r>
-              <a:rPr lang="en-US" sz="1800" dirty="0" err="1">
-                <a:effectLst/>
-                <a:latin typeface="Times New Roman" panose="02020603050405020304" pitchFamily="18" charset="0"/>
-                <a:ea typeface="Calibri" panose="020F0502020204030204" pitchFamily="34" charset="0"/>
-              </a:rPr>
-              <a:t>Iyamu</a:t>
-            </a:r>
-            <a:r>
-              <a:rPr lang="en-US" sz="1800" dirty="0">
-                <a:effectLst/>
-                <a:latin typeface="Times New Roman" panose="02020603050405020304" pitchFamily="18" charset="0"/>
-                <a:ea typeface="Calibri" panose="020F0502020204030204" pitchFamily="34" charset="0"/>
-              </a:rPr>
-              <a:t>, 2015).  </a:t>
+              <a:t>Challenges and Limitations</a:t>
             </a:r>
           </a:p>
           <a:p>
@@ -26668,6 +26800,106 @@
             </a:pPr>
             <a:r>
               <a:rPr lang="en-US" sz="1800" dirty="0">
+                <a:effectLst/>
+                <a:latin typeface="Times New Roman" panose="02020603050405020304" pitchFamily="18" charset="0"/>
+                <a:ea typeface="Calibri" panose="020F0502020204030204" pitchFamily="34" charset="0"/>
+              </a:rPr>
+              <a:t>Customers view NCU-F as a collection of different financial products which share the same branding and marketing.  This perspective makes it challenging to cross-sell high-margin offerings, such as investment accounts and mortgages.  Recently a focus group discovered that many customers are unaware of these additional services.  Meanwhile, others complain that onboarding into these supplementary products is tedious and redundant.  For instance, an existing customer with the savings and loan department has to create a different login for personal loans.  When customers encounter these rough edges between applications, it creates nature points to stop exploring.</a:t>
+            </a:r>
+          </a:p>
+          <a:p>
+            <a:pPr marL="0" marR="0">
+              <a:lnSpc>
+                <a:spcPct val="200000"/>
+              </a:lnSpc>
+              <a:spcBef>
+                <a:spcPts val="0"/>
+              </a:spcBef>
+              <a:spcAft>
+                <a:spcPts val="0"/>
+              </a:spcAft>
+            </a:pPr>
+            <a:endParaRPr lang="en-US" sz="1800" dirty="0">
+              <a:effectLst/>
+              <a:latin typeface="Times New Roman" panose="02020603050405020304" pitchFamily="18" charset="0"/>
+              <a:ea typeface="Calibri" panose="020F0502020204030204" pitchFamily="34" charset="0"/>
+            </a:endParaRPr>
+          </a:p>
+          <a:p>
+            <a:pPr marL="0" marR="0">
+              <a:lnSpc>
+                <a:spcPct val="200000"/>
+              </a:lnSpc>
+              <a:spcBef>
+                <a:spcPts val="0"/>
+              </a:spcBef>
+              <a:spcAft>
+                <a:spcPts val="0"/>
+              </a:spcAft>
+            </a:pPr>
+            <a:r>
+              <a:rPr lang="en-US" sz="1800" dirty="0">
+                <a:effectLst/>
+                <a:latin typeface="Times New Roman" panose="02020603050405020304" pitchFamily="18" charset="0"/>
+                <a:ea typeface="Calibri" panose="020F0502020204030204" pitchFamily="34" charset="0"/>
+              </a:rPr>
+              <a:t>Internally, the business does not enforce any IT Governance policies, allowing each acquired company to continue utilizing its existing processes and applications.  For instance, NCU-F has multiple Customer Relationship Management (CRM) and Enterprise Resource Planning (ERP) platforms.  While this provides the most flexibility, it is more expensive and challenging to share information.  Instead, through resource centralization, the business can reduce operations staff and negotiation better volume-licensing terms.  Additionally, as critical systems like ERP and CRM consolidate, it moves the organization to a shared view of their customers, removes the rough edges, and improves the user experience.</a:t>
+            </a:r>
+          </a:p>
+          <a:p>
+            <a:endParaRPr lang="en-US" dirty="0"/>
+          </a:p>
+          <a:p>
+            <a:pPr marL="0" marR="0">
+              <a:lnSpc>
+                <a:spcPct val="200000"/>
+              </a:lnSpc>
+              <a:spcBef>
+                <a:spcPts val="0"/>
+              </a:spcBef>
+              <a:spcAft>
+                <a:spcPts val="0"/>
+              </a:spcAft>
+            </a:pPr>
+            <a:r>
+              <a:rPr lang="en-US" sz="1200" dirty="0">
+                <a:effectLst/>
+                <a:latin typeface="Times New Roman" panose="02020603050405020304" pitchFamily="18" charset="0"/>
+                <a:ea typeface="Calibri" panose="020F0502020204030204" pitchFamily="34" charset="0"/>
+              </a:rPr>
+              <a:t>The organization cannot provide the best-in-class user experience until it changes its IT Governance model.  Only through a strategic alignment between the information systems and business goals can NCU-F present a unified product suite for its customers  (</a:t>
+            </a:r>
+            <a:r>
+              <a:rPr lang="en-US" sz="1200" dirty="0" err="1">
+                <a:effectLst/>
+                <a:latin typeface="Times New Roman" panose="02020603050405020304" pitchFamily="18" charset="0"/>
+                <a:ea typeface="Calibri" panose="020F0502020204030204" pitchFamily="34" charset="0"/>
+              </a:rPr>
+              <a:t>Iyamu</a:t>
+            </a:r>
+            <a:r>
+              <a:rPr lang="en-US" sz="1200" dirty="0">
+                <a:effectLst/>
+                <a:latin typeface="Times New Roman" panose="02020603050405020304" pitchFamily="18" charset="0"/>
+                <a:ea typeface="Calibri" panose="020F0502020204030204" pitchFamily="34" charset="0"/>
+              </a:rPr>
+              <a:t>, 2015).  </a:t>
+            </a:r>
+          </a:p>
+          <a:p>
+            <a:pPr marL="0" marR="0">
+              <a:lnSpc>
+                <a:spcPct val="200000"/>
+              </a:lnSpc>
+              <a:spcBef>
+                <a:spcPts val="0"/>
+              </a:spcBef>
+              <a:spcAft>
+                <a:spcPts val="0"/>
+              </a:spcAft>
+            </a:pPr>
+            <a:r>
+              <a:rPr lang="en-US" sz="1200" dirty="0">
                 <a:effectLst/>
                 <a:latin typeface="Times New Roman" panose="02020603050405020304" pitchFamily="18" charset="0"/>
                 <a:ea typeface="Calibri" panose="020F0502020204030204" pitchFamily="34" charset="0"/>
@@ -27110,6 +27342,301 @@
           <a:p>
             <a:endParaRPr lang="en-US" dirty="0"/>
           </a:p>
+          <a:p>
+            <a:r>
+              <a:rPr lang="en-US" b="1" dirty="0"/>
+              <a:t>What is</a:t>
+            </a:r>
+          </a:p>
+          <a:p>
+            <a:endParaRPr lang="en-US" b="1" dirty="0"/>
+          </a:p>
+          <a:p>
+            <a:pPr marL="0" marR="0" lvl="0" indent="0" algn="l" defTabSz="914400" rtl="0" eaLnBrk="1" fontAlgn="auto" latinLnBrk="0" hangingPunct="1">
+              <a:lnSpc>
+                <a:spcPct val="100000"/>
+              </a:lnSpc>
+              <a:spcBef>
+                <a:spcPts val="0"/>
+              </a:spcBef>
+              <a:spcAft>
+                <a:spcPts val="0"/>
+              </a:spcAft>
+              <a:buClrTx/>
+              <a:buSzTx/>
+              <a:buFontTx/>
+              <a:buNone/>
+              <a:tabLst/>
+              <a:defRPr/>
+            </a:pPr>
+            <a:r>
+              <a:rPr lang="en-US" sz="1800" dirty="0">
+                <a:effectLst/>
+                <a:latin typeface="Times New Roman" panose="02020603050405020304" pitchFamily="18" charset="0"/>
+                <a:ea typeface="Calibri" panose="020F0502020204030204" pitchFamily="34" charset="0"/>
+              </a:rPr>
+              <a:t>IT Governance Frameworks define operating procedures, key performance indicators and create business value.  Organizations typically start with a standard framework, such as COBIT, ITIL, and ISO 270001, and then customize it to fit their needs  (Lindros, 2017).</a:t>
+            </a:r>
+          </a:p>
+          <a:p>
+            <a:endParaRPr lang="en-US" dirty="0"/>
+          </a:p>
+          <a:p>
+            <a:r>
+              <a:rPr lang="en-US" b="1" dirty="0"/>
+              <a:t>Why do we need it</a:t>
+            </a:r>
+          </a:p>
+          <a:p>
+            <a:endParaRPr lang="en-US" b="1" dirty="0"/>
+          </a:p>
+          <a:p>
+            <a:pPr marL="0" marR="0">
+              <a:lnSpc>
+                <a:spcPct val="200000"/>
+              </a:lnSpc>
+              <a:spcBef>
+                <a:spcPts val="0"/>
+              </a:spcBef>
+              <a:spcAft>
+                <a:spcPts val="0"/>
+              </a:spcAft>
+            </a:pPr>
+            <a:r>
+              <a:rPr lang="en-US" sz="1800" dirty="0">
+                <a:effectLst/>
+                <a:latin typeface="Times New Roman" panose="02020603050405020304" pitchFamily="18" charset="0"/>
+                <a:ea typeface="Calibri" panose="020F0502020204030204" pitchFamily="34" charset="0"/>
+              </a:rPr>
+              <a:t>The organization cannot provide the best-in-class user experience until it changes its IT Governance model.  Only through a strategic alignment between the information systems and business goals can NCU-F present a unified product suite for its customers  (</a:t>
+            </a:r>
+            <a:r>
+              <a:rPr lang="en-US" sz="1800" dirty="0" err="1">
+                <a:effectLst/>
+                <a:latin typeface="Times New Roman" panose="02020603050405020304" pitchFamily="18" charset="0"/>
+                <a:ea typeface="Calibri" panose="020F0502020204030204" pitchFamily="34" charset="0"/>
+              </a:rPr>
+              <a:t>Iyamu</a:t>
+            </a:r>
+            <a:r>
+              <a:rPr lang="en-US" sz="1800" dirty="0">
+                <a:effectLst/>
+                <a:latin typeface="Times New Roman" panose="02020603050405020304" pitchFamily="18" charset="0"/>
+                <a:ea typeface="Calibri" panose="020F0502020204030204" pitchFamily="34" charset="0"/>
+              </a:rPr>
+              <a:t>, 2015).  </a:t>
+            </a:r>
+          </a:p>
+          <a:p>
+            <a:pPr marL="0" marR="0">
+              <a:lnSpc>
+                <a:spcPct val="200000"/>
+              </a:lnSpc>
+              <a:spcBef>
+                <a:spcPts val="0"/>
+              </a:spcBef>
+              <a:spcAft>
+                <a:spcPts val="0"/>
+              </a:spcAft>
+            </a:pPr>
+            <a:r>
+              <a:rPr lang="en-US" sz="1800" dirty="0">
+                <a:effectLst/>
+                <a:latin typeface="Times New Roman" panose="02020603050405020304" pitchFamily="18" charset="0"/>
+                <a:ea typeface="Calibri" panose="020F0502020204030204" pitchFamily="34" charset="0"/>
+              </a:rPr>
+              <a:t>NCU-F’s governance model requires mechanisms and processes to enforce consistency, standardization, and choose the best-in-company implementations.  These controls must foster intellectual (e.g., planning and infrastructure) and social (e.g., shared understanding) alignment across the organization (Ping-Ju, Straub, &amp; Liang, 2015).  When team members understand the desired end-state, they can more efficiently plan and prioritize work.  It also removes design choices that would not align with business goals.</a:t>
+            </a:r>
+          </a:p>
+          <a:p>
+            <a:endParaRPr lang="en-US" b="1" dirty="0"/>
+          </a:p>
+          <a:p>
+            <a:r>
+              <a:rPr lang="en-US" b="1" dirty="0"/>
+              <a:t>How do we implement it</a:t>
+            </a:r>
+          </a:p>
+          <a:p>
+            <a:endParaRPr lang="en-US" b="1" dirty="0"/>
+          </a:p>
+          <a:p>
+            <a:pPr marL="0" marR="0" lvl="0" indent="0" algn="l" defTabSz="914400" rtl="0" eaLnBrk="1" fontAlgn="auto" latinLnBrk="0" hangingPunct="1">
+              <a:lnSpc>
+                <a:spcPct val="100000"/>
+              </a:lnSpc>
+              <a:spcBef>
+                <a:spcPts val="0"/>
+              </a:spcBef>
+              <a:spcAft>
+                <a:spcPts val="0"/>
+              </a:spcAft>
+              <a:buClrTx/>
+              <a:buSzTx/>
+              <a:buFontTx/>
+              <a:buNone/>
+              <a:tabLst/>
+              <a:defRPr/>
+            </a:pPr>
+            <a:r>
+              <a:rPr lang="en-US" sz="1800" dirty="0">
+                <a:effectLst/>
+                <a:latin typeface="Times New Roman" panose="02020603050405020304" pitchFamily="18" charset="0"/>
+                <a:ea typeface="Calibri" panose="020F0502020204030204" pitchFamily="34" charset="0"/>
+              </a:rPr>
+              <a:t>The organization must adopt a policy control framework.  Leaders approach this situation by combining existing frameworks, such as COBIT, ITIL, COSO, CMMI, and FAIR (Lindros, 2017).  These industry-standard frameworks assist project teams in implementing their artifacts using a secure, reliable, and maintainable process.  However, using only engineering-centric frameworks is potentially too narrow.  Many projects span different teams, role families, and organizations (e.g., vendors, consultants, and partners).  NCU-F must address these issues and limitations by formally declaring its project artifacts like charters, mandates, and roadmaps (</a:t>
+            </a:r>
+            <a:r>
+              <a:rPr lang="en-US" sz="1800" dirty="0" err="1">
+                <a:effectLst/>
+                <a:latin typeface="Times New Roman" panose="02020603050405020304" pitchFamily="18" charset="0"/>
+                <a:ea typeface="Calibri" panose="020F0502020204030204" pitchFamily="34" charset="0"/>
+              </a:rPr>
+              <a:t>Bonnal</a:t>
+            </a:r>
+            <a:r>
+              <a:rPr lang="en-US" sz="1800" dirty="0">
+                <a:effectLst/>
+                <a:latin typeface="Times New Roman" panose="02020603050405020304" pitchFamily="18" charset="0"/>
+                <a:ea typeface="Calibri" panose="020F0502020204030204" pitchFamily="34" charset="0"/>
+              </a:rPr>
+              <a:t> &amp; </a:t>
+            </a:r>
+            <a:r>
+              <a:rPr lang="en-US" sz="1800" dirty="0" err="1">
+                <a:effectLst/>
+                <a:latin typeface="Times New Roman" panose="02020603050405020304" pitchFamily="18" charset="0"/>
+                <a:ea typeface="Calibri" panose="020F0502020204030204" pitchFamily="34" charset="0"/>
+              </a:rPr>
+              <a:t>Rauser</a:t>
+            </a:r>
+            <a:r>
+              <a:rPr lang="en-US" sz="1800" dirty="0">
+                <a:effectLst/>
+                <a:latin typeface="Times New Roman" panose="02020603050405020304" pitchFamily="18" charset="0"/>
+                <a:ea typeface="Calibri" panose="020F0502020204030204" pitchFamily="34" charset="0"/>
+              </a:rPr>
+              <a:t>, 2017).  When documents explicitly declare universal agreements across the direction and appropriate guardrails, it unifies team communication.  Business professionals can then efficiently map the guiding decisions to their role and team-specific operating models.</a:t>
+            </a:r>
+          </a:p>
+          <a:p>
+            <a:endParaRPr lang="en-US" b="1" dirty="0"/>
+          </a:p>
+          <a:p>
+            <a:endParaRPr lang="en-US" b="1" dirty="0"/>
+          </a:p>
+          <a:p>
+            <a:r>
+              <a:rPr lang="en-US" b="1" dirty="0"/>
+              <a:t>What should we avoid</a:t>
+            </a:r>
+            <a:endParaRPr lang="en-US" b="0" dirty="0"/>
+          </a:p>
+          <a:p>
+            <a:pPr marL="0" marR="0">
+              <a:lnSpc>
+                <a:spcPct val="200000"/>
+              </a:lnSpc>
+              <a:spcBef>
+                <a:spcPts val="0"/>
+              </a:spcBef>
+              <a:spcAft>
+                <a:spcPts val="0"/>
+              </a:spcAft>
+            </a:pPr>
+            <a:r>
+              <a:rPr lang="en-US" sz="1800" dirty="0">
+                <a:effectLst/>
+                <a:latin typeface="Times New Roman" panose="02020603050405020304" pitchFamily="18" charset="0"/>
+                <a:ea typeface="Calibri" panose="020F0502020204030204" pitchFamily="34" charset="0"/>
+              </a:rPr>
+              <a:t>The business must strategically decide which governance policies to enforce versus recommend.  When the organization mandates a shift in direction, it creates additional work and deprioritizes competing efforts.  One approach is defining maturity levels and target groups, then slowly raising expectations on specific critical resources first.  For instance, a recent outage within Identity Services highlights its criticality, making it a candidate for targeted investments.  These changes could include policies that reduce Domain controller utilization through data caching requirements.</a:t>
+            </a:r>
+          </a:p>
+          <a:p>
+            <a:pPr marL="0" marR="0">
+              <a:lnSpc>
+                <a:spcPct val="200000"/>
+              </a:lnSpc>
+              <a:spcBef>
+                <a:spcPts val="0"/>
+              </a:spcBef>
+              <a:spcAft>
+                <a:spcPts val="0"/>
+              </a:spcAft>
+            </a:pPr>
+            <a:endParaRPr lang="en-US" sz="1800" dirty="0">
+              <a:effectLst/>
+              <a:latin typeface="Times New Roman" panose="02020603050405020304" pitchFamily="18" charset="0"/>
+              <a:ea typeface="Calibri" panose="020F0502020204030204" pitchFamily="34" charset="0"/>
+            </a:endParaRPr>
+          </a:p>
+          <a:p>
+            <a:pPr marL="0" marR="0">
+              <a:lnSpc>
+                <a:spcPct val="200000"/>
+              </a:lnSpc>
+              <a:spcBef>
+                <a:spcPts val="0"/>
+              </a:spcBef>
+              <a:spcAft>
+                <a:spcPts val="0"/>
+              </a:spcAft>
+            </a:pPr>
+            <a:r>
+              <a:rPr lang="en-US" sz="1800" dirty="0">
+                <a:effectLst/>
+                <a:latin typeface="Times New Roman" panose="02020603050405020304" pitchFamily="18" charset="0"/>
+                <a:ea typeface="Calibri" panose="020F0502020204030204" pitchFamily="34" charset="0"/>
+              </a:rPr>
+              <a:t>NCU-F must also devise plans for removing technical debt and implementing standards across the platform.  Standardization enables the company to increase agility, deliver more, and experience greater consistency.  Still, the business must be cognizant of the current business cycle since paying down debt also implies fewer new features.  Without an adequate volume of improvements, the customers’ experience becomes stale and fails to meet their expectations.</a:t>
+            </a:r>
+          </a:p>
+          <a:p>
+            <a:pPr marL="0" marR="0">
+              <a:lnSpc>
+                <a:spcPct val="200000"/>
+              </a:lnSpc>
+              <a:spcBef>
+                <a:spcPts val="0"/>
+              </a:spcBef>
+              <a:spcAft>
+                <a:spcPts val="0"/>
+              </a:spcAft>
+            </a:pPr>
+            <a:endParaRPr lang="en-US" sz="1800" dirty="0">
+              <a:effectLst/>
+              <a:latin typeface="Times New Roman" panose="02020603050405020304" pitchFamily="18" charset="0"/>
+              <a:ea typeface="Calibri" panose="020F0502020204030204" pitchFamily="34" charset="0"/>
+            </a:endParaRPr>
+          </a:p>
+          <a:p>
+            <a:pPr marL="0" marR="0">
+              <a:lnSpc>
+                <a:spcPct val="200000"/>
+              </a:lnSpc>
+              <a:spcBef>
+                <a:spcPts val="0"/>
+              </a:spcBef>
+              <a:spcAft>
+                <a:spcPts val="0"/>
+              </a:spcAft>
+            </a:pPr>
+            <a:r>
+              <a:rPr lang="en-US" sz="1800" dirty="0">
+                <a:effectLst/>
+                <a:latin typeface="Times New Roman" panose="02020603050405020304" pitchFamily="18" charset="0"/>
+                <a:ea typeface="Calibri" panose="020F0502020204030204" pitchFamily="34" charset="0"/>
+              </a:rPr>
+              <a:t>Furthermore, formalizing organizational procedures such as disaster recovery and incident management will pay dividends later.  For instance, the initial release of the trading platform stores customer data across eight different storage technologies.  This approach decouples the implementation between microsystems and promotes engineering efficiency.  Nevertheless, end-users do not care.  Instead, they want a consistent system state that withstands an individual server or partition failure.</a:t>
+            </a:r>
+          </a:p>
+          <a:p>
+            <a:endParaRPr lang="en-US" b="1" dirty="0"/>
+          </a:p>
+          <a:p>
+            <a:endParaRPr lang="en-US" dirty="0"/>
+          </a:p>
         </p:txBody>
       </p:sp>
       <p:sp>
@@ -28806,6 +29333,601 @@
               </a:rPr>
               <a:t>Our policies are versioned and can be amended over time</a:t>
             </a:r>
+          </a:p>
+          <a:p>
+            <a:pPr marL="342900" marR="0" lvl="0" indent="-342900">
+              <a:lnSpc>
+                <a:spcPct val="107000"/>
+              </a:lnSpc>
+              <a:spcBef>
+                <a:spcPts val="0"/>
+              </a:spcBef>
+              <a:spcAft>
+                <a:spcPts val="800"/>
+              </a:spcAft>
+              <a:buFont typeface="Symbol" panose="05050102010706020507" pitchFamily="18" charset="2"/>
+              <a:buChar char=""/>
+            </a:pPr>
+            <a:endParaRPr lang="en-US" sz="1100" dirty="0">
+              <a:effectLst/>
+              <a:latin typeface="Calibri" panose="020F0502020204030204" pitchFamily="34" charset="0"/>
+              <a:ea typeface="Calibri" panose="020F0502020204030204" pitchFamily="34" charset="0"/>
+              <a:cs typeface="Times New Roman" panose="02020603050405020304" pitchFamily="18" charset="0"/>
+            </a:endParaRPr>
+          </a:p>
+          <a:p>
+            <a:pPr marL="342900" marR="0" lvl="0" indent="-342900">
+              <a:lnSpc>
+                <a:spcPct val="107000"/>
+              </a:lnSpc>
+              <a:spcBef>
+                <a:spcPts val="0"/>
+              </a:spcBef>
+              <a:spcAft>
+                <a:spcPts val="800"/>
+              </a:spcAft>
+              <a:buFont typeface="Symbol" panose="05050102010706020507" pitchFamily="18" charset="2"/>
+              <a:buChar char=""/>
+            </a:pPr>
+            <a:endParaRPr lang="en-US" sz="1100" dirty="0">
+              <a:effectLst/>
+              <a:latin typeface="Calibri" panose="020F0502020204030204" pitchFamily="34" charset="0"/>
+              <a:ea typeface="Calibri" panose="020F0502020204030204" pitchFamily="34" charset="0"/>
+              <a:cs typeface="Times New Roman" panose="02020603050405020304" pitchFamily="18" charset="0"/>
+            </a:endParaRPr>
+          </a:p>
+          <a:p>
+            <a:pPr marL="0" marR="0">
+              <a:lnSpc>
+                <a:spcPct val="200000"/>
+              </a:lnSpc>
+              <a:spcBef>
+                <a:spcPts val="0"/>
+              </a:spcBef>
+              <a:spcAft>
+                <a:spcPts val="0"/>
+              </a:spcAft>
+            </a:pPr>
+            <a:r>
+              <a:rPr lang="en-US" sz="1800" dirty="0">
+                <a:effectLst/>
+                <a:latin typeface="Times New Roman" panose="02020603050405020304" pitchFamily="18" charset="0"/>
+                <a:ea typeface="Calibri" panose="020F0502020204030204" pitchFamily="34" charset="0"/>
+              </a:rPr>
+              <a:t>NCU-F defines specific norms and expectations for introducing, revising, and removing IT policies (see Figure 1).  All employees are encouraged to participate in these processes and provide relevant feedback for stakeholders.</a:t>
+            </a:r>
+          </a:p>
+          <a:p>
+            <a:pPr marL="0" marR="0" algn="ctr">
+              <a:spcBef>
+                <a:spcPts val="0"/>
+              </a:spcBef>
+              <a:spcAft>
+                <a:spcPts val="1000"/>
+              </a:spcAft>
+            </a:pPr>
+            <a:r>
+              <a:rPr lang="en-US" sz="1800" dirty="0">
+                <a:effectLst/>
+                <a:latin typeface="Times New Roman" panose="02020603050405020304" pitchFamily="18" charset="0"/>
+                <a:ea typeface="Calibri" panose="020F0502020204030204" pitchFamily="34" charset="0"/>
+              </a:rPr>
+              <a:t>Figure 1: Lifecycle Management Process</a:t>
+            </a:r>
+          </a:p>
+          <a:p>
+            <a:pPr marL="0" marR="0">
+              <a:lnSpc>
+                <a:spcPct val="200000"/>
+              </a:lnSpc>
+              <a:spcBef>
+                <a:spcPts val="0"/>
+              </a:spcBef>
+              <a:spcAft>
+                <a:spcPts val="0"/>
+              </a:spcAft>
+            </a:pPr>
+            <a:r>
+              <a:rPr lang="en-US" sz="1800" b="1" dirty="0">
+                <a:effectLst/>
+                <a:latin typeface="Times New Roman" panose="02020603050405020304" pitchFamily="18" charset="0"/>
+              </a:rPr>
+              <a:t>Policy Creation Process</a:t>
+            </a:r>
+          </a:p>
+          <a:p>
+            <a:pPr marL="342900" marR="0" lvl="0" indent="-342900">
+              <a:lnSpc>
+                <a:spcPct val="200000"/>
+              </a:lnSpc>
+              <a:spcBef>
+                <a:spcPts val="0"/>
+              </a:spcBef>
+              <a:spcAft>
+                <a:spcPts val="0"/>
+              </a:spcAft>
+              <a:buFont typeface="+mj-lt"/>
+              <a:buAutoNum type="arabicPeriod"/>
+            </a:pPr>
+            <a:r>
+              <a:rPr lang="en-US" sz="1800" dirty="0">
+                <a:effectLst/>
+                <a:latin typeface="Times New Roman" panose="02020603050405020304" pitchFamily="18" charset="0"/>
+                <a:ea typeface="Calibri" panose="020F0502020204030204" pitchFamily="34" charset="0"/>
+              </a:rPr>
+              <a:t>IT policies define processes for approaching business challenges (Gartner, 2021).  The business enforces that perspective by requiring each policy document to explicitly identify the customer (e.g., internal or external users) and their needs. </a:t>
+            </a:r>
+          </a:p>
+          <a:p>
+            <a:pPr marL="342900" marR="0" lvl="0" indent="-342900">
+              <a:lnSpc>
+                <a:spcPct val="200000"/>
+              </a:lnSpc>
+              <a:spcBef>
+                <a:spcPts val="0"/>
+              </a:spcBef>
+              <a:spcAft>
+                <a:spcPts val="0"/>
+              </a:spcAft>
+              <a:buFont typeface="+mj-lt"/>
+              <a:buAutoNum type="arabicPeriod"/>
+            </a:pPr>
+            <a:r>
+              <a:rPr lang="en-US" sz="1800" dirty="0">
+                <a:effectLst/>
+                <a:latin typeface="Times New Roman" panose="02020603050405020304" pitchFamily="18" charset="0"/>
+                <a:ea typeface="Calibri" panose="020F0502020204030204" pitchFamily="34" charset="0"/>
+              </a:rPr>
+              <a:t>Next, the authors must explain in two to three paragraphs what methodology lead to these requirements.  Ideally, the methodology will include direct customer stories and metrics.  </a:t>
+            </a:r>
+          </a:p>
+          <a:p>
+            <a:pPr marL="342900" marR="0" lvl="0" indent="-342900">
+              <a:lnSpc>
+                <a:spcPct val="200000"/>
+              </a:lnSpc>
+              <a:spcBef>
+                <a:spcPts val="0"/>
+              </a:spcBef>
+              <a:spcAft>
+                <a:spcPts val="0"/>
+              </a:spcAft>
+              <a:buFont typeface="+mj-lt"/>
+              <a:buAutoNum type="arabicPeriod"/>
+            </a:pPr>
+            <a:r>
+              <a:rPr lang="en-US" sz="1800" dirty="0">
+                <a:effectLst/>
+                <a:latin typeface="Times New Roman" panose="02020603050405020304" pitchFamily="18" charset="0"/>
+                <a:ea typeface="Calibri" panose="020F0502020204030204" pitchFamily="34" charset="0"/>
+              </a:rPr>
+              <a:t>The third section enumerates existing policies and their relationship.  Those relationships can include standard vocabulary definitions, </a:t>
+            </a:r>
+            <a:r>
+              <a:rPr lang="en-US" sz="1800" dirty="0" err="1">
+                <a:effectLst/>
+                <a:latin typeface="Times New Roman" panose="02020603050405020304" pitchFamily="18" charset="0"/>
+                <a:ea typeface="Calibri" panose="020F0502020204030204" pitchFamily="34" charset="0"/>
+              </a:rPr>
+              <a:t>supersedence</a:t>
+            </a:r>
+            <a:r>
+              <a:rPr lang="en-US" sz="1800" dirty="0">
+                <a:effectLst/>
+                <a:latin typeface="Times New Roman" panose="02020603050405020304" pitchFamily="18" charset="0"/>
+                <a:ea typeface="Calibri" panose="020F0502020204030204" pitchFamily="34" charset="0"/>
+              </a:rPr>
+              <a:t>, and standard procedures.</a:t>
+            </a:r>
+          </a:p>
+          <a:p>
+            <a:pPr marL="342900" marR="0" lvl="0" indent="-342900">
+              <a:lnSpc>
+                <a:spcPct val="200000"/>
+              </a:lnSpc>
+              <a:spcBef>
+                <a:spcPts val="0"/>
+              </a:spcBef>
+              <a:spcAft>
+                <a:spcPts val="0"/>
+              </a:spcAft>
+              <a:buFont typeface="+mj-lt"/>
+              <a:buAutoNum type="arabicPeriod"/>
+            </a:pPr>
+            <a:r>
+              <a:rPr lang="en-US" sz="1800" dirty="0">
+                <a:effectLst/>
+                <a:latin typeface="Times New Roman" panose="02020603050405020304" pitchFamily="18" charset="0"/>
+                <a:ea typeface="Calibri" panose="020F0502020204030204" pitchFamily="34" charset="0"/>
+              </a:rPr>
+              <a:t>Fourth, declare the foundational tenants of this new policy (</a:t>
+            </a:r>
+            <a:r>
+              <a:rPr lang="en-US" sz="1800" dirty="0" err="1">
+                <a:effectLst/>
+                <a:latin typeface="Times New Roman" panose="02020603050405020304" pitchFamily="18" charset="0"/>
+                <a:ea typeface="Calibri" panose="020F0502020204030204" pitchFamily="34" charset="0"/>
+              </a:rPr>
+              <a:t>Bryar</a:t>
+            </a:r>
+            <a:r>
+              <a:rPr lang="en-US" sz="1800" dirty="0">
+                <a:effectLst/>
+                <a:latin typeface="Times New Roman" panose="02020603050405020304" pitchFamily="18" charset="0"/>
+                <a:ea typeface="Calibri" panose="020F0502020204030204" pitchFamily="34" charset="0"/>
+              </a:rPr>
+              <a:t> &amp; </a:t>
+            </a:r>
+            <a:r>
+              <a:rPr lang="en-US" sz="1800" dirty="0" err="1">
+                <a:effectLst/>
+                <a:latin typeface="Times New Roman" panose="02020603050405020304" pitchFamily="18" charset="0"/>
+                <a:ea typeface="Calibri" panose="020F0502020204030204" pitchFamily="34" charset="0"/>
+              </a:rPr>
+              <a:t>Carr</a:t>
+            </a:r>
+            <a:r>
+              <a:rPr lang="en-US" sz="1800" dirty="0">
+                <a:effectLst/>
+                <a:latin typeface="Times New Roman" panose="02020603050405020304" pitchFamily="18" charset="0"/>
+                <a:ea typeface="Calibri" panose="020F0502020204030204" pitchFamily="34" charset="0"/>
+              </a:rPr>
+              <a:t>, 2021).  Each tenant can be a single sentence within a bulleted list.  During future debates around the policy’s expectations, the discussion leaders will defer to this list for guidance.</a:t>
+            </a:r>
+          </a:p>
+          <a:p>
+            <a:pPr marL="342900" marR="0" lvl="0" indent="-342900">
+              <a:lnSpc>
+                <a:spcPct val="200000"/>
+              </a:lnSpc>
+              <a:spcBef>
+                <a:spcPts val="0"/>
+              </a:spcBef>
+              <a:spcAft>
+                <a:spcPts val="0"/>
+              </a:spcAft>
+              <a:buFont typeface="+mj-lt"/>
+              <a:buAutoNum type="arabicPeriod"/>
+            </a:pPr>
+            <a:r>
+              <a:rPr lang="en-US" sz="1800" dirty="0">
+                <a:effectLst/>
+                <a:latin typeface="Times New Roman" panose="02020603050405020304" pitchFamily="18" charset="0"/>
+                <a:ea typeface="Calibri" panose="020F0502020204030204" pitchFamily="34" charset="0"/>
+              </a:rPr>
+              <a:t>Fifth, explain how the mechanisms and frameworks address the business challenges.  Additionally, define success criteria and measurements.  This section is typically one to three pages in length, never more than five.</a:t>
+            </a:r>
+          </a:p>
+          <a:p>
+            <a:pPr marL="342900" marR="0" lvl="0" indent="-342900">
+              <a:lnSpc>
+                <a:spcPct val="200000"/>
+              </a:lnSpc>
+              <a:spcBef>
+                <a:spcPts val="0"/>
+              </a:spcBef>
+              <a:spcAft>
+                <a:spcPts val="0"/>
+              </a:spcAft>
+              <a:buFont typeface="+mj-lt"/>
+              <a:buAutoNum type="arabicPeriod"/>
+            </a:pPr>
+            <a:r>
+              <a:rPr lang="en-US" sz="1800" dirty="0">
+                <a:effectLst/>
+                <a:latin typeface="Times New Roman" panose="02020603050405020304" pitchFamily="18" charset="0"/>
+                <a:ea typeface="Calibri" panose="020F0502020204030204" pitchFamily="34" charset="0"/>
+              </a:rPr>
+              <a:t>Lastly, include a Frequently Asked Questions (FAQ) section that addresses common scenarios.</a:t>
+            </a:r>
+          </a:p>
+          <a:p>
+            <a:pPr marL="0" marR="0">
+              <a:lnSpc>
+                <a:spcPct val="200000"/>
+              </a:lnSpc>
+              <a:spcBef>
+                <a:spcPts val="0"/>
+              </a:spcBef>
+              <a:spcAft>
+                <a:spcPts val="0"/>
+              </a:spcAft>
+            </a:pPr>
+            <a:endParaRPr lang="en-US" sz="1800" b="1" dirty="0">
+              <a:effectLst/>
+              <a:latin typeface="Times New Roman" panose="02020603050405020304" pitchFamily="18" charset="0"/>
+            </a:endParaRPr>
+          </a:p>
+          <a:p>
+            <a:pPr marL="0" marR="0">
+              <a:lnSpc>
+                <a:spcPct val="200000"/>
+              </a:lnSpc>
+              <a:spcBef>
+                <a:spcPts val="0"/>
+              </a:spcBef>
+              <a:spcAft>
+                <a:spcPts val="0"/>
+              </a:spcAft>
+            </a:pPr>
+            <a:r>
+              <a:rPr lang="en-US" sz="1800" b="1" dirty="0">
+                <a:effectLst/>
+                <a:latin typeface="Times New Roman" panose="02020603050405020304" pitchFamily="18" charset="0"/>
+              </a:rPr>
+              <a:t>Policy Storage Process</a:t>
+            </a:r>
+          </a:p>
+          <a:p>
+            <a:pPr marL="0" marR="0">
+              <a:lnSpc>
+                <a:spcPct val="200000"/>
+              </a:lnSpc>
+              <a:spcBef>
+                <a:spcPts val="0"/>
+              </a:spcBef>
+              <a:spcAft>
+                <a:spcPts val="0"/>
+              </a:spcAft>
+            </a:pPr>
+            <a:r>
+              <a:rPr lang="en-US" sz="1800" dirty="0">
+                <a:effectLst/>
+                <a:latin typeface="Times New Roman" panose="02020603050405020304" pitchFamily="18" charset="0"/>
+                <a:ea typeface="Calibri" panose="020F0502020204030204" pitchFamily="34" charset="0"/>
+              </a:rPr>
+              <a:t>Next, employees upload the document into NCU-F’s Policy Central Website, a proprietary document management solution built on a NoSQL graph database.  The document graph represents the relationships between the documents, similar to many university citation systems.  Policy documents initialize to a draft state that is only visible to their working team.  This design prevents external teams from accidentally referencing incomplete or unauthorized plans.</a:t>
+            </a:r>
+          </a:p>
+          <a:p>
+            <a:pPr marL="0" marR="0">
+              <a:lnSpc>
+                <a:spcPct val="200000"/>
+              </a:lnSpc>
+              <a:spcBef>
+                <a:spcPts val="0"/>
+              </a:spcBef>
+              <a:spcAft>
+                <a:spcPts val="0"/>
+              </a:spcAft>
+            </a:pPr>
+            <a:endParaRPr lang="en-US" sz="1800" b="1" dirty="0">
+              <a:effectLst/>
+              <a:latin typeface="Times New Roman" panose="02020603050405020304" pitchFamily="18" charset="0"/>
+            </a:endParaRPr>
+          </a:p>
+          <a:p>
+            <a:pPr marL="0" marR="0">
+              <a:lnSpc>
+                <a:spcPct val="200000"/>
+              </a:lnSpc>
+              <a:spcBef>
+                <a:spcPts val="0"/>
+              </a:spcBef>
+              <a:spcAft>
+                <a:spcPts val="0"/>
+              </a:spcAft>
+            </a:pPr>
+            <a:r>
+              <a:rPr lang="en-US" sz="1800" b="1" dirty="0">
+                <a:effectLst/>
+                <a:latin typeface="Times New Roman" panose="02020603050405020304" pitchFamily="18" charset="0"/>
+              </a:rPr>
+              <a:t>Policy Approval Process</a:t>
+            </a:r>
+          </a:p>
+          <a:p>
+            <a:pPr marL="0" marR="0">
+              <a:lnSpc>
+                <a:spcPct val="200000"/>
+              </a:lnSpc>
+              <a:spcBef>
+                <a:spcPts val="0"/>
+              </a:spcBef>
+              <a:spcAft>
+                <a:spcPts val="0"/>
+              </a:spcAft>
+            </a:pPr>
+            <a:r>
+              <a:rPr lang="en-US" sz="1800" dirty="0">
+                <a:effectLst/>
+                <a:latin typeface="Times New Roman" panose="02020603050405020304" pitchFamily="18" charset="0"/>
+                <a:ea typeface="Calibri" panose="020F0502020204030204" pitchFamily="34" charset="0"/>
+              </a:rPr>
+              <a:t>The task force delegates many day-to-day decisions to internal Technical Communities.  Each community owns a specific cross-cutting concern (e.g., disaster recovery) and self-manages any enrollment criteria that govern membership eligibility.  Community members are responsible for reviewing new policy requests, debating ambiguity with existing policies, and proposing technical guidance.  Employees can define new technical communities by submitting requests to the task force oversight committee.</a:t>
+            </a:r>
+          </a:p>
+          <a:p>
+            <a:pPr marL="0" marR="0">
+              <a:lnSpc>
+                <a:spcPct val="200000"/>
+              </a:lnSpc>
+              <a:spcBef>
+                <a:spcPts val="0"/>
+              </a:spcBef>
+              <a:spcAft>
+                <a:spcPts val="0"/>
+              </a:spcAft>
+            </a:pPr>
+            <a:endParaRPr lang="en-US" sz="1800" dirty="0">
+              <a:effectLst/>
+              <a:latin typeface="Times New Roman" panose="02020603050405020304" pitchFamily="18" charset="0"/>
+              <a:ea typeface="Calibri" panose="020F0502020204030204" pitchFamily="34" charset="0"/>
+            </a:endParaRPr>
+          </a:p>
+          <a:p>
+            <a:pPr marL="0" marR="0">
+              <a:lnSpc>
+                <a:spcPct val="200000"/>
+              </a:lnSpc>
+              <a:spcBef>
+                <a:spcPts val="0"/>
+              </a:spcBef>
+              <a:spcAft>
+                <a:spcPts val="0"/>
+              </a:spcAft>
+            </a:pPr>
+            <a:r>
+              <a:rPr lang="en-US" sz="1800" dirty="0">
+                <a:effectLst/>
+                <a:latin typeface="Times New Roman" panose="02020603050405020304" pitchFamily="18" charset="0"/>
+                <a:ea typeface="Calibri" panose="020F0502020204030204" pitchFamily="34" charset="0"/>
+              </a:rPr>
+              <a:t>Employees that want to create a new policy must identify an appropriate community to vet their document.  The community will assign one or two reviewers to iterate the proposal until it adheres to internal standards during this process.  After the reviewers approve the document, the authors can request that their policy be globally visible within Policy Central.  Typically, the community leaders promote the new concept through appropriate media (e.g., email group).  Suppose the reviewers do not support the change.  In that case, the authors can optionally escalate to the community’s program manager or executive stakeholder.</a:t>
+            </a:r>
+          </a:p>
+          <a:p>
+            <a:pPr marL="0" marR="0">
+              <a:lnSpc>
+                <a:spcPct val="200000"/>
+              </a:lnSpc>
+              <a:spcBef>
+                <a:spcPts val="0"/>
+              </a:spcBef>
+              <a:spcAft>
+                <a:spcPts val="0"/>
+              </a:spcAft>
+            </a:pPr>
+            <a:endParaRPr lang="en-US" sz="1800" b="1" dirty="0">
+              <a:effectLst/>
+              <a:latin typeface="Times New Roman" panose="02020603050405020304" pitchFamily="18" charset="0"/>
+            </a:endParaRPr>
+          </a:p>
+          <a:p>
+            <a:pPr marL="0" marR="0">
+              <a:lnSpc>
+                <a:spcPct val="200000"/>
+              </a:lnSpc>
+              <a:spcBef>
+                <a:spcPts val="0"/>
+              </a:spcBef>
+              <a:spcAft>
+                <a:spcPts val="0"/>
+              </a:spcAft>
+            </a:pPr>
+            <a:r>
+              <a:rPr lang="en-US" sz="1800" b="1" dirty="0">
+                <a:effectLst/>
+                <a:latin typeface="Times New Roman" panose="02020603050405020304" pitchFamily="18" charset="0"/>
+              </a:rPr>
+              <a:t>Policy Revision Process</a:t>
+            </a:r>
+          </a:p>
+          <a:p>
+            <a:pPr marL="0" marR="0">
+              <a:lnSpc>
+                <a:spcPct val="200000"/>
+              </a:lnSpc>
+              <a:spcBef>
+                <a:spcPts val="0"/>
+              </a:spcBef>
+              <a:spcAft>
+                <a:spcPts val="0"/>
+              </a:spcAft>
+            </a:pPr>
+            <a:r>
+              <a:rPr lang="en-US" sz="1800" dirty="0">
+                <a:effectLst/>
+                <a:latin typeface="Times New Roman" panose="02020603050405020304" pitchFamily="18" charset="0"/>
+                <a:ea typeface="Calibri" panose="020F0502020204030204" pitchFamily="34" charset="0"/>
+              </a:rPr>
+              <a:t>Within Policy Central, all documents contain version metadata.  Employees can submit minor updates as an addendum, declaring any applicability criteria and discussions leading to the change.  Major revisions must declare a new policy document and repeat the adoption process.  This new policy document can initialize as a “copy, paste, edit” of the previous version.  Either approach requires approval through the owning Technical Community.</a:t>
+            </a:r>
+          </a:p>
+          <a:p>
+            <a:pPr marL="0" marR="0">
+              <a:lnSpc>
+                <a:spcPct val="200000"/>
+              </a:lnSpc>
+              <a:spcBef>
+                <a:spcPts val="0"/>
+              </a:spcBef>
+              <a:spcAft>
+                <a:spcPts val="0"/>
+              </a:spcAft>
+            </a:pPr>
+            <a:endParaRPr lang="en-US" sz="1800" b="1" dirty="0">
+              <a:effectLst/>
+              <a:latin typeface="Times New Roman" panose="02020603050405020304" pitchFamily="18" charset="0"/>
+            </a:endParaRPr>
+          </a:p>
+          <a:p>
+            <a:pPr marL="0" marR="0">
+              <a:lnSpc>
+                <a:spcPct val="200000"/>
+              </a:lnSpc>
+              <a:spcBef>
+                <a:spcPts val="0"/>
+              </a:spcBef>
+              <a:spcAft>
+                <a:spcPts val="0"/>
+              </a:spcAft>
+            </a:pPr>
+            <a:r>
+              <a:rPr lang="en-US" sz="1800" b="1" dirty="0">
+                <a:effectLst/>
+                <a:latin typeface="Times New Roman" panose="02020603050405020304" pitchFamily="18" charset="0"/>
+              </a:rPr>
+              <a:t>Policy Deprecation Process</a:t>
+            </a:r>
+          </a:p>
+          <a:p>
+            <a:pPr marL="0" marR="0">
+              <a:lnSpc>
+                <a:spcPct val="200000"/>
+              </a:lnSpc>
+              <a:spcBef>
+                <a:spcPts val="0"/>
+              </a:spcBef>
+              <a:spcAft>
+                <a:spcPts val="0"/>
+              </a:spcAft>
+            </a:pPr>
+            <a:r>
+              <a:rPr lang="en-US" sz="1800" dirty="0">
+                <a:effectLst/>
+                <a:latin typeface="Times New Roman" panose="02020603050405020304" pitchFamily="18" charset="0"/>
+                <a:ea typeface="Calibri" panose="020F0502020204030204" pitchFamily="34" charset="0"/>
+              </a:rPr>
+              <a:t>Many policies become deprecated due to external changes in the business strategy.  When these situations occur, the Technical Community must submit a migration plan to their executive sponsor.  This plan must include procedures to identify the migration’s scope, mechanisms for communicating status, and any potential risks from migrating.  Lastly, there must be a section that details any reasons </a:t>
+            </a:r>
+            <a:r>
+              <a:rPr lang="en-US" sz="1800" i="1" dirty="0">
+                <a:effectLst/>
+                <a:latin typeface="Times New Roman" panose="02020603050405020304" pitchFamily="18" charset="0"/>
+                <a:ea typeface="Calibri" panose="020F0502020204030204" pitchFamily="34" charset="0"/>
+              </a:rPr>
+              <a:t>not</a:t>
+            </a:r>
+            <a:r>
+              <a:rPr lang="en-US" sz="1800" dirty="0">
+                <a:effectLst/>
+                <a:latin typeface="Times New Roman" panose="02020603050405020304" pitchFamily="18" charset="0"/>
+                <a:ea typeface="Calibri" panose="020F0502020204030204" pitchFamily="34" charset="0"/>
+              </a:rPr>
+              <a:t> to deprecate and migrate.  After agreeing on the new direction, the Policy Central document’s status becomes either deprecated or superseded.</a:t>
+            </a:r>
+          </a:p>
+          <a:p>
+            <a:pPr marL="0" marR="0" lvl="0" indent="0">
+              <a:lnSpc>
+                <a:spcPct val="107000"/>
+              </a:lnSpc>
+              <a:spcBef>
+                <a:spcPts val="0"/>
+              </a:spcBef>
+              <a:spcAft>
+                <a:spcPts val="800"/>
+              </a:spcAft>
+              <a:buFont typeface="Symbol" panose="05050102010706020507" pitchFamily="18" charset="2"/>
+              <a:buNone/>
+            </a:pPr>
+            <a:endParaRPr lang="en-US" sz="1100" dirty="0">
+              <a:effectLst/>
+              <a:latin typeface="Calibri" panose="020F0502020204030204" pitchFamily="34" charset="0"/>
+              <a:ea typeface="Calibri" panose="020F0502020204030204" pitchFamily="34" charset="0"/>
+              <a:cs typeface="Times New Roman" panose="02020603050405020304" pitchFamily="18" charset="0"/>
+            </a:endParaRPr>
           </a:p>
         </p:txBody>
       </p:sp>

</xml_diff>